<commit_message>
Migratory distance calcs, new varpart fig
</commit_message>
<xml_diff>
--- a/figures/sem_venn_figures.pptx
+++ b/figures/sem_venn_figures.pptx
@@ -5,11 +5,14 @@
     <p:sldMasterId id="2147483648" r:id="rId1"/>
   </p:sldMasterIdLst>
   <p:notesMasterIdLst>
-    <p:notesMasterId r:id="rId4"/>
+    <p:notesMasterId r:id="rId7"/>
   </p:notesMasterIdLst>
   <p:sldIdLst>
     <p:sldId id="256" r:id="rId2"/>
     <p:sldId id="257" r:id="rId3"/>
+    <p:sldId id="258" r:id="rId4"/>
+    <p:sldId id="259" r:id="rId5"/>
+    <p:sldId id="260" r:id="rId6"/>
   </p:sldIdLst>
   <p:sldSz cx="12192000" cy="6858000"/>
   <p:notesSz cx="6858000" cy="9144000"/>
@@ -108,6 +111,11 @@
       </a:defRPr>
     </a:lvl9pPr>
   </p:defaultTextStyle>
+  <p:extLst>
+    <p:ext uri="{EFAFB233-063F-42B5-8137-9DF3F51BA10A}">
+      <p15:sldGuideLst xmlns:p15="http://schemas.microsoft.com/office/powerpoint/2012/main"/>
+    </p:ext>
+  </p:extLst>
 </p:presentation>
 </file>
 
@@ -193,7 +201,7 @@
           <a:p>
             <a:fld id="{3361DBBF-9048-E34E-A120-F3301ADA26C3}" type="datetimeFigureOut">
               <a:rPr lang="en-US" smtClean="0"/>
-              <a:t>11/4/21</a:t>
+              <a:t>11/17/21</a:t>
             </a:fld>
             <a:endParaRPr lang="en-US"/>
           </a:p>
@@ -547,6 +555,180 @@
 </p:notes>
 </file>
 
+<file path=ppt/notesSlides/notesSlide2.xml><?xml version="1.0" encoding="utf-8"?>
+<p:notes xmlns:a="http://schemas.openxmlformats.org/drawingml/2006/main" xmlns:r="http://schemas.openxmlformats.org/officeDocument/2006/relationships" xmlns:p="http://schemas.openxmlformats.org/presentationml/2006/main">
+  <p:cSld>
+    <p:spTree>
+      <p:nvGrpSpPr>
+        <p:cNvPr id="1" name=""/>
+        <p:cNvGrpSpPr/>
+        <p:nvPr/>
+      </p:nvGrpSpPr>
+      <p:grpSpPr>
+        <a:xfrm>
+          <a:off x="0" y="0"/>
+          <a:ext cx="0" cy="0"/>
+          <a:chOff x="0" y="0"/>
+          <a:chExt cx="0" cy="0"/>
+        </a:xfrm>
+      </p:grpSpPr>
+      <p:sp>
+        <p:nvSpPr>
+          <p:cNvPr id="2" name="Slide Image Placeholder 1"/>
+          <p:cNvSpPr>
+            <a:spLocks noGrp="1" noRot="1" noChangeAspect="1"/>
+          </p:cNvSpPr>
+          <p:nvPr>
+            <p:ph type="sldImg"/>
+          </p:nvPr>
+        </p:nvSpPr>
+        <p:spPr/>
+      </p:sp>
+      <p:sp>
+        <p:nvSpPr>
+          <p:cNvPr id="3" name="Notes Placeholder 2"/>
+          <p:cNvSpPr>
+            <a:spLocks noGrp="1"/>
+          </p:cNvSpPr>
+          <p:nvPr>
+            <p:ph type="body" idx="1"/>
+          </p:nvPr>
+        </p:nvSpPr>
+        <p:spPr/>
+        <p:txBody>
+          <a:bodyPr/>
+          <a:lstStyle/>
+          <a:p>
+            <a:r>
+              <a:rPr lang="en-US" dirty="0"/>
+              <a:t>Venn diagram of variance partitioning</a:t>
+            </a:r>
+          </a:p>
+        </p:txBody>
+      </p:sp>
+      <p:sp>
+        <p:nvSpPr>
+          <p:cNvPr id="4" name="Slide Number Placeholder 3"/>
+          <p:cNvSpPr>
+            <a:spLocks noGrp="1"/>
+          </p:cNvSpPr>
+          <p:nvPr>
+            <p:ph type="sldNum" sz="quarter" idx="5"/>
+          </p:nvPr>
+        </p:nvSpPr>
+        <p:spPr/>
+        <p:txBody>
+          <a:bodyPr/>
+          <a:lstStyle/>
+          <a:p>
+            <a:fld id="{B23B3E7E-11E4-144F-B215-ADFB597CAF46}" type="slidenum">
+              <a:rPr lang="en-US" smtClean="0"/>
+              <a:t>3</a:t>
+            </a:fld>
+            <a:endParaRPr lang="en-US"/>
+          </a:p>
+        </p:txBody>
+      </p:sp>
+    </p:spTree>
+    <p:extLst>
+      <p:ext uri="{BB962C8B-B14F-4D97-AF65-F5344CB8AC3E}">
+        <p14:creationId xmlns:p14="http://schemas.microsoft.com/office/powerpoint/2010/main" val="109745768"/>
+      </p:ext>
+    </p:extLst>
+  </p:cSld>
+  <p:clrMapOvr>
+    <a:masterClrMapping/>
+  </p:clrMapOvr>
+</p:notes>
+</file>
+
+<file path=ppt/notesSlides/notesSlide3.xml><?xml version="1.0" encoding="utf-8"?>
+<p:notes xmlns:a="http://schemas.openxmlformats.org/drawingml/2006/main" xmlns:r="http://schemas.openxmlformats.org/officeDocument/2006/relationships" xmlns:p="http://schemas.openxmlformats.org/presentationml/2006/main">
+  <p:cSld>
+    <p:spTree>
+      <p:nvGrpSpPr>
+        <p:cNvPr id="1" name=""/>
+        <p:cNvGrpSpPr/>
+        <p:nvPr/>
+      </p:nvGrpSpPr>
+      <p:grpSpPr>
+        <a:xfrm>
+          <a:off x="0" y="0"/>
+          <a:ext cx="0" cy="0"/>
+          <a:chOff x="0" y="0"/>
+          <a:chExt cx="0" cy="0"/>
+        </a:xfrm>
+      </p:grpSpPr>
+      <p:sp>
+        <p:nvSpPr>
+          <p:cNvPr id="2" name="Slide Image Placeholder 1"/>
+          <p:cNvSpPr>
+            <a:spLocks noGrp="1" noRot="1" noChangeAspect="1"/>
+          </p:cNvSpPr>
+          <p:nvPr>
+            <p:ph type="sldImg"/>
+          </p:nvPr>
+        </p:nvSpPr>
+        <p:spPr/>
+      </p:sp>
+      <p:sp>
+        <p:nvSpPr>
+          <p:cNvPr id="3" name="Notes Placeholder 2"/>
+          <p:cNvSpPr>
+            <a:spLocks noGrp="1"/>
+          </p:cNvSpPr>
+          <p:nvPr>
+            <p:ph type="body" idx="1"/>
+          </p:nvPr>
+        </p:nvSpPr>
+        <p:spPr/>
+        <p:txBody>
+          <a:bodyPr/>
+          <a:lstStyle/>
+          <a:p>
+            <a:r>
+              <a:rPr lang="en-US" dirty="0"/>
+              <a:t>Venn diagram of variance partitioning</a:t>
+            </a:r>
+          </a:p>
+        </p:txBody>
+      </p:sp>
+      <p:sp>
+        <p:nvSpPr>
+          <p:cNvPr id="4" name="Slide Number Placeholder 3"/>
+          <p:cNvSpPr>
+            <a:spLocks noGrp="1"/>
+          </p:cNvSpPr>
+          <p:nvPr>
+            <p:ph type="sldNum" sz="quarter" idx="5"/>
+          </p:nvPr>
+        </p:nvSpPr>
+        <p:spPr/>
+        <p:txBody>
+          <a:bodyPr/>
+          <a:lstStyle/>
+          <a:p>
+            <a:fld id="{B23B3E7E-11E4-144F-B215-ADFB597CAF46}" type="slidenum">
+              <a:rPr lang="en-US" smtClean="0"/>
+              <a:t>4</a:t>
+            </a:fld>
+            <a:endParaRPr lang="en-US"/>
+          </a:p>
+        </p:txBody>
+      </p:sp>
+    </p:spTree>
+    <p:extLst>
+      <p:ext uri="{BB962C8B-B14F-4D97-AF65-F5344CB8AC3E}">
+        <p14:creationId xmlns:p14="http://schemas.microsoft.com/office/powerpoint/2010/main" val="1076906806"/>
+      </p:ext>
+    </p:extLst>
+  </p:cSld>
+  <p:clrMapOvr>
+    <a:masterClrMapping/>
+  </p:clrMapOvr>
+</p:notes>
+</file>
+
 <file path=ppt/slideLayouts/slideLayout1.xml><?xml version="1.0" encoding="utf-8"?>
 <p:sldLayout xmlns:a="http://schemas.openxmlformats.org/drawingml/2006/main" xmlns:r="http://schemas.openxmlformats.org/officeDocument/2006/relationships" xmlns:p="http://schemas.openxmlformats.org/presentationml/2006/main" type="title" preserve="1">
   <p:cSld name="Title Slide">
@@ -694,7 +876,7 @@
           <a:p>
             <a:fld id="{CD91ABF4-99EA-9A4C-8826-87C21CFC9DF7}" type="datetimeFigureOut">
               <a:rPr lang="en-US" smtClean="0"/>
-              <a:t>11/4/21</a:t>
+              <a:t>11/17/21</a:t>
             </a:fld>
             <a:endParaRPr lang="en-US" dirty="0"/>
           </a:p>
@@ -892,7 +1074,7 @@
           <a:p>
             <a:fld id="{CD91ABF4-99EA-9A4C-8826-87C21CFC9DF7}" type="datetimeFigureOut">
               <a:rPr lang="en-US" smtClean="0"/>
-              <a:t>11/4/21</a:t>
+              <a:t>11/17/21</a:t>
             </a:fld>
             <a:endParaRPr lang="en-US" dirty="0"/>
           </a:p>
@@ -1100,7 +1282,7 @@
           <a:p>
             <a:fld id="{CD91ABF4-99EA-9A4C-8826-87C21CFC9DF7}" type="datetimeFigureOut">
               <a:rPr lang="en-US" smtClean="0"/>
-              <a:t>11/4/21</a:t>
+              <a:t>11/17/21</a:t>
             </a:fld>
             <a:endParaRPr lang="en-US" dirty="0"/>
           </a:p>
@@ -1298,7 +1480,7 @@
           <a:p>
             <a:fld id="{CD91ABF4-99EA-9A4C-8826-87C21CFC9DF7}" type="datetimeFigureOut">
               <a:rPr lang="en-US" smtClean="0"/>
-              <a:t>11/4/21</a:t>
+              <a:t>11/17/21</a:t>
             </a:fld>
             <a:endParaRPr lang="en-US" dirty="0"/>
           </a:p>
@@ -1573,7 +1755,7 @@
           <a:p>
             <a:fld id="{CD91ABF4-99EA-9A4C-8826-87C21CFC9DF7}" type="datetimeFigureOut">
               <a:rPr lang="en-US" smtClean="0"/>
-              <a:t>11/4/21</a:t>
+              <a:t>11/17/21</a:t>
             </a:fld>
             <a:endParaRPr lang="en-US" dirty="0"/>
           </a:p>
@@ -1838,7 +2020,7 @@
           <a:p>
             <a:fld id="{CD91ABF4-99EA-9A4C-8826-87C21CFC9DF7}" type="datetimeFigureOut">
               <a:rPr lang="en-US" smtClean="0"/>
-              <a:t>11/4/21</a:t>
+              <a:t>11/17/21</a:t>
             </a:fld>
             <a:endParaRPr lang="en-US" dirty="0"/>
           </a:p>
@@ -2250,7 +2432,7 @@
           <a:p>
             <a:fld id="{CD91ABF4-99EA-9A4C-8826-87C21CFC9DF7}" type="datetimeFigureOut">
               <a:rPr lang="en-US" smtClean="0"/>
-              <a:t>11/4/21</a:t>
+              <a:t>11/17/21</a:t>
             </a:fld>
             <a:endParaRPr lang="en-US" dirty="0"/>
           </a:p>
@@ -2391,7 +2573,7 @@
           <a:p>
             <a:fld id="{CD91ABF4-99EA-9A4C-8826-87C21CFC9DF7}" type="datetimeFigureOut">
               <a:rPr lang="en-US" smtClean="0"/>
-              <a:t>11/4/21</a:t>
+              <a:t>11/17/21</a:t>
             </a:fld>
             <a:endParaRPr lang="en-US" dirty="0"/>
           </a:p>
@@ -2504,7 +2686,7 @@
           <a:p>
             <a:fld id="{CD91ABF4-99EA-9A4C-8826-87C21CFC9DF7}" type="datetimeFigureOut">
               <a:rPr lang="en-US" smtClean="0"/>
-              <a:t>11/4/21</a:t>
+              <a:t>11/17/21</a:t>
             </a:fld>
             <a:endParaRPr lang="en-US" dirty="0"/>
           </a:p>
@@ -2815,7 +2997,7 @@
           <a:p>
             <a:fld id="{CD91ABF4-99EA-9A4C-8826-87C21CFC9DF7}" type="datetimeFigureOut">
               <a:rPr lang="en-US" smtClean="0"/>
-              <a:t>11/4/21</a:t>
+              <a:t>11/17/21</a:t>
             </a:fld>
             <a:endParaRPr lang="en-US" dirty="0"/>
           </a:p>
@@ -3103,7 +3285,7 @@
           <a:p>
             <a:fld id="{CD91ABF4-99EA-9A4C-8826-87C21CFC9DF7}" type="datetimeFigureOut">
               <a:rPr lang="en-US" smtClean="0"/>
-              <a:t>11/4/21</a:t>
+              <a:t>11/17/21</a:t>
             </a:fld>
             <a:endParaRPr lang="en-US" dirty="0"/>
           </a:p>
@@ -3344,7 +3526,7 @@
           <a:p>
             <a:fld id="{CD91ABF4-99EA-9A4C-8826-87C21CFC9DF7}" type="datetimeFigureOut">
               <a:rPr lang="en-US" smtClean="0"/>
-              <a:t>11/4/21</a:t>
+              <a:t>11/17/21</a:t>
             </a:fld>
             <a:endParaRPr lang="en-US" dirty="0"/>
           </a:p>
@@ -4587,8 +4769,8 @@
         </p:nvSpPr>
         <p:spPr>
           <a:xfrm>
-            <a:off x="1839435" y="3080146"/>
-            <a:ext cx="1115287" cy="369332"/>
+            <a:off x="1987018" y="3080146"/>
+            <a:ext cx="946560" cy="369332"/>
           </a:xfrm>
           <a:prstGeom prst="rect">
             <a:avLst/>
@@ -4611,7 +4793,7 @@
                 <a:latin typeface="Arial" panose="020B0604020202020204" pitchFamily="34" charset="0"/>
                 <a:cs typeface="Arial" panose="020B0604020202020204" pitchFamily="34" charset="0"/>
               </a:rPr>
-              <a:t>0.0396**</a:t>
+              <a:t>0.040**</a:t>
             </a:r>
           </a:p>
         </p:txBody>
@@ -4631,7 +4813,7 @@
         <p:spPr>
           <a:xfrm>
             <a:off x="6079474" y="3115666"/>
-            <a:ext cx="1143000" cy="369332"/>
+            <a:ext cx="982109" cy="369332"/>
           </a:xfrm>
           <a:prstGeom prst="rect">
             <a:avLst/>
@@ -4656,7 +4838,7 @@
                 <a:latin typeface="Arial" panose="020B0604020202020204" pitchFamily="34" charset="0"/>
                 <a:cs typeface="Arial" panose="020B0604020202020204" pitchFamily="34" charset="0"/>
               </a:rPr>
-              <a:t>0.3914**</a:t>
+              <a:t>0.391**</a:t>
             </a:r>
           </a:p>
         </p:txBody>
@@ -4675,8 +4857,8 @@
         </p:nvSpPr>
         <p:spPr>
           <a:xfrm>
-            <a:off x="6785016" y="1550391"/>
-            <a:ext cx="1247899" cy="369332"/>
+            <a:off x="6982937" y="1551222"/>
+            <a:ext cx="1028948" cy="369332"/>
           </a:xfrm>
           <a:prstGeom prst="rect">
             <a:avLst/>
@@ -4701,7 +4883,7 @@
                 <a:latin typeface="Arial" panose="020B0604020202020204" pitchFamily="34" charset="0"/>
                 <a:cs typeface="Arial" panose="020B0604020202020204" pitchFamily="34" charset="0"/>
               </a:rPr>
-              <a:t>0.2367***</a:t>
+              <a:t>0.237***</a:t>
             </a:r>
           </a:p>
         </p:txBody>
@@ -4721,7 +4903,7 @@
         <p:spPr>
           <a:xfrm>
             <a:off x="9147088" y="3080146"/>
-            <a:ext cx="1143000" cy="369332"/>
+            <a:ext cx="1020486" cy="369332"/>
           </a:xfrm>
           <a:prstGeom prst="rect">
             <a:avLst/>
@@ -4746,7 +4928,7 @@
                 <a:latin typeface="Arial" panose="020B0604020202020204" pitchFamily="34" charset="0"/>
                 <a:cs typeface="Arial" panose="020B0604020202020204" pitchFamily="34" charset="0"/>
               </a:rPr>
-              <a:t>-2.2790**</a:t>
+              <a:t>-2.279**</a:t>
             </a:r>
           </a:p>
         </p:txBody>
@@ -4942,8 +5124,8 @@
         </p:nvSpPr>
         <p:spPr>
           <a:xfrm>
-            <a:off x="3244624" y="3683896"/>
-            <a:ext cx="955901" cy="369332"/>
+            <a:off x="3313758" y="3638365"/>
+            <a:ext cx="870174" cy="369332"/>
           </a:xfrm>
           <a:prstGeom prst="rect">
             <a:avLst/>
@@ -4975,7 +5157,7 @@
                 <a:latin typeface="Arial" panose="020B0604020202020204" pitchFamily="34" charset="0"/>
                 <a:cs typeface="Arial" panose="020B0604020202020204" pitchFamily="34" charset="0"/>
               </a:rPr>
-              <a:t>-0.1611</a:t>
+              <a:t>-0.161</a:t>
             </a:r>
           </a:p>
         </p:txBody>
@@ -4995,7 +5177,7 @@
         <p:spPr>
           <a:xfrm>
             <a:off x="3802268" y="4147671"/>
-            <a:ext cx="952054" cy="369332"/>
+            <a:ext cx="771792" cy="369332"/>
           </a:xfrm>
           <a:prstGeom prst="rect">
             <a:avLst/>
@@ -5027,7 +5209,7 @@
                 <a:latin typeface="Arial" panose="020B0604020202020204" pitchFamily="34" charset="0"/>
                 <a:cs typeface="Arial" panose="020B0604020202020204" pitchFamily="34" charset="0"/>
               </a:rPr>
-              <a:t>0.4860</a:t>
+              <a:t>0.486</a:t>
             </a:r>
           </a:p>
         </p:txBody>
@@ -5047,7 +5229,7 @@
         <p:spPr>
           <a:xfrm>
             <a:off x="4925785" y="3963005"/>
-            <a:ext cx="952054" cy="369332"/>
+            <a:ext cx="771792" cy="369332"/>
           </a:xfrm>
           <a:prstGeom prst="rect">
             <a:avLst/>
@@ -5079,7 +5261,7 @@
                 <a:latin typeface="Arial" panose="020B0604020202020204" pitchFamily="34" charset="0"/>
                 <a:cs typeface="Arial" panose="020B0604020202020204" pitchFamily="34" charset="0"/>
               </a:rPr>
-              <a:t>0.0027</a:t>
+              <a:t>0.003</a:t>
             </a:r>
           </a:p>
         </p:txBody>
@@ -5099,7 +5281,7 @@
         <p:spPr>
           <a:xfrm>
             <a:off x="6219261" y="3967301"/>
-            <a:ext cx="895594" cy="369332"/>
+            <a:ext cx="763676" cy="369332"/>
           </a:xfrm>
           <a:prstGeom prst="rect">
             <a:avLst/>
@@ -5131,7 +5313,7 @@
                 <a:latin typeface="Arial" panose="020B0604020202020204" pitchFamily="34" charset="0"/>
                 <a:cs typeface="Arial" panose="020B0604020202020204" pitchFamily="34" charset="0"/>
               </a:rPr>
-              <a:t>0.0671</a:t>
+              <a:t>0.067</a:t>
             </a:r>
           </a:p>
         </p:txBody>
@@ -5150,8 +5332,8 @@
         </p:nvSpPr>
         <p:spPr>
           <a:xfrm>
-            <a:off x="7962860" y="3677033"/>
-            <a:ext cx="984515" cy="369332"/>
+            <a:off x="7962861" y="3677033"/>
+            <a:ext cx="835114" cy="369332"/>
           </a:xfrm>
           <a:prstGeom prst="rect">
             <a:avLst/>
@@ -5183,7 +5365,7 @@
                 <a:latin typeface="Arial" panose="020B0604020202020204" pitchFamily="34" charset="0"/>
                 <a:cs typeface="Arial" panose="020B0604020202020204" pitchFamily="34" charset="0"/>
               </a:rPr>
-              <a:t>-0.6455</a:t>
+              <a:t>-0.646</a:t>
             </a:r>
           </a:p>
         </p:txBody>
@@ -5203,7 +5385,7 @@
         <p:spPr>
           <a:xfrm>
             <a:off x="7381360" y="4193903"/>
-            <a:ext cx="984514" cy="369332"/>
+            <a:ext cx="835114" cy="369332"/>
           </a:xfrm>
           <a:prstGeom prst="rect">
             <a:avLst/>
@@ -5235,7 +5417,7 @@
                 <a:latin typeface="Arial" panose="020B0604020202020204" pitchFamily="34" charset="0"/>
                 <a:cs typeface="Arial" panose="020B0604020202020204" pitchFamily="34" charset="0"/>
               </a:rPr>
-              <a:t>-0.0391</a:t>
+              <a:t>-0.039</a:t>
             </a:r>
           </a:p>
         </p:txBody>
@@ -5255,7 +5437,7 @@
         <p:spPr>
           <a:xfrm>
             <a:off x="3599151" y="942839"/>
-            <a:ext cx="952054" cy="369332"/>
+            <a:ext cx="770968" cy="369332"/>
           </a:xfrm>
           <a:prstGeom prst="rect">
             <a:avLst/>
@@ -5287,7 +5469,7 @@
                 <a:latin typeface="Arial" panose="020B0604020202020204" pitchFamily="34" charset="0"/>
                 <a:cs typeface="Arial" panose="020B0604020202020204" pitchFamily="34" charset="0"/>
               </a:rPr>
-              <a:t>0.0083</a:t>
+              <a:t>0.008</a:t>
             </a:r>
           </a:p>
         </p:txBody>
@@ -5322,10 +5504,2011 @@
           <a:chExt cx="0" cy="0"/>
         </a:xfrm>
       </p:grpSpPr>
+      <p:sp>
+        <p:nvSpPr>
+          <p:cNvPr id="2" name="Oval 1">
+            <a:extLst>
+              <a:ext uri="{FF2B5EF4-FFF2-40B4-BE49-F238E27FC236}">
+                <a16:creationId xmlns:a16="http://schemas.microsoft.com/office/drawing/2014/main" id="{ABDFBAC5-1D7C-4844-B9F9-941E6CABA206}"/>
+              </a:ext>
+            </a:extLst>
+          </p:cNvPr>
+          <p:cNvSpPr/>
+          <p:nvPr/>
+        </p:nvSpPr>
+        <p:spPr>
+          <a:xfrm>
+            <a:off x="3258293" y="1696686"/>
+            <a:ext cx="2604654" cy="2740232"/>
+          </a:xfrm>
+          <a:prstGeom prst="ellipse">
+            <a:avLst/>
+          </a:prstGeom>
+          <a:noFill/>
+          <a:ln>
+            <a:solidFill>
+              <a:schemeClr val="tx1"/>
+            </a:solidFill>
+          </a:ln>
+        </p:spPr>
+        <p:style>
+          <a:lnRef idx="2">
+            <a:schemeClr val="accent1">
+              <a:shade val="50000"/>
+            </a:schemeClr>
+          </a:lnRef>
+          <a:fillRef idx="1">
+            <a:schemeClr val="accent1"/>
+          </a:fillRef>
+          <a:effectRef idx="0">
+            <a:schemeClr val="accent1"/>
+          </a:effectRef>
+          <a:fontRef idx="minor">
+            <a:schemeClr val="lt1"/>
+          </a:fontRef>
+        </p:style>
+        <p:txBody>
+          <a:bodyPr rtlCol="0" anchor="ctr"/>
+          <a:lstStyle/>
+          <a:p>
+            <a:pPr algn="ctr"/>
+            <a:endParaRPr lang="en-US"/>
+          </a:p>
+        </p:txBody>
+      </p:sp>
+      <p:sp>
+        <p:nvSpPr>
+          <p:cNvPr id="3" name="Oval 2">
+            <a:extLst>
+              <a:ext uri="{FF2B5EF4-FFF2-40B4-BE49-F238E27FC236}">
+                <a16:creationId xmlns:a16="http://schemas.microsoft.com/office/drawing/2014/main" id="{50F6445B-A35C-1549-949B-2546B11108E8}"/>
+              </a:ext>
+            </a:extLst>
+          </p:cNvPr>
+          <p:cNvSpPr/>
+          <p:nvPr/>
+        </p:nvSpPr>
+        <p:spPr>
+          <a:xfrm>
+            <a:off x="4846120" y="945572"/>
+            <a:ext cx="4360225" cy="4099956"/>
+          </a:xfrm>
+          <a:prstGeom prst="ellipse">
+            <a:avLst/>
+          </a:prstGeom>
+          <a:noFill/>
+          <a:ln>
+            <a:solidFill>
+              <a:schemeClr val="tx1"/>
+            </a:solidFill>
+          </a:ln>
+        </p:spPr>
+        <p:style>
+          <a:lnRef idx="2">
+            <a:schemeClr val="accent1">
+              <a:shade val="50000"/>
+            </a:schemeClr>
+          </a:lnRef>
+          <a:fillRef idx="1">
+            <a:schemeClr val="accent1"/>
+          </a:fillRef>
+          <a:effectRef idx="0">
+            <a:schemeClr val="accent1"/>
+          </a:effectRef>
+          <a:fontRef idx="minor">
+            <a:schemeClr val="lt1"/>
+          </a:fontRef>
+        </p:style>
+        <p:txBody>
+          <a:bodyPr rtlCol="0" anchor="ctr"/>
+          <a:lstStyle/>
+          <a:p>
+            <a:pPr algn="ctr"/>
+            <a:endParaRPr lang="en-US"/>
+          </a:p>
+        </p:txBody>
+      </p:sp>
+      <p:sp>
+        <p:nvSpPr>
+          <p:cNvPr id="4" name="Oval 3">
+            <a:extLst>
+              <a:ext uri="{FF2B5EF4-FFF2-40B4-BE49-F238E27FC236}">
+                <a16:creationId xmlns:a16="http://schemas.microsoft.com/office/drawing/2014/main" id="{C8F89E68-3A52-8247-A1FE-A8CF47352C31}"/>
+              </a:ext>
+            </a:extLst>
+          </p:cNvPr>
+          <p:cNvSpPr/>
+          <p:nvPr/>
+        </p:nvSpPr>
+        <p:spPr>
+          <a:xfrm>
+            <a:off x="3906982" y="2995550"/>
+            <a:ext cx="2854035" cy="2882736"/>
+          </a:xfrm>
+          <a:prstGeom prst="ellipse">
+            <a:avLst/>
+          </a:prstGeom>
+          <a:noFill/>
+          <a:ln>
+            <a:solidFill>
+              <a:schemeClr val="tx1"/>
+            </a:solidFill>
+          </a:ln>
+        </p:spPr>
+        <p:style>
+          <a:lnRef idx="2">
+            <a:schemeClr val="accent1">
+              <a:shade val="50000"/>
+            </a:schemeClr>
+          </a:lnRef>
+          <a:fillRef idx="1">
+            <a:schemeClr val="accent1"/>
+          </a:fillRef>
+          <a:effectRef idx="0">
+            <a:schemeClr val="accent1"/>
+          </a:effectRef>
+          <a:fontRef idx="minor">
+            <a:schemeClr val="lt1"/>
+          </a:fontRef>
+        </p:style>
+        <p:txBody>
+          <a:bodyPr rtlCol="0" anchor="ctr"/>
+          <a:lstStyle/>
+          <a:p>
+            <a:pPr algn="ctr"/>
+            <a:endParaRPr lang="en-US"/>
+          </a:p>
+        </p:txBody>
+      </p:sp>
+      <p:sp>
+        <p:nvSpPr>
+          <p:cNvPr id="5" name="TextBox 4">
+            <a:extLst>
+              <a:ext uri="{FF2B5EF4-FFF2-40B4-BE49-F238E27FC236}">
+                <a16:creationId xmlns:a16="http://schemas.microsoft.com/office/drawing/2014/main" id="{468C6069-BA96-9E40-8437-18F5A8D5A767}"/>
+              </a:ext>
+            </a:extLst>
+          </p:cNvPr>
+          <p:cNvSpPr txBox="1"/>
+          <p:nvPr/>
+        </p:nvSpPr>
+        <p:spPr>
+          <a:xfrm>
+            <a:off x="6923314" y="2527958"/>
+            <a:ext cx="1840675" cy="369332"/>
+          </a:xfrm>
+          <a:prstGeom prst="rect">
+            <a:avLst/>
+          </a:prstGeom>
+          <a:noFill/>
+        </p:spPr>
+        <p:txBody>
+          <a:bodyPr wrap="square" rtlCol="0">
+            <a:spAutoFit/>
+          </a:bodyPr>
+          <a:lstStyle/>
+          <a:p>
+            <a:r>
+              <a:rPr lang="en-US" dirty="0">
+                <a:latin typeface="Arial" panose="020B0604020202020204" pitchFamily="34" charset="0"/>
+                <a:cs typeface="Arial" panose="020B0604020202020204" pitchFamily="34" charset="0"/>
+              </a:rPr>
+              <a:t>Niche breadth</a:t>
+            </a:r>
+          </a:p>
+        </p:txBody>
+      </p:sp>
+      <p:sp>
+        <p:nvSpPr>
+          <p:cNvPr id="6" name="TextBox 5">
+            <a:extLst>
+              <a:ext uri="{FF2B5EF4-FFF2-40B4-BE49-F238E27FC236}">
+                <a16:creationId xmlns:a16="http://schemas.microsoft.com/office/drawing/2014/main" id="{AA65B116-EA42-DE4A-AFA1-1F5F883DF204}"/>
+              </a:ext>
+            </a:extLst>
+          </p:cNvPr>
+          <p:cNvSpPr txBox="1"/>
+          <p:nvPr/>
+        </p:nvSpPr>
+        <p:spPr>
+          <a:xfrm>
+            <a:off x="4413661" y="4907909"/>
+            <a:ext cx="1840675" cy="369332"/>
+          </a:xfrm>
+          <a:prstGeom prst="rect">
+            <a:avLst/>
+          </a:prstGeom>
+          <a:noFill/>
+        </p:spPr>
+        <p:txBody>
+          <a:bodyPr wrap="square" rtlCol="0">
+            <a:spAutoFit/>
+          </a:bodyPr>
+          <a:lstStyle/>
+          <a:p>
+            <a:r>
+              <a:rPr lang="en-US" dirty="0">
+                <a:latin typeface="Arial" panose="020B0604020202020204" pitchFamily="34" charset="0"/>
+                <a:cs typeface="Arial" panose="020B0604020202020204" pitchFamily="34" charset="0"/>
+              </a:rPr>
+              <a:t>Body size</a:t>
+            </a:r>
+          </a:p>
+        </p:txBody>
+      </p:sp>
+      <p:sp>
+        <p:nvSpPr>
+          <p:cNvPr id="7" name="TextBox 6">
+            <a:extLst>
+              <a:ext uri="{FF2B5EF4-FFF2-40B4-BE49-F238E27FC236}">
+                <a16:creationId xmlns:a16="http://schemas.microsoft.com/office/drawing/2014/main" id="{A72E2609-B025-0840-BB63-D989569E86F1}"/>
+              </a:ext>
+            </a:extLst>
+          </p:cNvPr>
+          <p:cNvSpPr txBox="1"/>
+          <p:nvPr/>
+        </p:nvSpPr>
+        <p:spPr>
+          <a:xfrm>
+            <a:off x="3564576" y="2201393"/>
+            <a:ext cx="1173680" cy="646331"/>
+          </a:xfrm>
+          <a:prstGeom prst="rect">
+            <a:avLst/>
+          </a:prstGeom>
+          <a:noFill/>
+        </p:spPr>
+        <p:txBody>
+          <a:bodyPr wrap="square" rtlCol="0">
+            <a:spAutoFit/>
+          </a:bodyPr>
+          <a:lstStyle/>
+          <a:p>
+            <a:pPr algn="ctr"/>
+            <a:r>
+              <a:rPr lang="en-US" dirty="0">
+                <a:latin typeface="Arial" panose="020B0604020202020204" pitchFamily="34" charset="0"/>
+                <a:cs typeface="Arial" panose="020B0604020202020204" pitchFamily="34" charset="0"/>
+              </a:rPr>
+              <a:t>Migratory distance</a:t>
+            </a:r>
+          </a:p>
+        </p:txBody>
+      </p:sp>
+      <p:sp>
+        <p:nvSpPr>
+          <p:cNvPr id="9" name="TextBox 8">
+            <a:extLst>
+              <a:ext uri="{FF2B5EF4-FFF2-40B4-BE49-F238E27FC236}">
+                <a16:creationId xmlns:a16="http://schemas.microsoft.com/office/drawing/2014/main" id="{1E601120-75B5-5749-850E-37BB69F4F026}"/>
+              </a:ext>
+            </a:extLst>
+          </p:cNvPr>
+          <p:cNvSpPr txBox="1"/>
+          <p:nvPr/>
+        </p:nvSpPr>
+        <p:spPr>
+          <a:xfrm>
+            <a:off x="7197632" y="2894154"/>
+            <a:ext cx="1191690" cy="369332"/>
+          </a:xfrm>
+          <a:prstGeom prst="rect">
+            <a:avLst/>
+          </a:prstGeom>
+          <a:noFill/>
+        </p:spPr>
+        <p:txBody>
+          <a:bodyPr wrap="square" rtlCol="0">
+            <a:spAutoFit/>
+          </a:bodyPr>
+          <a:lstStyle/>
+          <a:p>
+            <a:r>
+              <a:rPr lang="en-US" dirty="0">
+                <a:latin typeface="Arial" panose="020B0604020202020204" pitchFamily="34" charset="0"/>
+                <a:cs typeface="Arial" panose="020B0604020202020204" pitchFamily="34" charset="0"/>
+              </a:rPr>
+              <a:t>R</a:t>
+            </a:r>
+            <a:r>
+              <a:rPr lang="en-US" baseline="30000" dirty="0">
+                <a:latin typeface="Arial" panose="020B0604020202020204" pitchFamily="34" charset="0"/>
+                <a:cs typeface="Arial" panose="020B0604020202020204" pitchFamily="34" charset="0"/>
+              </a:rPr>
+              <a:t>2</a:t>
+            </a:r>
+            <a:r>
+              <a:rPr lang="en-US" dirty="0">
+                <a:latin typeface="Arial" panose="020B0604020202020204" pitchFamily="34" charset="0"/>
+                <a:cs typeface="Arial" panose="020B0604020202020204" pitchFamily="34" charset="0"/>
+              </a:rPr>
+              <a:t> = 0.05</a:t>
+            </a:r>
+          </a:p>
+        </p:txBody>
+      </p:sp>
+      <p:sp>
+        <p:nvSpPr>
+          <p:cNvPr id="10" name="TextBox 9">
+            <a:extLst>
+              <a:ext uri="{FF2B5EF4-FFF2-40B4-BE49-F238E27FC236}">
+                <a16:creationId xmlns:a16="http://schemas.microsoft.com/office/drawing/2014/main" id="{0D888F98-CF7C-0346-818A-B2A92BCEBF31}"/>
+              </a:ext>
+            </a:extLst>
+          </p:cNvPr>
+          <p:cNvSpPr txBox="1"/>
+          <p:nvPr/>
+        </p:nvSpPr>
+        <p:spPr>
+          <a:xfrm>
+            <a:off x="3681841" y="2847724"/>
+            <a:ext cx="1191690" cy="369332"/>
+          </a:xfrm>
+          <a:prstGeom prst="rect">
+            <a:avLst/>
+          </a:prstGeom>
+          <a:noFill/>
+        </p:spPr>
+        <p:txBody>
+          <a:bodyPr wrap="square" rtlCol="0">
+            <a:spAutoFit/>
+          </a:bodyPr>
+          <a:lstStyle/>
+          <a:p>
+            <a:r>
+              <a:rPr lang="en-US" dirty="0">
+                <a:latin typeface="Arial" panose="020B0604020202020204" pitchFamily="34" charset="0"/>
+                <a:cs typeface="Arial" panose="020B0604020202020204" pitchFamily="34" charset="0"/>
+              </a:rPr>
+              <a:t>R</a:t>
+            </a:r>
+            <a:r>
+              <a:rPr lang="en-US" baseline="30000" dirty="0">
+                <a:latin typeface="Arial" panose="020B0604020202020204" pitchFamily="34" charset="0"/>
+                <a:cs typeface="Arial" panose="020B0604020202020204" pitchFamily="34" charset="0"/>
+              </a:rPr>
+              <a:t>2</a:t>
+            </a:r>
+            <a:r>
+              <a:rPr lang="en-US" dirty="0">
+                <a:latin typeface="Arial" panose="020B0604020202020204" pitchFamily="34" charset="0"/>
+                <a:cs typeface="Arial" panose="020B0604020202020204" pitchFamily="34" charset="0"/>
+              </a:rPr>
+              <a:t> = 0.03</a:t>
+            </a:r>
+          </a:p>
+        </p:txBody>
+      </p:sp>
+      <p:sp>
+        <p:nvSpPr>
+          <p:cNvPr id="11" name="TextBox 10">
+            <a:extLst>
+              <a:ext uri="{FF2B5EF4-FFF2-40B4-BE49-F238E27FC236}">
+                <a16:creationId xmlns:a16="http://schemas.microsoft.com/office/drawing/2014/main" id="{5D136E10-03A2-F545-A119-5BEAD2691EC4}"/>
+              </a:ext>
+            </a:extLst>
+          </p:cNvPr>
+          <p:cNvSpPr txBox="1"/>
+          <p:nvPr/>
+        </p:nvSpPr>
+        <p:spPr>
+          <a:xfrm>
+            <a:off x="3964775" y="3889145"/>
+            <a:ext cx="1191690" cy="369332"/>
+          </a:xfrm>
+          <a:prstGeom prst="rect">
+            <a:avLst/>
+          </a:prstGeom>
+          <a:noFill/>
+        </p:spPr>
+        <p:txBody>
+          <a:bodyPr wrap="square" rtlCol="0">
+            <a:spAutoFit/>
+          </a:bodyPr>
+          <a:lstStyle/>
+          <a:p>
+            <a:r>
+              <a:rPr lang="en-US" dirty="0">
+                <a:latin typeface="Arial" panose="020B0604020202020204" pitchFamily="34" charset="0"/>
+                <a:cs typeface="Arial" panose="020B0604020202020204" pitchFamily="34" charset="0"/>
+              </a:rPr>
+              <a:t>R</a:t>
+            </a:r>
+            <a:r>
+              <a:rPr lang="en-US" baseline="30000" dirty="0">
+                <a:latin typeface="Arial" panose="020B0604020202020204" pitchFamily="34" charset="0"/>
+                <a:cs typeface="Arial" panose="020B0604020202020204" pitchFamily="34" charset="0"/>
+              </a:rPr>
+              <a:t>2</a:t>
+            </a:r>
+            <a:r>
+              <a:rPr lang="en-US" dirty="0">
+                <a:latin typeface="Arial" panose="020B0604020202020204" pitchFamily="34" charset="0"/>
+                <a:cs typeface="Arial" panose="020B0604020202020204" pitchFamily="34" charset="0"/>
+              </a:rPr>
+              <a:t> = 0.00</a:t>
+            </a:r>
+          </a:p>
+        </p:txBody>
+      </p:sp>
+      <p:sp>
+        <p:nvSpPr>
+          <p:cNvPr id="13" name="TextBox 12">
+            <a:extLst>
+              <a:ext uri="{FF2B5EF4-FFF2-40B4-BE49-F238E27FC236}">
+                <a16:creationId xmlns:a16="http://schemas.microsoft.com/office/drawing/2014/main" id="{1ABC6687-76B3-B042-A4FC-8BFFF12A1B71}"/>
+              </a:ext>
+            </a:extLst>
+          </p:cNvPr>
+          <p:cNvSpPr txBox="1"/>
+          <p:nvPr/>
+        </p:nvSpPr>
+        <p:spPr>
+          <a:xfrm>
+            <a:off x="6847107" y="5227058"/>
+            <a:ext cx="1698668" cy="369332"/>
+          </a:xfrm>
+          <a:prstGeom prst="rect">
+            <a:avLst/>
+          </a:prstGeom>
+          <a:noFill/>
+        </p:spPr>
+        <p:txBody>
+          <a:bodyPr wrap="square" rtlCol="0">
+            <a:spAutoFit/>
+          </a:bodyPr>
+          <a:lstStyle/>
+          <a:p>
+            <a:r>
+              <a:rPr lang="en-US" dirty="0">
+                <a:latin typeface="Arial" panose="020B0604020202020204" pitchFamily="34" charset="0"/>
+                <a:cs typeface="Arial" panose="020B0604020202020204" pitchFamily="34" charset="0"/>
+              </a:rPr>
+              <a:t>Total R</a:t>
+            </a:r>
+            <a:r>
+              <a:rPr lang="en-US" baseline="30000" dirty="0">
+                <a:latin typeface="Arial" panose="020B0604020202020204" pitchFamily="34" charset="0"/>
+                <a:cs typeface="Arial" panose="020B0604020202020204" pitchFamily="34" charset="0"/>
+              </a:rPr>
+              <a:t>2</a:t>
+            </a:r>
+            <a:r>
+              <a:rPr lang="en-US" dirty="0">
+                <a:latin typeface="Arial" panose="020B0604020202020204" pitchFamily="34" charset="0"/>
+                <a:cs typeface="Arial" panose="020B0604020202020204" pitchFamily="34" charset="0"/>
+              </a:rPr>
+              <a:t> = 0.05</a:t>
+            </a:r>
+          </a:p>
+        </p:txBody>
+      </p:sp>
+      <p:sp>
+        <p:nvSpPr>
+          <p:cNvPr id="14" name="TextBox 13">
+            <a:extLst>
+              <a:ext uri="{FF2B5EF4-FFF2-40B4-BE49-F238E27FC236}">
+                <a16:creationId xmlns:a16="http://schemas.microsoft.com/office/drawing/2014/main" id="{B2E904DA-61D3-5D47-AD47-932D13DDF817}"/>
+              </a:ext>
+            </a:extLst>
+          </p:cNvPr>
+          <p:cNvSpPr txBox="1"/>
+          <p:nvPr/>
+        </p:nvSpPr>
+        <p:spPr>
+          <a:xfrm>
+            <a:off x="3062569" y="853239"/>
+            <a:ext cx="2430234" cy="646331"/>
+          </a:xfrm>
+          <a:prstGeom prst="rect">
+            <a:avLst/>
+          </a:prstGeom>
+          <a:noFill/>
+        </p:spPr>
+        <p:txBody>
+          <a:bodyPr wrap="square" rtlCol="0">
+            <a:spAutoFit/>
+          </a:bodyPr>
+          <a:lstStyle/>
+          <a:p>
+            <a:r>
+              <a:rPr lang="en-US" dirty="0">
+                <a:latin typeface="Arial" panose="020B0604020202020204" pitchFamily="34" charset="0"/>
+                <a:cs typeface="Arial" panose="020B0604020202020204" pitchFamily="34" charset="0"/>
+              </a:rPr>
+              <a:t>Response: </a:t>
+            </a:r>
+          </a:p>
+          <a:p>
+            <a:r>
+              <a:rPr lang="en-US" dirty="0">
+                <a:latin typeface="Arial" panose="020B0604020202020204" pitchFamily="34" charset="0"/>
+                <a:cs typeface="Arial" panose="020B0604020202020204" pitchFamily="34" charset="0"/>
+              </a:rPr>
+              <a:t>Population trend</a:t>
+            </a:r>
+          </a:p>
+        </p:txBody>
+      </p:sp>
+      <p:sp>
+        <p:nvSpPr>
+          <p:cNvPr id="15" name="TextBox 14">
+            <a:extLst>
+              <a:ext uri="{FF2B5EF4-FFF2-40B4-BE49-F238E27FC236}">
+                <a16:creationId xmlns:a16="http://schemas.microsoft.com/office/drawing/2014/main" id="{931B04C7-4682-484D-8E28-42E78AF540F6}"/>
+              </a:ext>
+            </a:extLst>
+          </p:cNvPr>
+          <p:cNvSpPr txBox="1"/>
+          <p:nvPr/>
+        </p:nvSpPr>
+        <p:spPr>
+          <a:xfrm>
+            <a:off x="5438251" y="4073811"/>
+            <a:ext cx="1191690" cy="369332"/>
+          </a:xfrm>
+          <a:prstGeom prst="rect">
+            <a:avLst/>
+          </a:prstGeom>
+          <a:noFill/>
+        </p:spPr>
+        <p:txBody>
+          <a:bodyPr wrap="square" rtlCol="0">
+            <a:spAutoFit/>
+          </a:bodyPr>
+          <a:lstStyle/>
+          <a:p>
+            <a:r>
+              <a:rPr lang="en-US" dirty="0">
+                <a:latin typeface="Arial" panose="020B0604020202020204" pitchFamily="34" charset="0"/>
+                <a:cs typeface="Arial" panose="020B0604020202020204" pitchFamily="34" charset="0"/>
+              </a:rPr>
+              <a:t>R</a:t>
+            </a:r>
+            <a:r>
+              <a:rPr lang="en-US" baseline="30000" dirty="0">
+                <a:latin typeface="Arial" panose="020B0604020202020204" pitchFamily="34" charset="0"/>
+                <a:cs typeface="Arial" panose="020B0604020202020204" pitchFamily="34" charset="0"/>
+              </a:rPr>
+              <a:t>2</a:t>
+            </a:r>
+            <a:r>
+              <a:rPr lang="en-US" dirty="0">
+                <a:latin typeface="Arial" panose="020B0604020202020204" pitchFamily="34" charset="0"/>
+                <a:cs typeface="Arial" panose="020B0604020202020204" pitchFamily="34" charset="0"/>
+              </a:rPr>
+              <a:t> = 0.00</a:t>
+            </a:r>
+          </a:p>
+        </p:txBody>
+      </p:sp>
     </p:spTree>
     <p:extLst>
       <p:ext uri="{BB962C8B-B14F-4D97-AF65-F5344CB8AC3E}">
         <p14:creationId xmlns:p14="http://schemas.microsoft.com/office/powerpoint/2010/main" val="2114340536"/>
+      </p:ext>
+    </p:extLst>
+  </p:cSld>
+  <p:clrMapOvr>
+    <a:masterClrMapping/>
+  </p:clrMapOvr>
+</p:sld>
+</file>
+
+<file path=ppt/slides/slide3.xml><?xml version="1.0" encoding="utf-8"?>
+<p:sld xmlns:a="http://schemas.openxmlformats.org/drawingml/2006/main" xmlns:r="http://schemas.openxmlformats.org/officeDocument/2006/relationships" xmlns:p="http://schemas.openxmlformats.org/presentationml/2006/main">
+  <p:cSld>
+    <p:spTree>
+      <p:nvGrpSpPr>
+        <p:cNvPr id="1" name=""/>
+        <p:cNvGrpSpPr/>
+        <p:nvPr/>
+      </p:nvGrpSpPr>
+      <p:grpSpPr>
+        <a:xfrm>
+          <a:off x="0" y="0"/>
+          <a:ext cx="0" cy="0"/>
+          <a:chOff x="0" y="0"/>
+          <a:chExt cx="0" cy="0"/>
+        </a:xfrm>
+      </p:grpSpPr>
+      <p:sp>
+        <p:nvSpPr>
+          <p:cNvPr id="2" name="Oval 1">
+            <a:extLst>
+              <a:ext uri="{FF2B5EF4-FFF2-40B4-BE49-F238E27FC236}">
+                <a16:creationId xmlns:a16="http://schemas.microsoft.com/office/drawing/2014/main" id="{ABDFBAC5-1D7C-4844-B9F9-941E6CABA206}"/>
+              </a:ext>
+            </a:extLst>
+          </p:cNvPr>
+          <p:cNvSpPr/>
+          <p:nvPr/>
+        </p:nvSpPr>
+        <p:spPr>
+          <a:xfrm>
+            <a:off x="3258293" y="1696686"/>
+            <a:ext cx="2604654" cy="2740232"/>
+          </a:xfrm>
+          <a:prstGeom prst="ellipse">
+            <a:avLst/>
+          </a:prstGeom>
+          <a:noFill/>
+          <a:ln>
+            <a:solidFill>
+              <a:schemeClr val="tx1"/>
+            </a:solidFill>
+          </a:ln>
+        </p:spPr>
+        <p:style>
+          <a:lnRef idx="2">
+            <a:schemeClr val="accent1">
+              <a:shade val="50000"/>
+            </a:schemeClr>
+          </a:lnRef>
+          <a:fillRef idx="1">
+            <a:schemeClr val="accent1"/>
+          </a:fillRef>
+          <a:effectRef idx="0">
+            <a:schemeClr val="accent1"/>
+          </a:effectRef>
+          <a:fontRef idx="minor">
+            <a:schemeClr val="lt1"/>
+          </a:fontRef>
+        </p:style>
+        <p:txBody>
+          <a:bodyPr rtlCol="0" anchor="ctr"/>
+          <a:lstStyle/>
+          <a:p>
+            <a:pPr algn="ctr"/>
+            <a:endParaRPr lang="en-US"/>
+          </a:p>
+        </p:txBody>
+      </p:sp>
+      <p:sp>
+        <p:nvSpPr>
+          <p:cNvPr id="3" name="Oval 2">
+            <a:extLst>
+              <a:ext uri="{FF2B5EF4-FFF2-40B4-BE49-F238E27FC236}">
+                <a16:creationId xmlns:a16="http://schemas.microsoft.com/office/drawing/2014/main" id="{50F6445B-A35C-1549-949B-2546B11108E8}"/>
+              </a:ext>
+            </a:extLst>
+          </p:cNvPr>
+          <p:cNvSpPr/>
+          <p:nvPr/>
+        </p:nvSpPr>
+        <p:spPr>
+          <a:xfrm>
+            <a:off x="4846120" y="945572"/>
+            <a:ext cx="4360225" cy="4099956"/>
+          </a:xfrm>
+          <a:prstGeom prst="ellipse">
+            <a:avLst/>
+          </a:prstGeom>
+          <a:noFill/>
+          <a:ln>
+            <a:solidFill>
+              <a:schemeClr val="tx1"/>
+            </a:solidFill>
+          </a:ln>
+        </p:spPr>
+        <p:style>
+          <a:lnRef idx="2">
+            <a:schemeClr val="accent1">
+              <a:shade val="50000"/>
+            </a:schemeClr>
+          </a:lnRef>
+          <a:fillRef idx="1">
+            <a:schemeClr val="accent1"/>
+          </a:fillRef>
+          <a:effectRef idx="0">
+            <a:schemeClr val="accent1"/>
+          </a:effectRef>
+          <a:fontRef idx="minor">
+            <a:schemeClr val="lt1"/>
+          </a:fontRef>
+        </p:style>
+        <p:txBody>
+          <a:bodyPr rtlCol="0" anchor="ctr"/>
+          <a:lstStyle/>
+          <a:p>
+            <a:pPr algn="ctr"/>
+            <a:endParaRPr lang="en-US"/>
+          </a:p>
+        </p:txBody>
+      </p:sp>
+      <p:sp>
+        <p:nvSpPr>
+          <p:cNvPr id="4" name="Oval 3">
+            <a:extLst>
+              <a:ext uri="{FF2B5EF4-FFF2-40B4-BE49-F238E27FC236}">
+                <a16:creationId xmlns:a16="http://schemas.microsoft.com/office/drawing/2014/main" id="{C8F89E68-3A52-8247-A1FE-A8CF47352C31}"/>
+              </a:ext>
+            </a:extLst>
+          </p:cNvPr>
+          <p:cNvSpPr/>
+          <p:nvPr/>
+        </p:nvSpPr>
+        <p:spPr>
+          <a:xfrm>
+            <a:off x="3906982" y="2995550"/>
+            <a:ext cx="2854035" cy="2882736"/>
+          </a:xfrm>
+          <a:prstGeom prst="ellipse">
+            <a:avLst/>
+          </a:prstGeom>
+          <a:noFill/>
+          <a:ln>
+            <a:solidFill>
+              <a:schemeClr val="tx1"/>
+            </a:solidFill>
+          </a:ln>
+        </p:spPr>
+        <p:style>
+          <a:lnRef idx="2">
+            <a:schemeClr val="accent1">
+              <a:shade val="50000"/>
+            </a:schemeClr>
+          </a:lnRef>
+          <a:fillRef idx="1">
+            <a:schemeClr val="accent1"/>
+          </a:fillRef>
+          <a:effectRef idx="0">
+            <a:schemeClr val="accent1"/>
+          </a:effectRef>
+          <a:fontRef idx="minor">
+            <a:schemeClr val="lt1"/>
+          </a:fontRef>
+        </p:style>
+        <p:txBody>
+          <a:bodyPr rtlCol="0" anchor="ctr"/>
+          <a:lstStyle/>
+          <a:p>
+            <a:pPr algn="ctr"/>
+            <a:endParaRPr lang="en-US"/>
+          </a:p>
+        </p:txBody>
+      </p:sp>
+      <p:sp>
+        <p:nvSpPr>
+          <p:cNvPr id="5" name="TextBox 4">
+            <a:extLst>
+              <a:ext uri="{FF2B5EF4-FFF2-40B4-BE49-F238E27FC236}">
+                <a16:creationId xmlns:a16="http://schemas.microsoft.com/office/drawing/2014/main" id="{468C6069-BA96-9E40-8437-18F5A8D5A767}"/>
+              </a:ext>
+            </a:extLst>
+          </p:cNvPr>
+          <p:cNvSpPr txBox="1"/>
+          <p:nvPr/>
+        </p:nvSpPr>
+        <p:spPr>
+          <a:xfrm>
+            <a:off x="6923314" y="2527958"/>
+            <a:ext cx="1840675" cy="369332"/>
+          </a:xfrm>
+          <a:prstGeom prst="rect">
+            <a:avLst/>
+          </a:prstGeom>
+          <a:noFill/>
+        </p:spPr>
+        <p:txBody>
+          <a:bodyPr wrap="square" rtlCol="0">
+            <a:spAutoFit/>
+          </a:bodyPr>
+          <a:lstStyle/>
+          <a:p>
+            <a:r>
+              <a:rPr lang="en-US" dirty="0">
+                <a:latin typeface="Arial" panose="020B0604020202020204" pitchFamily="34" charset="0"/>
+                <a:cs typeface="Arial" panose="020B0604020202020204" pitchFamily="34" charset="0"/>
+              </a:rPr>
+              <a:t>Niche breadth</a:t>
+            </a:r>
+          </a:p>
+        </p:txBody>
+      </p:sp>
+      <p:sp>
+        <p:nvSpPr>
+          <p:cNvPr id="6" name="TextBox 5">
+            <a:extLst>
+              <a:ext uri="{FF2B5EF4-FFF2-40B4-BE49-F238E27FC236}">
+                <a16:creationId xmlns:a16="http://schemas.microsoft.com/office/drawing/2014/main" id="{AA65B116-EA42-DE4A-AFA1-1F5F883DF204}"/>
+              </a:ext>
+            </a:extLst>
+          </p:cNvPr>
+          <p:cNvSpPr txBox="1"/>
+          <p:nvPr/>
+        </p:nvSpPr>
+        <p:spPr>
+          <a:xfrm>
+            <a:off x="4413661" y="4907909"/>
+            <a:ext cx="1840675" cy="369332"/>
+          </a:xfrm>
+          <a:prstGeom prst="rect">
+            <a:avLst/>
+          </a:prstGeom>
+          <a:noFill/>
+        </p:spPr>
+        <p:txBody>
+          <a:bodyPr wrap="square" rtlCol="0">
+            <a:spAutoFit/>
+          </a:bodyPr>
+          <a:lstStyle/>
+          <a:p>
+            <a:r>
+              <a:rPr lang="en-US" dirty="0">
+                <a:latin typeface="Arial" panose="020B0604020202020204" pitchFamily="34" charset="0"/>
+                <a:cs typeface="Arial" panose="020B0604020202020204" pitchFamily="34" charset="0"/>
+              </a:rPr>
+              <a:t>Body size</a:t>
+            </a:r>
+          </a:p>
+        </p:txBody>
+      </p:sp>
+      <p:sp>
+        <p:nvSpPr>
+          <p:cNvPr id="7" name="TextBox 6">
+            <a:extLst>
+              <a:ext uri="{FF2B5EF4-FFF2-40B4-BE49-F238E27FC236}">
+                <a16:creationId xmlns:a16="http://schemas.microsoft.com/office/drawing/2014/main" id="{A72E2609-B025-0840-BB63-D989569E86F1}"/>
+              </a:ext>
+            </a:extLst>
+          </p:cNvPr>
+          <p:cNvSpPr txBox="1"/>
+          <p:nvPr/>
+        </p:nvSpPr>
+        <p:spPr>
+          <a:xfrm>
+            <a:off x="3564576" y="2201393"/>
+            <a:ext cx="1173680" cy="646331"/>
+          </a:xfrm>
+          <a:prstGeom prst="rect">
+            <a:avLst/>
+          </a:prstGeom>
+          <a:noFill/>
+        </p:spPr>
+        <p:txBody>
+          <a:bodyPr wrap="square" rtlCol="0">
+            <a:spAutoFit/>
+          </a:bodyPr>
+          <a:lstStyle/>
+          <a:p>
+            <a:pPr algn="ctr"/>
+            <a:r>
+              <a:rPr lang="en-US" dirty="0">
+                <a:latin typeface="Arial" panose="020B0604020202020204" pitchFamily="34" charset="0"/>
+                <a:cs typeface="Arial" panose="020B0604020202020204" pitchFamily="34" charset="0"/>
+              </a:rPr>
+              <a:t>Migratory distance</a:t>
+            </a:r>
+          </a:p>
+        </p:txBody>
+      </p:sp>
+      <p:sp>
+        <p:nvSpPr>
+          <p:cNvPr id="9" name="TextBox 8">
+            <a:extLst>
+              <a:ext uri="{FF2B5EF4-FFF2-40B4-BE49-F238E27FC236}">
+                <a16:creationId xmlns:a16="http://schemas.microsoft.com/office/drawing/2014/main" id="{1E601120-75B5-5749-850E-37BB69F4F026}"/>
+              </a:ext>
+            </a:extLst>
+          </p:cNvPr>
+          <p:cNvSpPr txBox="1"/>
+          <p:nvPr/>
+        </p:nvSpPr>
+        <p:spPr>
+          <a:xfrm>
+            <a:off x="7197632" y="2894154"/>
+            <a:ext cx="1191690" cy="369332"/>
+          </a:xfrm>
+          <a:prstGeom prst="rect">
+            <a:avLst/>
+          </a:prstGeom>
+          <a:noFill/>
+        </p:spPr>
+        <p:txBody>
+          <a:bodyPr wrap="square" rtlCol="0">
+            <a:spAutoFit/>
+          </a:bodyPr>
+          <a:lstStyle/>
+          <a:p>
+            <a:r>
+              <a:rPr lang="en-US" dirty="0">
+                <a:latin typeface="Arial" panose="020B0604020202020204" pitchFamily="34" charset="0"/>
+                <a:cs typeface="Arial" panose="020B0604020202020204" pitchFamily="34" charset="0"/>
+              </a:rPr>
+              <a:t>R</a:t>
+            </a:r>
+            <a:r>
+              <a:rPr lang="en-US" baseline="30000" dirty="0">
+                <a:latin typeface="Arial" panose="020B0604020202020204" pitchFamily="34" charset="0"/>
+                <a:cs typeface="Arial" panose="020B0604020202020204" pitchFamily="34" charset="0"/>
+              </a:rPr>
+              <a:t>2</a:t>
+            </a:r>
+            <a:r>
+              <a:rPr lang="en-US" dirty="0">
+                <a:latin typeface="Arial" panose="020B0604020202020204" pitchFamily="34" charset="0"/>
+                <a:cs typeface="Arial" panose="020B0604020202020204" pitchFamily="34" charset="0"/>
+              </a:rPr>
+              <a:t> = 0.08</a:t>
+            </a:r>
+          </a:p>
+        </p:txBody>
+      </p:sp>
+      <p:sp>
+        <p:nvSpPr>
+          <p:cNvPr id="10" name="TextBox 9">
+            <a:extLst>
+              <a:ext uri="{FF2B5EF4-FFF2-40B4-BE49-F238E27FC236}">
+                <a16:creationId xmlns:a16="http://schemas.microsoft.com/office/drawing/2014/main" id="{0D888F98-CF7C-0346-818A-B2A92BCEBF31}"/>
+              </a:ext>
+            </a:extLst>
+          </p:cNvPr>
+          <p:cNvSpPr txBox="1"/>
+          <p:nvPr/>
+        </p:nvSpPr>
+        <p:spPr>
+          <a:xfrm>
+            <a:off x="3681841" y="2847724"/>
+            <a:ext cx="1191690" cy="369332"/>
+          </a:xfrm>
+          <a:prstGeom prst="rect">
+            <a:avLst/>
+          </a:prstGeom>
+          <a:noFill/>
+        </p:spPr>
+        <p:txBody>
+          <a:bodyPr wrap="square" rtlCol="0">
+            <a:spAutoFit/>
+          </a:bodyPr>
+          <a:lstStyle/>
+          <a:p>
+            <a:r>
+              <a:rPr lang="en-US" dirty="0">
+                <a:latin typeface="Arial" panose="020B0604020202020204" pitchFamily="34" charset="0"/>
+                <a:cs typeface="Arial" panose="020B0604020202020204" pitchFamily="34" charset="0"/>
+              </a:rPr>
+              <a:t>R</a:t>
+            </a:r>
+            <a:r>
+              <a:rPr lang="en-US" baseline="30000" dirty="0">
+                <a:latin typeface="Arial" panose="020B0604020202020204" pitchFamily="34" charset="0"/>
+                <a:cs typeface="Arial" panose="020B0604020202020204" pitchFamily="34" charset="0"/>
+              </a:rPr>
+              <a:t>2</a:t>
+            </a:r>
+            <a:r>
+              <a:rPr lang="en-US" dirty="0">
+                <a:latin typeface="Arial" panose="020B0604020202020204" pitchFamily="34" charset="0"/>
+                <a:cs typeface="Arial" panose="020B0604020202020204" pitchFamily="34" charset="0"/>
+              </a:rPr>
+              <a:t> = 0.01</a:t>
+            </a:r>
+          </a:p>
+        </p:txBody>
+      </p:sp>
+      <p:sp>
+        <p:nvSpPr>
+          <p:cNvPr id="11" name="TextBox 10">
+            <a:extLst>
+              <a:ext uri="{FF2B5EF4-FFF2-40B4-BE49-F238E27FC236}">
+                <a16:creationId xmlns:a16="http://schemas.microsoft.com/office/drawing/2014/main" id="{5D136E10-03A2-F545-A119-5BEAD2691EC4}"/>
+              </a:ext>
+            </a:extLst>
+          </p:cNvPr>
+          <p:cNvSpPr txBox="1"/>
+          <p:nvPr/>
+        </p:nvSpPr>
+        <p:spPr>
+          <a:xfrm>
+            <a:off x="4842406" y="5227058"/>
+            <a:ext cx="1191690" cy="369332"/>
+          </a:xfrm>
+          <a:prstGeom prst="rect">
+            <a:avLst/>
+          </a:prstGeom>
+          <a:noFill/>
+        </p:spPr>
+        <p:txBody>
+          <a:bodyPr wrap="square" rtlCol="0">
+            <a:spAutoFit/>
+          </a:bodyPr>
+          <a:lstStyle/>
+          <a:p>
+            <a:r>
+              <a:rPr lang="en-US" dirty="0">
+                <a:latin typeface="Arial" panose="020B0604020202020204" pitchFamily="34" charset="0"/>
+                <a:cs typeface="Arial" panose="020B0604020202020204" pitchFamily="34" charset="0"/>
+              </a:rPr>
+              <a:t>R</a:t>
+            </a:r>
+            <a:r>
+              <a:rPr lang="en-US" baseline="30000" dirty="0">
+                <a:latin typeface="Arial" panose="020B0604020202020204" pitchFamily="34" charset="0"/>
+                <a:cs typeface="Arial" panose="020B0604020202020204" pitchFamily="34" charset="0"/>
+              </a:rPr>
+              <a:t>2</a:t>
+            </a:r>
+            <a:r>
+              <a:rPr lang="en-US" dirty="0">
+                <a:latin typeface="Arial" panose="020B0604020202020204" pitchFamily="34" charset="0"/>
+                <a:cs typeface="Arial" panose="020B0604020202020204" pitchFamily="34" charset="0"/>
+              </a:rPr>
+              <a:t> = 0.02</a:t>
+            </a:r>
+          </a:p>
+        </p:txBody>
+      </p:sp>
+      <p:sp>
+        <p:nvSpPr>
+          <p:cNvPr id="12" name="TextBox 11">
+            <a:extLst>
+              <a:ext uri="{FF2B5EF4-FFF2-40B4-BE49-F238E27FC236}">
+                <a16:creationId xmlns:a16="http://schemas.microsoft.com/office/drawing/2014/main" id="{635EA56D-DF4F-6F4A-A26E-A3B901D534A4}"/>
+              </a:ext>
+            </a:extLst>
+          </p:cNvPr>
+          <p:cNvSpPr txBox="1"/>
+          <p:nvPr/>
+        </p:nvSpPr>
+        <p:spPr>
+          <a:xfrm>
+            <a:off x="4779121" y="2650608"/>
+            <a:ext cx="1191690" cy="369332"/>
+          </a:xfrm>
+          <a:prstGeom prst="rect">
+            <a:avLst/>
+          </a:prstGeom>
+          <a:noFill/>
+        </p:spPr>
+        <p:txBody>
+          <a:bodyPr wrap="square" rtlCol="0">
+            <a:spAutoFit/>
+          </a:bodyPr>
+          <a:lstStyle/>
+          <a:p>
+            <a:r>
+              <a:rPr lang="en-US" dirty="0">
+                <a:latin typeface="Arial" panose="020B0604020202020204" pitchFamily="34" charset="0"/>
+                <a:cs typeface="Arial" panose="020B0604020202020204" pitchFamily="34" charset="0"/>
+              </a:rPr>
+              <a:t>R</a:t>
+            </a:r>
+            <a:r>
+              <a:rPr lang="en-US" baseline="30000" dirty="0">
+                <a:latin typeface="Arial" panose="020B0604020202020204" pitchFamily="34" charset="0"/>
+                <a:cs typeface="Arial" panose="020B0604020202020204" pitchFamily="34" charset="0"/>
+              </a:rPr>
+              <a:t>2</a:t>
+            </a:r>
+            <a:r>
+              <a:rPr lang="en-US" dirty="0">
+                <a:latin typeface="Arial" panose="020B0604020202020204" pitchFamily="34" charset="0"/>
+                <a:cs typeface="Arial" panose="020B0604020202020204" pitchFamily="34" charset="0"/>
+              </a:rPr>
+              <a:t> = 0.05</a:t>
+            </a:r>
+          </a:p>
+        </p:txBody>
+      </p:sp>
+      <p:sp>
+        <p:nvSpPr>
+          <p:cNvPr id="13" name="TextBox 12">
+            <a:extLst>
+              <a:ext uri="{FF2B5EF4-FFF2-40B4-BE49-F238E27FC236}">
+                <a16:creationId xmlns:a16="http://schemas.microsoft.com/office/drawing/2014/main" id="{1ABC6687-76B3-B042-A4FC-8BFFF12A1B71}"/>
+              </a:ext>
+            </a:extLst>
+          </p:cNvPr>
+          <p:cNvSpPr txBox="1"/>
+          <p:nvPr/>
+        </p:nvSpPr>
+        <p:spPr>
+          <a:xfrm>
+            <a:off x="6847107" y="5227058"/>
+            <a:ext cx="1698668" cy="369332"/>
+          </a:xfrm>
+          <a:prstGeom prst="rect">
+            <a:avLst/>
+          </a:prstGeom>
+          <a:noFill/>
+        </p:spPr>
+        <p:txBody>
+          <a:bodyPr wrap="square" rtlCol="0">
+            <a:spAutoFit/>
+          </a:bodyPr>
+          <a:lstStyle/>
+          <a:p>
+            <a:r>
+              <a:rPr lang="en-US" dirty="0">
+                <a:latin typeface="Arial" panose="020B0604020202020204" pitchFamily="34" charset="0"/>
+                <a:cs typeface="Arial" panose="020B0604020202020204" pitchFamily="34" charset="0"/>
+              </a:rPr>
+              <a:t>Total R</a:t>
+            </a:r>
+            <a:r>
+              <a:rPr lang="en-US" baseline="30000" dirty="0">
+                <a:latin typeface="Arial" panose="020B0604020202020204" pitchFamily="34" charset="0"/>
+                <a:cs typeface="Arial" panose="020B0604020202020204" pitchFamily="34" charset="0"/>
+              </a:rPr>
+              <a:t>2</a:t>
+            </a:r>
+            <a:r>
+              <a:rPr lang="en-US" dirty="0">
+                <a:latin typeface="Arial" panose="020B0604020202020204" pitchFamily="34" charset="0"/>
+                <a:cs typeface="Arial" panose="020B0604020202020204" pitchFamily="34" charset="0"/>
+              </a:rPr>
+              <a:t> = 0.13</a:t>
+            </a:r>
+          </a:p>
+        </p:txBody>
+      </p:sp>
+      <p:sp>
+        <p:nvSpPr>
+          <p:cNvPr id="14" name="TextBox 13">
+            <a:extLst>
+              <a:ext uri="{FF2B5EF4-FFF2-40B4-BE49-F238E27FC236}">
+                <a16:creationId xmlns:a16="http://schemas.microsoft.com/office/drawing/2014/main" id="{B2E904DA-61D3-5D47-AD47-932D13DDF817}"/>
+              </a:ext>
+            </a:extLst>
+          </p:cNvPr>
+          <p:cNvSpPr txBox="1"/>
+          <p:nvPr/>
+        </p:nvSpPr>
+        <p:spPr>
+          <a:xfrm>
+            <a:off x="3062569" y="853239"/>
+            <a:ext cx="2430234" cy="646331"/>
+          </a:xfrm>
+          <a:prstGeom prst="rect">
+            <a:avLst/>
+          </a:prstGeom>
+          <a:noFill/>
+        </p:spPr>
+        <p:txBody>
+          <a:bodyPr wrap="square" rtlCol="0">
+            <a:spAutoFit/>
+          </a:bodyPr>
+          <a:lstStyle/>
+          <a:p>
+            <a:r>
+              <a:rPr lang="en-US" dirty="0">
+                <a:latin typeface="Arial" panose="020B0604020202020204" pitchFamily="34" charset="0"/>
+                <a:cs typeface="Arial" panose="020B0604020202020204" pitchFamily="34" charset="0"/>
+              </a:rPr>
+              <a:t>Response: </a:t>
+            </a:r>
+          </a:p>
+          <a:p>
+            <a:r>
+              <a:rPr lang="en-US" dirty="0">
+                <a:latin typeface="Arial" panose="020B0604020202020204" pitchFamily="34" charset="0"/>
+                <a:cs typeface="Arial" panose="020B0604020202020204" pitchFamily="34" charset="0"/>
+              </a:rPr>
+              <a:t>Δ Range area</a:t>
+            </a:r>
+          </a:p>
+        </p:txBody>
+      </p:sp>
+    </p:spTree>
+    <p:extLst>
+      <p:ext uri="{BB962C8B-B14F-4D97-AF65-F5344CB8AC3E}">
+        <p14:creationId xmlns:p14="http://schemas.microsoft.com/office/powerpoint/2010/main" val="128356054"/>
+      </p:ext>
+    </p:extLst>
+  </p:cSld>
+  <p:clrMapOvr>
+    <a:masterClrMapping/>
+  </p:clrMapOvr>
+</p:sld>
+</file>
+
+<file path=ppt/slides/slide4.xml><?xml version="1.0" encoding="utf-8"?>
+<p:sld xmlns:a="http://schemas.openxmlformats.org/drawingml/2006/main" xmlns:r="http://schemas.openxmlformats.org/officeDocument/2006/relationships" xmlns:p="http://schemas.openxmlformats.org/presentationml/2006/main">
+  <p:cSld>
+    <p:spTree>
+      <p:nvGrpSpPr>
+        <p:cNvPr id="1" name=""/>
+        <p:cNvGrpSpPr/>
+        <p:nvPr/>
+      </p:nvGrpSpPr>
+      <p:grpSpPr>
+        <a:xfrm>
+          <a:off x="0" y="0"/>
+          <a:ext cx="0" cy="0"/>
+          <a:chOff x="0" y="0"/>
+          <a:chExt cx="0" cy="0"/>
+        </a:xfrm>
+      </p:grpSpPr>
+      <p:sp>
+        <p:nvSpPr>
+          <p:cNvPr id="2" name="Oval 1">
+            <a:extLst>
+              <a:ext uri="{FF2B5EF4-FFF2-40B4-BE49-F238E27FC236}">
+                <a16:creationId xmlns:a16="http://schemas.microsoft.com/office/drawing/2014/main" id="{ABDFBAC5-1D7C-4844-B9F9-941E6CABA206}"/>
+              </a:ext>
+            </a:extLst>
+          </p:cNvPr>
+          <p:cNvSpPr/>
+          <p:nvPr/>
+        </p:nvSpPr>
+        <p:spPr>
+          <a:xfrm>
+            <a:off x="3258293" y="1696686"/>
+            <a:ext cx="2604654" cy="2740232"/>
+          </a:xfrm>
+          <a:prstGeom prst="ellipse">
+            <a:avLst/>
+          </a:prstGeom>
+          <a:noFill/>
+          <a:ln>
+            <a:solidFill>
+              <a:schemeClr val="tx1"/>
+            </a:solidFill>
+          </a:ln>
+        </p:spPr>
+        <p:style>
+          <a:lnRef idx="2">
+            <a:schemeClr val="accent1">
+              <a:shade val="50000"/>
+            </a:schemeClr>
+          </a:lnRef>
+          <a:fillRef idx="1">
+            <a:schemeClr val="accent1"/>
+          </a:fillRef>
+          <a:effectRef idx="0">
+            <a:schemeClr val="accent1"/>
+          </a:effectRef>
+          <a:fontRef idx="minor">
+            <a:schemeClr val="lt1"/>
+          </a:fontRef>
+        </p:style>
+        <p:txBody>
+          <a:bodyPr rtlCol="0" anchor="ctr"/>
+          <a:lstStyle/>
+          <a:p>
+            <a:pPr algn="ctr"/>
+            <a:endParaRPr lang="en-US"/>
+          </a:p>
+        </p:txBody>
+      </p:sp>
+      <p:sp>
+        <p:nvSpPr>
+          <p:cNvPr id="3" name="Oval 2">
+            <a:extLst>
+              <a:ext uri="{FF2B5EF4-FFF2-40B4-BE49-F238E27FC236}">
+                <a16:creationId xmlns:a16="http://schemas.microsoft.com/office/drawing/2014/main" id="{50F6445B-A35C-1549-949B-2546B11108E8}"/>
+              </a:ext>
+            </a:extLst>
+          </p:cNvPr>
+          <p:cNvSpPr/>
+          <p:nvPr/>
+        </p:nvSpPr>
+        <p:spPr>
+          <a:xfrm>
+            <a:off x="4846120" y="945572"/>
+            <a:ext cx="4360225" cy="4099956"/>
+          </a:xfrm>
+          <a:prstGeom prst="ellipse">
+            <a:avLst/>
+          </a:prstGeom>
+          <a:noFill/>
+          <a:ln>
+            <a:solidFill>
+              <a:schemeClr val="tx1"/>
+            </a:solidFill>
+          </a:ln>
+        </p:spPr>
+        <p:style>
+          <a:lnRef idx="2">
+            <a:schemeClr val="accent1">
+              <a:shade val="50000"/>
+            </a:schemeClr>
+          </a:lnRef>
+          <a:fillRef idx="1">
+            <a:schemeClr val="accent1"/>
+          </a:fillRef>
+          <a:effectRef idx="0">
+            <a:schemeClr val="accent1"/>
+          </a:effectRef>
+          <a:fontRef idx="minor">
+            <a:schemeClr val="lt1"/>
+          </a:fontRef>
+        </p:style>
+        <p:txBody>
+          <a:bodyPr rtlCol="0" anchor="ctr"/>
+          <a:lstStyle/>
+          <a:p>
+            <a:pPr algn="ctr"/>
+            <a:endParaRPr lang="en-US"/>
+          </a:p>
+        </p:txBody>
+      </p:sp>
+      <p:sp>
+        <p:nvSpPr>
+          <p:cNvPr id="4" name="Oval 3">
+            <a:extLst>
+              <a:ext uri="{FF2B5EF4-FFF2-40B4-BE49-F238E27FC236}">
+                <a16:creationId xmlns:a16="http://schemas.microsoft.com/office/drawing/2014/main" id="{C8F89E68-3A52-8247-A1FE-A8CF47352C31}"/>
+              </a:ext>
+            </a:extLst>
+          </p:cNvPr>
+          <p:cNvSpPr/>
+          <p:nvPr/>
+        </p:nvSpPr>
+        <p:spPr>
+          <a:xfrm>
+            <a:off x="3906982" y="2995550"/>
+            <a:ext cx="2854035" cy="2882736"/>
+          </a:xfrm>
+          <a:prstGeom prst="ellipse">
+            <a:avLst/>
+          </a:prstGeom>
+          <a:noFill/>
+          <a:ln>
+            <a:solidFill>
+              <a:schemeClr val="tx1"/>
+            </a:solidFill>
+          </a:ln>
+        </p:spPr>
+        <p:style>
+          <a:lnRef idx="2">
+            <a:schemeClr val="accent1">
+              <a:shade val="50000"/>
+            </a:schemeClr>
+          </a:lnRef>
+          <a:fillRef idx="1">
+            <a:schemeClr val="accent1"/>
+          </a:fillRef>
+          <a:effectRef idx="0">
+            <a:schemeClr val="accent1"/>
+          </a:effectRef>
+          <a:fontRef idx="minor">
+            <a:schemeClr val="lt1"/>
+          </a:fontRef>
+        </p:style>
+        <p:txBody>
+          <a:bodyPr rtlCol="0" anchor="ctr"/>
+          <a:lstStyle/>
+          <a:p>
+            <a:pPr algn="ctr"/>
+            <a:endParaRPr lang="en-US"/>
+          </a:p>
+        </p:txBody>
+      </p:sp>
+      <p:sp>
+        <p:nvSpPr>
+          <p:cNvPr id="5" name="TextBox 4">
+            <a:extLst>
+              <a:ext uri="{FF2B5EF4-FFF2-40B4-BE49-F238E27FC236}">
+                <a16:creationId xmlns:a16="http://schemas.microsoft.com/office/drawing/2014/main" id="{468C6069-BA96-9E40-8437-18F5A8D5A767}"/>
+              </a:ext>
+            </a:extLst>
+          </p:cNvPr>
+          <p:cNvSpPr txBox="1"/>
+          <p:nvPr/>
+        </p:nvSpPr>
+        <p:spPr>
+          <a:xfrm>
+            <a:off x="6923314" y="2527958"/>
+            <a:ext cx="1840675" cy="369332"/>
+          </a:xfrm>
+          <a:prstGeom prst="rect">
+            <a:avLst/>
+          </a:prstGeom>
+          <a:noFill/>
+        </p:spPr>
+        <p:txBody>
+          <a:bodyPr wrap="square" rtlCol="0">
+            <a:spAutoFit/>
+          </a:bodyPr>
+          <a:lstStyle/>
+          <a:p>
+            <a:r>
+              <a:rPr lang="en-US" dirty="0">
+                <a:latin typeface="Arial" panose="020B0604020202020204" pitchFamily="34" charset="0"/>
+                <a:cs typeface="Arial" panose="020B0604020202020204" pitchFamily="34" charset="0"/>
+              </a:rPr>
+              <a:t>Niche breadth</a:t>
+            </a:r>
+          </a:p>
+        </p:txBody>
+      </p:sp>
+      <p:sp>
+        <p:nvSpPr>
+          <p:cNvPr id="6" name="TextBox 5">
+            <a:extLst>
+              <a:ext uri="{FF2B5EF4-FFF2-40B4-BE49-F238E27FC236}">
+                <a16:creationId xmlns:a16="http://schemas.microsoft.com/office/drawing/2014/main" id="{AA65B116-EA42-DE4A-AFA1-1F5F883DF204}"/>
+              </a:ext>
+            </a:extLst>
+          </p:cNvPr>
+          <p:cNvSpPr txBox="1"/>
+          <p:nvPr/>
+        </p:nvSpPr>
+        <p:spPr>
+          <a:xfrm>
+            <a:off x="4413661" y="4907909"/>
+            <a:ext cx="1840675" cy="369332"/>
+          </a:xfrm>
+          <a:prstGeom prst="rect">
+            <a:avLst/>
+          </a:prstGeom>
+          <a:noFill/>
+        </p:spPr>
+        <p:txBody>
+          <a:bodyPr wrap="square" rtlCol="0">
+            <a:spAutoFit/>
+          </a:bodyPr>
+          <a:lstStyle/>
+          <a:p>
+            <a:r>
+              <a:rPr lang="en-US" dirty="0">
+                <a:latin typeface="Arial" panose="020B0604020202020204" pitchFamily="34" charset="0"/>
+                <a:cs typeface="Arial" panose="020B0604020202020204" pitchFamily="34" charset="0"/>
+              </a:rPr>
+              <a:t>Body size</a:t>
+            </a:r>
+          </a:p>
+        </p:txBody>
+      </p:sp>
+      <p:sp>
+        <p:nvSpPr>
+          <p:cNvPr id="7" name="TextBox 6">
+            <a:extLst>
+              <a:ext uri="{FF2B5EF4-FFF2-40B4-BE49-F238E27FC236}">
+                <a16:creationId xmlns:a16="http://schemas.microsoft.com/office/drawing/2014/main" id="{A72E2609-B025-0840-BB63-D989569E86F1}"/>
+              </a:ext>
+            </a:extLst>
+          </p:cNvPr>
+          <p:cNvSpPr txBox="1"/>
+          <p:nvPr/>
+        </p:nvSpPr>
+        <p:spPr>
+          <a:xfrm>
+            <a:off x="3564576" y="2201393"/>
+            <a:ext cx="1173680" cy="646331"/>
+          </a:xfrm>
+          <a:prstGeom prst="rect">
+            <a:avLst/>
+          </a:prstGeom>
+          <a:noFill/>
+        </p:spPr>
+        <p:txBody>
+          <a:bodyPr wrap="square" rtlCol="0">
+            <a:spAutoFit/>
+          </a:bodyPr>
+          <a:lstStyle/>
+          <a:p>
+            <a:pPr algn="ctr"/>
+            <a:r>
+              <a:rPr lang="en-US" dirty="0">
+                <a:latin typeface="Arial" panose="020B0604020202020204" pitchFamily="34" charset="0"/>
+                <a:cs typeface="Arial" panose="020B0604020202020204" pitchFamily="34" charset="0"/>
+              </a:rPr>
+              <a:t>Migratory distance</a:t>
+            </a:r>
+          </a:p>
+        </p:txBody>
+      </p:sp>
+      <p:sp>
+        <p:nvSpPr>
+          <p:cNvPr id="9" name="TextBox 8">
+            <a:extLst>
+              <a:ext uri="{FF2B5EF4-FFF2-40B4-BE49-F238E27FC236}">
+                <a16:creationId xmlns:a16="http://schemas.microsoft.com/office/drawing/2014/main" id="{1E601120-75B5-5749-850E-37BB69F4F026}"/>
+              </a:ext>
+            </a:extLst>
+          </p:cNvPr>
+          <p:cNvSpPr txBox="1"/>
+          <p:nvPr/>
+        </p:nvSpPr>
+        <p:spPr>
+          <a:xfrm>
+            <a:off x="7197632" y="2894154"/>
+            <a:ext cx="1191690" cy="369332"/>
+          </a:xfrm>
+          <a:prstGeom prst="rect">
+            <a:avLst/>
+          </a:prstGeom>
+          <a:noFill/>
+        </p:spPr>
+        <p:txBody>
+          <a:bodyPr wrap="square" rtlCol="0">
+            <a:spAutoFit/>
+          </a:bodyPr>
+          <a:lstStyle/>
+          <a:p>
+            <a:r>
+              <a:rPr lang="en-US" dirty="0">
+                <a:latin typeface="Arial" panose="020B0604020202020204" pitchFamily="34" charset="0"/>
+                <a:cs typeface="Arial" panose="020B0604020202020204" pitchFamily="34" charset="0"/>
+              </a:rPr>
+              <a:t>R</a:t>
+            </a:r>
+            <a:r>
+              <a:rPr lang="en-US" baseline="30000" dirty="0">
+                <a:latin typeface="Arial" panose="020B0604020202020204" pitchFamily="34" charset="0"/>
+                <a:cs typeface="Arial" panose="020B0604020202020204" pitchFamily="34" charset="0"/>
+              </a:rPr>
+              <a:t>2</a:t>
+            </a:r>
+            <a:r>
+              <a:rPr lang="en-US" dirty="0">
+                <a:latin typeface="Arial" panose="020B0604020202020204" pitchFamily="34" charset="0"/>
+                <a:cs typeface="Arial" panose="020B0604020202020204" pitchFamily="34" charset="0"/>
+              </a:rPr>
+              <a:t> = 0.05</a:t>
+            </a:r>
+          </a:p>
+        </p:txBody>
+      </p:sp>
+      <p:sp>
+        <p:nvSpPr>
+          <p:cNvPr id="10" name="TextBox 9">
+            <a:extLst>
+              <a:ext uri="{FF2B5EF4-FFF2-40B4-BE49-F238E27FC236}">
+                <a16:creationId xmlns:a16="http://schemas.microsoft.com/office/drawing/2014/main" id="{0D888F98-CF7C-0346-818A-B2A92BCEBF31}"/>
+              </a:ext>
+            </a:extLst>
+          </p:cNvPr>
+          <p:cNvSpPr txBox="1"/>
+          <p:nvPr/>
+        </p:nvSpPr>
+        <p:spPr>
+          <a:xfrm>
+            <a:off x="3681841" y="2847724"/>
+            <a:ext cx="1191690" cy="369332"/>
+          </a:xfrm>
+          <a:prstGeom prst="rect">
+            <a:avLst/>
+          </a:prstGeom>
+          <a:noFill/>
+        </p:spPr>
+        <p:txBody>
+          <a:bodyPr wrap="square" rtlCol="0">
+            <a:spAutoFit/>
+          </a:bodyPr>
+          <a:lstStyle/>
+          <a:p>
+            <a:r>
+              <a:rPr lang="en-US" dirty="0">
+                <a:latin typeface="Arial" panose="020B0604020202020204" pitchFamily="34" charset="0"/>
+                <a:cs typeface="Arial" panose="020B0604020202020204" pitchFamily="34" charset="0"/>
+              </a:rPr>
+              <a:t>R</a:t>
+            </a:r>
+            <a:r>
+              <a:rPr lang="en-US" baseline="30000" dirty="0">
+                <a:latin typeface="Arial" panose="020B0604020202020204" pitchFamily="34" charset="0"/>
+                <a:cs typeface="Arial" panose="020B0604020202020204" pitchFamily="34" charset="0"/>
+              </a:rPr>
+              <a:t>2</a:t>
+            </a:r>
+            <a:r>
+              <a:rPr lang="en-US" dirty="0">
+                <a:latin typeface="Arial" panose="020B0604020202020204" pitchFamily="34" charset="0"/>
+                <a:cs typeface="Arial" panose="020B0604020202020204" pitchFamily="34" charset="0"/>
+              </a:rPr>
+              <a:t> = 0.03</a:t>
+            </a:r>
+          </a:p>
+        </p:txBody>
+      </p:sp>
+      <p:sp>
+        <p:nvSpPr>
+          <p:cNvPr id="12" name="TextBox 11">
+            <a:extLst>
+              <a:ext uri="{FF2B5EF4-FFF2-40B4-BE49-F238E27FC236}">
+                <a16:creationId xmlns:a16="http://schemas.microsoft.com/office/drawing/2014/main" id="{635EA56D-DF4F-6F4A-A26E-A3B901D534A4}"/>
+              </a:ext>
+            </a:extLst>
+          </p:cNvPr>
+          <p:cNvSpPr txBox="1"/>
+          <p:nvPr/>
+        </p:nvSpPr>
+        <p:spPr>
+          <a:xfrm>
+            <a:off x="4685109" y="5227058"/>
+            <a:ext cx="1191690" cy="369332"/>
+          </a:xfrm>
+          <a:prstGeom prst="rect">
+            <a:avLst/>
+          </a:prstGeom>
+          <a:noFill/>
+        </p:spPr>
+        <p:txBody>
+          <a:bodyPr wrap="square" rtlCol="0">
+            <a:spAutoFit/>
+          </a:bodyPr>
+          <a:lstStyle/>
+          <a:p>
+            <a:r>
+              <a:rPr lang="en-US" dirty="0">
+                <a:latin typeface="Arial" panose="020B0604020202020204" pitchFamily="34" charset="0"/>
+                <a:cs typeface="Arial" panose="020B0604020202020204" pitchFamily="34" charset="0"/>
+              </a:rPr>
+              <a:t>R</a:t>
+            </a:r>
+            <a:r>
+              <a:rPr lang="en-US" baseline="30000" dirty="0">
+                <a:latin typeface="Arial" panose="020B0604020202020204" pitchFamily="34" charset="0"/>
+                <a:cs typeface="Arial" panose="020B0604020202020204" pitchFamily="34" charset="0"/>
+              </a:rPr>
+              <a:t>2</a:t>
+            </a:r>
+            <a:r>
+              <a:rPr lang="en-US" dirty="0">
+                <a:latin typeface="Arial" panose="020B0604020202020204" pitchFamily="34" charset="0"/>
+                <a:cs typeface="Arial" panose="020B0604020202020204" pitchFamily="34" charset="0"/>
+              </a:rPr>
+              <a:t> = 0.01</a:t>
+            </a:r>
+          </a:p>
+        </p:txBody>
+      </p:sp>
+      <p:sp>
+        <p:nvSpPr>
+          <p:cNvPr id="13" name="TextBox 12">
+            <a:extLst>
+              <a:ext uri="{FF2B5EF4-FFF2-40B4-BE49-F238E27FC236}">
+                <a16:creationId xmlns:a16="http://schemas.microsoft.com/office/drawing/2014/main" id="{1ABC6687-76B3-B042-A4FC-8BFFF12A1B71}"/>
+              </a:ext>
+            </a:extLst>
+          </p:cNvPr>
+          <p:cNvSpPr txBox="1"/>
+          <p:nvPr/>
+        </p:nvSpPr>
+        <p:spPr>
+          <a:xfrm>
+            <a:off x="6847107" y="5227058"/>
+            <a:ext cx="1698668" cy="369332"/>
+          </a:xfrm>
+          <a:prstGeom prst="rect">
+            <a:avLst/>
+          </a:prstGeom>
+          <a:noFill/>
+        </p:spPr>
+        <p:txBody>
+          <a:bodyPr wrap="square" rtlCol="0">
+            <a:spAutoFit/>
+          </a:bodyPr>
+          <a:lstStyle/>
+          <a:p>
+            <a:r>
+              <a:rPr lang="en-US" dirty="0">
+                <a:latin typeface="Arial" panose="020B0604020202020204" pitchFamily="34" charset="0"/>
+                <a:cs typeface="Arial" panose="020B0604020202020204" pitchFamily="34" charset="0"/>
+              </a:rPr>
+              <a:t>Total R</a:t>
+            </a:r>
+            <a:r>
+              <a:rPr lang="en-US" baseline="30000" dirty="0">
+                <a:latin typeface="Arial" panose="020B0604020202020204" pitchFamily="34" charset="0"/>
+                <a:cs typeface="Arial" panose="020B0604020202020204" pitchFamily="34" charset="0"/>
+              </a:rPr>
+              <a:t>2</a:t>
+            </a:r>
+            <a:r>
+              <a:rPr lang="en-US" dirty="0">
+                <a:latin typeface="Arial" panose="020B0604020202020204" pitchFamily="34" charset="0"/>
+                <a:cs typeface="Arial" panose="020B0604020202020204" pitchFamily="34" charset="0"/>
+              </a:rPr>
+              <a:t> = 0.06</a:t>
+            </a:r>
+          </a:p>
+        </p:txBody>
+      </p:sp>
+      <p:sp>
+        <p:nvSpPr>
+          <p:cNvPr id="14" name="TextBox 13">
+            <a:extLst>
+              <a:ext uri="{FF2B5EF4-FFF2-40B4-BE49-F238E27FC236}">
+                <a16:creationId xmlns:a16="http://schemas.microsoft.com/office/drawing/2014/main" id="{B2E904DA-61D3-5D47-AD47-932D13DDF817}"/>
+              </a:ext>
+            </a:extLst>
+          </p:cNvPr>
+          <p:cNvSpPr txBox="1"/>
+          <p:nvPr/>
+        </p:nvSpPr>
+        <p:spPr>
+          <a:xfrm>
+            <a:off x="3062569" y="853239"/>
+            <a:ext cx="2430234" cy="646331"/>
+          </a:xfrm>
+          <a:prstGeom prst="rect">
+            <a:avLst/>
+          </a:prstGeom>
+          <a:noFill/>
+        </p:spPr>
+        <p:txBody>
+          <a:bodyPr wrap="square" rtlCol="0">
+            <a:spAutoFit/>
+          </a:bodyPr>
+          <a:lstStyle/>
+          <a:p>
+            <a:r>
+              <a:rPr lang="en-US" dirty="0">
+                <a:latin typeface="Arial" panose="020B0604020202020204" pitchFamily="34" charset="0"/>
+                <a:cs typeface="Arial" panose="020B0604020202020204" pitchFamily="34" charset="0"/>
+              </a:rPr>
+              <a:t>Response: </a:t>
+            </a:r>
+          </a:p>
+          <a:p>
+            <a:r>
+              <a:rPr lang="en-US" dirty="0">
+                <a:latin typeface="Arial" panose="020B0604020202020204" pitchFamily="34" charset="0"/>
+                <a:cs typeface="Arial" panose="020B0604020202020204" pitchFamily="34" charset="0"/>
+              </a:rPr>
+              <a:t>Δ Range occupancy</a:t>
+            </a:r>
+          </a:p>
+        </p:txBody>
+      </p:sp>
+      <p:sp>
+        <p:nvSpPr>
+          <p:cNvPr id="15" name="TextBox 14">
+            <a:extLst>
+              <a:ext uri="{FF2B5EF4-FFF2-40B4-BE49-F238E27FC236}">
+                <a16:creationId xmlns:a16="http://schemas.microsoft.com/office/drawing/2014/main" id="{1BE283E6-FA2F-2649-9C5C-01F6B90E748E}"/>
+              </a:ext>
+            </a:extLst>
+          </p:cNvPr>
+          <p:cNvSpPr txBox="1"/>
+          <p:nvPr/>
+        </p:nvSpPr>
+        <p:spPr>
+          <a:xfrm>
+            <a:off x="4926375" y="3237678"/>
+            <a:ext cx="1191690" cy="369332"/>
+          </a:xfrm>
+          <a:prstGeom prst="rect">
+            <a:avLst/>
+          </a:prstGeom>
+          <a:noFill/>
+        </p:spPr>
+        <p:txBody>
+          <a:bodyPr wrap="square" rtlCol="0">
+            <a:spAutoFit/>
+          </a:bodyPr>
+          <a:lstStyle/>
+          <a:p>
+            <a:r>
+              <a:rPr lang="en-US" dirty="0">
+                <a:latin typeface="Arial" panose="020B0604020202020204" pitchFamily="34" charset="0"/>
+                <a:cs typeface="Arial" panose="020B0604020202020204" pitchFamily="34" charset="0"/>
+              </a:rPr>
+              <a:t>R</a:t>
+            </a:r>
+            <a:r>
+              <a:rPr lang="en-US" baseline="30000" dirty="0">
+                <a:latin typeface="Arial" panose="020B0604020202020204" pitchFamily="34" charset="0"/>
+                <a:cs typeface="Arial" panose="020B0604020202020204" pitchFamily="34" charset="0"/>
+              </a:rPr>
+              <a:t>2</a:t>
+            </a:r>
+            <a:r>
+              <a:rPr lang="en-US" dirty="0">
+                <a:latin typeface="Arial" panose="020B0604020202020204" pitchFamily="34" charset="0"/>
+                <a:cs typeface="Arial" panose="020B0604020202020204" pitchFamily="34" charset="0"/>
+              </a:rPr>
+              <a:t> = 0</a:t>
+            </a:r>
+          </a:p>
+        </p:txBody>
+      </p:sp>
+    </p:spTree>
+    <p:extLst>
+      <p:ext uri="{BB962C8B-B14F-4D97-AF65-F5344CB8AC3E}">
+        <p14:creationId xmlns:p14="http://schemas.microsoft.com/office/powerpoint/2010/main" val="1063157910"/>
+      </p:ext>
+    </p:extLst>
+  </p:cSld>
+  <p:clrMapOvr>
+    <a:masterClrMapping/>
+  </p:clrMapOvr>
+</p:sld>
+</file>
+
+<file path=ppt/slides/slide5.xml><?xml version="1.0" encoding="utf-8"?>
+<p:sld xmlns:a="http://schemas.openxmlformats.org/drawingml/2006/main" xmlns:r="http://schemas.openxmlformats.org/officeDocument/2006/relationships" xmlns:p="http://schemas.openxmlformats.org/presentationml/2006/main">
+  <p:cSld>
+    <p:spTree>
+      <p:nvGrpSpPr>
+        <p:cNvPr id="1" name=""/>
+        <p:cNvGrpSpPr/>
+        <p:nvPr/>
+      </p:nvGrpSpPr>
+      <p:grpSpPr>
+        <a:xfrm>
+          <a:off x="0" y="0"/>
+          <a:ext cx="0" cy="0"/>
+          <a:chOff x="0" y="0"/>
+          <a:chExt cx="0" cy="0"/>
+        </a:xfrm>
+      </p:grpSpPr>
+      <p:pic>
+        <p:nvPicPr>
+          <p:cNvPr id="3" name="Picture 2" descr="Diagram, venn diagram&#10;&#10;Description automatically generated">
+            <a:extLst>
+              <a:ext uri="{FF2B5EF4-FFF2-40B4-BE49-F238E27FC236}">
+                <a16:creationId xmlns:a16="http://schemas.microsoft.com/office/drawing/2014/main" id="{B479E6AD-1E57-FA47-A49F-C42A1B72B626}"/>
+              </a:ext>
+            </a:extLst>
+          </p:cNvPr>
+          <p:cNvPicPr>
+            <a:picLocks noChangeAspect="1"/>
+          </p:cNvPicPr>
+          <p:nvPr/>
+        </p:nvPicPr>
+        <p:blipFill>
+          <a:blip r:embed="rId2"/>
+          <a:stretch>
+            <a:fillRect/>
+          </a:stretch>
+        </p:blipFill>
+        <p:spPr>
+          <a:xfrm>
+            <a:off x="1113889" y="415141"/>
+            <a:ext cx="3986153" cy="3183082"/>
+          </a:xfrm>
+          <a:prstGeom prst="rect">
+            <a:avLst/>
+          </a:prstGeom>
+        </p:spPr>
+      </p:pic>
+      <p:pic>
+        <p:nvPicPr>
+          <p:cNvPr id="5" name="Picture 4" descr="Diagram, venn diagram&#10;&#10;Description automatically generated">
+            <a:extLst>
+              <a:ext uri="{FF2B5EF4-FFF2-40B4-BE49-F238E27FC236}">
+                <a16:creationId xmlns:a16="http://schemas.microsoft.com/office/drawing/2014/main" id="{6DAC579D-6F8C-2247-9E48-85F1CFA84375}"/>
+              </a:ext>
+            </a:extLst>
+          </p:cNvPr>
+          <p:cNvPicPr>
+            <a:picLocks noChangeAspect="1"/>
+          </p:cNvPicPr>
+          <p:nvPr/>
+        </p:nvPicPr>
+        <p:blipFill>
+          <a:blip r:embed="rId3"/>
+          <a:stretch>
+            <a:fillRect/>
+          </a:stretch>
+        </p:blipFill>
+        <p:spPr>
+          <a:xfrm>
+            <a:off x="5358410" y="415140"/>
+            <a:ext cx="3986152" cy="3183081"/>
+          </a:xfrm>
+          <a:prstGeom prst="rect">
+            <a:avLst/>
+          </a:prstGeom>
+        </p:spPr>
+      </p:pic>
+      <p:pic>
+        <p:nvPicPr>
+          <p:cNvPr id="7" name="Picture 6" descr="Diagram, venn diagram&#10;&#10;Description automatically generated">
+            <a:extLst>
+              <a:ext uri="{FF2B5EF4-FFF2-40B4-BE49-F238E27FC236}">
+                <a16:creationId xmlns:a16="http://schemas.microsoft.com/office/drawing/2014/main" id="{F15C712D-308D-424D-AE45-B7BA7A854A22}"/>
+              </a:ext>
+            </a:extLst>
+          </p:cNvPr>
+          <p:cNvPicPr>
+            <a:picLocks noChangeAspect="1"/>
+          </p:cNvPicPr>
+          <p:nvPr/>
+        </p:nvPicPr>
+        <p:blipFill>
+          <a:blip r:embed="rId4"/>
+          <a:stretch>
+            <a:fillRect/>
+          </a:stretch>
+        </p:blipFill>
+        <p:spPr>
+          <a:xfrm>
+            <a:off x="3365334" y="3598221"/>
+            <a:ext cx="3986152" cy="3183081"/>
+          </a:xfrm>
+          <a:prstGeom prst="rect">
+            <a:avLst/>
+          </a:prstGeom>
+        </p:spPr>
+      </p:pic>
+      <p:cxnSp>
+        <p:nvCxnSpPr>
+          <p:cNvPr id="9" name="Straight Connector 8">
+            <a:extLst>
+              <a:ext uri="{FF2B5EF4-FFF2-40B4-BE49-F238E27FC236}">
+                <a16:creationId xmlns:a16="http://schemas.microsoft.com/office/drawing/2014/main" id="{1844228F-E7D7-EE43-B023-758DCF8E935C}"/>
+              </a:ext>
+            </a:extLst>
+          </p:cNvPr>
+          <p:cNvCxnSpPr>
+            <a:cxnSpLocks/>
+          </p:cNvCxnSpPr>
+          <p:nvPr/>
+        </p:nvCxnSpPr>
+        <p:spPr>
+          <a:xfrm>
+            <a:off x="712520" y="3598221"/>
+            <a:ext cx="9547761" cy="0"/>
+          </a:xfrm>
+          <a:prstGeom prst="line">
+            <a:avLst/>
+          </a:prstGeom>
+          <a:ln>
+            <a:solidFill>
+              <a:schemeClr val="tx1"/>
+            </a:solidFill>
+          </a:ln>
+        </p:spPr>
+        <p:style>
+          <a:lnRef idx="1">
+            <a:schemeClr val="accent1"/>
+          </a:lnRef>
+          <a:fillRef idx="0">
+            <a:schemeClr val="accent1"/>
+          </a:fillRef>
+          <a:effectRef idx="0">
+            <a:schemeClr val="accent1"/>
+          </a:effectRef>
+          <a:fontRef idx="minor">
+            <a:schemeClr val="tx1"/>
+          </a:fontRef>
+        </p:style>
+      </p:cxnSp>
+      <p:cxnSp>
+        <p:nvCxnSpPr>
+          <p:cNvPr id="12" name="Straight Connector 11">
+            <a:extLst>
+              <a:ext uri="{FF2B5EF4-FFF2-40B4-BE49-F238E27FC236}">
+                <a16:creationId xmlns:a16="http://schemas.microsoft.com/office/drawing/2014/main" id="{2FA85D60-BCA4-B949-9830-F93A1CEB99C1}"/>
+              </a:ext>
+            </a:extLst>
+          </p:cNvPr>
+          <p:cNvCxnSpPr>
+            <a:cxnSpLocks/>
+            <a:endCxn id="7" idx="0"/>
+          </p:cNvCxnSpPr>
+          <p:nvPr/>
+        </p:nvCxnSpPr>
+        <p:spPr>
+          <a:xfrm>
+            <a:off x="5358410" y="213756"/>
+            <a:ext cx="0" cy="3384465"/>
+          </a:xfrm>
+          <a:prstGeom prst="line">
+            <a:avLst/>
+          </a:prstGeom>
+          <a:ln>
+            <a:solidFill>
+              <a:schemeClr val="tx1"/>
+            </a:solidFill>
+          </a:ln>
+        </p:spPr>
+        <p:style>
+          <a:lnRef idx="1">
+            <a:schemeClr val="accent1"/>
+          </a:lnRef>
+          <a:fillRef idx="0">
+            <a:schemeClr val="accent1"/>
+          </a:fillRef>
+          <a:effectRef idx="0">
+            <a:schemeClr val="accent1"/>
+          </a:effectRef>
+          <a:fontRef idx="minor">
+            <a:schemeClr val="tx1"/>
+          </a:fontRef>
+        </p:style>
+      </p:cxnSp>
+    </p:spTree>
+    <p:extLst>
+      <p:ext uri="{BB962C8B-B14F-4D97-AF65-F5344CB8AC3E}">
+        <p14:creationId xmlns:p14="http://schemas.microsoft.com/office/powerpoint/2010/main" val="1749384182"/>
       </p:ext>
     </p:extLst>
   </p:cSld>

</xml_diff>

<commit_message>
figure updates, methods fig
</commit_message>
<xml_diff>
--- a/figures/sem_venn_figures.pptx
+++ b/figures/sem_venn_figures.pptx
@@ -201,7 +201,7 @@
           <a:p>
             <a:fld id="{3361DBBF-9048-E34E-A120-F3301ADA26C3}" type="datetimeFigureOut">
               <a:rPr lang="en-US" smtClean="0"/>
-              <a:t>11/24/21</a:t>
+              <a:t>12/2/21</a:t>
             </a:fld>
             <a:endParaRPr lang="en-US"/>
           </a:p>
@@ -876,7 +876,7 @@
           <a:p>
             <a:fld id="{CD91ABF4-99EA-9A4C-8826-87C21CFC9DF7}" type="datetimeFigureOut">
               <a:rPr lang="en-US" smtClean="0"/>
-              <a:t>11/24/21</a:t>
+              <a:t>12/2/21</a:t>
             </a:fld>
             <a:endParaRPr lang="en-US" dirty="0"/>
           </a:p>
@@ -1074,7 +1074,7 @@
           <a:p>
             <a:fld id="{CD91ABF4-99EA-9A4C-8826-87C21CFC9DF7}" type="datetimeFigureOut">
               <a:rPr lang="en-US" smtClean="0"/>
-              <a:t>11/24/21</a:t>
+              <a:t>12/2/21</a:t>
             </a:fld>
             <a:endParaRPr lang="en-US" dirty="0"/>
           </a:p>
@@ -1282,7 +1282,7 @@
           <a:p>
             <a:fld id="{CD91ABF4-99EA-9A4C-8826-87C21CFC9DF7}" type="datetimeFigureOut">
               <a:rPr lang="en-US" smtClean="0"/>
-              <a:t>11/24/21</a:t>
+              <a:t>12/2/21</a:t>
             </a:fld>
             <a:endParaRPr lang="en-US" dirty="0"/>
           </a:p>
@@ -1480,7 +1480,7 @@
           <a:p>
             <a:fld id="{CD91ABF4-99EA-9A4C-8826-87C21CFC9DF7}" type="datetimeFigureOut">
               <a:rPr lang="en-US" smtClean="0"/>
-              <a:t>11/24/21</a:t>
+              <a:t>12/2/21</a:t>
             </a:fld>
             <a:endParaRPr lang="en-US" dirty="0"/>
           </a:p>
@@ -1755,7 +1755,7 @@
           <a:p>
             <a:fld id="{CD91ABF4-99EA-9A4C-8826-87C21CFC9DF7}" type="datetimeFigureOut">
               <a:rPr lang="en-US" smtClean="0"/>
-              <a:t>11/24/21</a:t>
+              <a:t>12/2/21</a:t>
             </a:fld>
             <a:endParaRPr lang="en-US" dirty="0"/>
           </a:p>
@@ -2020,7 +2020,7 @@
           <a:p>
             <a:fld id="{CD91ABF4-99EA-9A4C-8826-87C21CFC9DF7}" type="datetimeFigureOut">
               <a:rPr lang="en-US" smtClean="0"/>
-              <a:t>11/24/21</a:t>
+              <a:t>12/2/21</a:t>
             </a:fld>
             <a:endParaRPr lang="en-US" dirty="0"/>
           </a:p>
@@ -2432,7 +2432,7 @@
           <a:p>
             <a:fld id="{CD91ABF4-99EA-9A4C-8826-87C21CFC9DF7}" type="datetimeFigureOut">
               <a:rPr lang="en-US" smtClean="0"/>
-              <a:t>11/24/21</a:t>
+              <a:t>12/2/21</a:t>
             </a:fld>
             <a:endParaRPr lang="en-US" dirty="0"/>
           </a:p>
@@ -2573,7 +2573,7 @@
           <a:p>
             <a:fld id="{CD91ABF4-99EA-9A4C-8826-87C21CFC9DF7}" type="datetimeFigureOut">
               <a:rPr lang="en-US" smtClean="0"/>
-              <a:t>11/24/21</a:t>
+              <a:t>12/2/21</a:t>
             </a:fld>
             <a:endParaRPr lang="en-US" dirty="0"/>
           </a:p>
@@ -2686,7 +2686,7 @@
           <a:p>
             <a:fld id="{CD91ABF4-99EA-9A4C-8826-87C21CFC9DF7}" type="datetimeFigureOut">
               <a:rPr lang="en-US" smtClean="0"/>
-              <a:t>11/24/21</a:t>
+              <a:t>12/2/21</a:t>
             </a:fld>
             <a:endParaRPr lang="en-US" dirty="0"/>
           </a:p>
@@ -2997,7 +2997,7 @@
           <a:p>
             <a:fld id="{CD91ABF4-99EA-9A4C-8826-87C21CFC9DF7}" type="datetimeFigureOut">
               <a:rPr lang="en-US" smtClean="0"/>
-              <a:t>11/24/21</a:t>
+              <a:t>12/2/21</a:t>
             </a:fld>
             <a:endParaRPr lang="en-US" dirty="0"/>
           </a:p>
@@ -3285,7 +3285,7 @@
           <a:p>
             <a:fld id="{CD91ABF4-99EA-9A4C-8826-87C21CFC9DF7}" type="datetimeFigureOut">
               <a:rPr lang="en-US" smtClean="0"/>
-              <a:t>11/24/21</a:t>
+              <a:t>12/2/21</a:t>
             </a:fld>
             <a:endParaRPr lang="en-US" dirty="0"/>
           </a:p>
@@ -3526,7 +3526,7 @@
           <a:p>
             <a:fld id="{CD91ABF4-99EA-9A4C-8826-87C21CFC9DF7}" type="datetimeFigureOut">
               <a:rPr lang="en-US" smtClean="0"/>
-              <a:t>11/24/21</a:t>
+              <a:t>12/2/21</a:t>
             </a:fld>
             <a:endParaRPr lang="en-US" dirty="0"/>
           </a:p>
@@ -5538,8 +5538,8 @@
         </p:nvSpPr>
         <p:spPr>
           <a:xfrm>
-            <a:off x="4846120" y="945572"/>
-            <a:ext cx="4360225" cy="4099956"/>
+            <a:off x="4884965" y="1691216"/>
+            <a:ext cx="2854035" cy="2745702"/>
           </a:xfrm>
           <a:prstGeom prst="ellipse">
             <a:avLst/>
@@ -5650,7 +5650,7 @@
         </p:nvSpPr>
         <p:spPr>
           <a:xfrm>
-            <a:off x="6923314" y="2527958"/>
+            <a:off x="5862947" y="2480625"/>
             <a:ext cx="1840675" cy="369332"/>
           </a:xfrm>
           <a:prstGeom prst="rect">
@@ -5765,7 +5765,7 @@
         </p:nvSpPr>
         <p:spPr>
           <a:xfrm>
-            <a:off x="7352878" y="2894154"/>
+            <a:off x="6425516" y="2786852"/>
             <a:ext cx="1191690" cy="369332"/>
           </a:xfrm>
           <a:prstGeom prst="rect">
@@ -5784,7 +5784,7 @@
                 <a:latin typeface="Arial" panose="020B0604020202020204" pitchFamily="34" charset="0"/>
                 <a:cs typeface="Arial" panose="020B0604020202020204" pitchFamily="34" charset="0"/>
               </a:rPr>
-              <a:t>0.05</a:t>
+              <a:t>0.002</a:t>
             </a:r>
           </a:p>
         </p:txBody>
@@ -5822,7 +5822,7 @@
                 <a:latin typeface="Arial" panose="020B0604020202020204" pitchFamily="34" charset="0"/>
                 <a:cs typeface="Arial" panose="020B0604020202020204" pitchFamily="34" charset="0"/>
               </a:rPr>
-              <a:t>0.03</a:t>
+              <a:t>0.009</a:t>
             </a:r>
           </a:p>
         </p:txBody>
@@ -5860,7 +5860,7 @@
                 <a:latin typeface="Arial" panose="020B0604020202020204" pitchFamily="34" charset="0"/>
                 <a:cs typeface="Arial" panose="020B0604020202020204" pitchFamily="34" charset="0"/>
               </a:rPr>
-              <a:t>0.00</a:t>
+              <a:t>0.001</a:t>
             </a:r>
           </a:p>
         </p:txBody>
@@ -5912,7 +5912,7 @@
                 <a:latin typeface="Arial" panose="020B0604020202020204" pitchFamily="34" charset="0"/>
                 <a:cs typeface="Arial" panose="020B0604020202020204" pitchFamily="34" charset="0"/>
               </a:rPr>
-              <a:t> = 0.05</a:t>
+              <a:t> = 0.03</a:t>
             </a:r>
           </a:p>
         </p:txBody>
@@ -5978,7 +5978,7 @@
         </p:nvSpPr>
         <p:spPr>
           <a:xfrm>
-            <a:off x="5438251" y="4073811"/>
+            <a:off x="5549503" y="3732554"/>
             <a:ext cx="1191690" cy="369332"/>
           </a:xfrm>
           <a:prstGeom prst="rect">
@@ -5997,7 +5997,121 @@
                 <a:latin typeface="Arial" panose="020B0604020202020204" pitchFamily="34" charset="0"/>
                 <a:cs typeface="Arial" panose="020B0604020202020204" pitchFamily="34" charset="0"/>
               </a:rPr>
-              <a:t>    0.00</a:t>
+              <a:t>    0.001</a:t>
+            </a:r>
+          </a:p>
+        </p:txBody>
+      </p:sp>
+      <p:sp>
+        <p:nvSpPr>
+          <p:cNvPr id="16" name="TextBox 15">
+            <a:extLst>
+              <a:ext uri="{FF2B5EF4-FFF2-40B4-BE49-F238E27FC236}">
+                <a16:creationId xmlns:a16="http://schemas.microsoft.com/office/drawing/2014/main" id="{03C64C24-8110-CC4E-A8B8-DCC0C5EC93CA}"/>
+              </a:ext>
+            </a:extLst>
+          </p:cNvPr>
+          <p:cNvSpPr txBox="1"/>
+          <p:nvPr/>
+        </p:nvSpPr>
+        <p:spPr>
+          <a:xfrm>
+            <a:off x="4693484" y="3197875"/>
+            <a:ext cx="1191690" cy="369332"/>
+          </a:xfrm>
+          <a:prstGeom prst="rect">
+            <a:avLst/>
+          </a:prstGeom>
+          <a:noFill/>
+        </p:spPr>
+        <p:txBody>
+          <a:bodyPr wrap="square" rtlCol="0">
+            <a:spAutoFit/>
+          </a:bodyPr>
+          <a:lstStyle/>
+          <a:p>
+            <a:r>
+              <a:rPr lang="en-US" dirty="0">
+                <a:latin typeface="Arial" panose="020B0604020202020204" pitchFamily="34" charset="0"/>
+                <a:cs typeface="Arial" panose="020B0604020202020204" pitchFamily="34" charset="0"/>
+              </a:rPr>
+              <a:t>    -0.002</a:t>
+            </a:r>
+          </a:p>
+        </p:txBody>
+      </p:sp>
+      <p:sp>
+        <p:nvSpPr>
+          <p:cNvPr id="17" name="TextBox 16">
+            <a:extLst>
+              <a:ext uri="{FF2B5EF4-FFF2-40B4-BE49-F238E27FC236}">
+                <a16:creationId xmlns:a16="http://schemas.microsoft.com/office/drawing/2014/main" id="{A7BF877D-C41B-8D4E-A6B8-52FF866DF85F}"/>
+              </a:ext>
+            </a:extLst>
+          </p:cNvPr>
+          <p:cNvSpPr txBox="1"/>
+          <p:nvPr/>
+        </p:nvSpPr>
+        <p:spPr>
+          <a:xfrm>
+            <a:off x="4805610" y="2512692"/>
+            <a:ext cx="1191690" cy="369332"/>
+          </a:xfrm>
+          <a:prstGeom prst="rect">
+            <a:avLst/>
+          </a:prstGeom>
+          <a:noFill/>
+        </p:spPr>
+        <p:txBody>
+          <a:bodyPr wrap="square" rtlCol="0">
+            <a:spAutoFit/>
+          </a:bodyPr>
+          <a:lstStyle/>
+          <a:p>
+            <a:r>
+              <a:rPr lang="en-US" dirty="0">
+                <a:latin typeface="Arial" panose="020B0604020202020204" pitchFamily="34" charset="0"/>
+                <a:cs typeface="Arial" panose="020B0604020202020204" pitchFamily="34" charset="0"/>
+              </a:rPr>
+              <a:t>   -0.004</a:t>
+            </a:r>
+          </a:p>
+        </p:txBody>
+      </p:sp>
+      <p:sp>
+        <p:nvSpPr>
+          <p:cNvPr id="18" name="TextBox 17">
+            <a:extLst>
+              <a:ext uri="{FF2B5EF4-FFF2-40B4-BE49-F238E27FC236}">
+                <a16:creationId xmlns:a16="http://schemas.microsoft.com/office/drawing/2014/main" id="{7ECEB26D-2648-FA45-9390-6736BC12E74B}"/>
+              </a:ext>
+            </a:extLst>
+          </p:cNvPr>
+          <p:cNvSpPr txBox="1"/>
+          <p:nvPr/>
+        </p:nvSpPr>
+        <p:spPr>
+          <a:xfrm>
+            <a:off x="4817611" y="5252851"/>
+            <a:ext cx="1191690" cy="369332"/>
+          </a:xfrm>
+          <a:prstGeom prst="rect">
+            <a:avLst/>
+          </a:prstGeom>
+          <a:noFill/>
+        </p:spPr>
+        <p:txBody>
+          <a:bodyPr wrap="square" rtlCol="0">
+            <a:spAutoFit/>
+          </a:bodyPr>
+          <a:lstStyle/>
+          <a:p>
+            <a:r>
+              <a:rPr lang="en-US" dirty="0">
+                <a:latin typeface="Arial" panose="020B0604020202020204" pitchFamily="34" charset="0"/>
+                <a:cs typeface="Arial" panose="020B0604020202020204" pitchFamily="34" charset="0"/>
+              </a:rPr>
+              <a:t>    -0.010</a:t>
             </a:r>
           </a:p>
         </p:txBody>
@@ -6348,7 +6462,7 @@
                 <a:latin typeface="Arial" panose="020B0604020202020204" pitchFamily="34" charset="0"/>
                 <a:cs typeface="Arial" panose="020B0604020202020204" pitchFamily="34" charset="0"/>
               </a:rPr>
-              <a:t>0.08</a:t>
+              <a:t>0.080</a:t>
             </a:r>
           </a:p>
         </p:txBody>
@@ -6386,7 +6500,7 @@
                 <a:latin typeface="Arial" panose="020B0604020202020204" pitchFamily="34" charset="0"/>
                 <a:cs typeface="Arial" panose="020B0604020202020204" pitchFamily="34" charset="0"/>
               </a:rPr>
-              <a:t>0.01</a:t>
+              <a:t>0.013</a:t>
             </a:r>
           </a:p>
         </p:txBody>
@@ -6424,7 +6538,7 @@
                 <a:latin typeface="Arial" panose="020B0604020202020204" pitchFamily="34" charset="0"/>
                 <a:cs typeface="Arial" panose="020B0604020202020204" pitchFamily="34" charset="0"/>
               </a:rPr>
-              <a:t>0.02</a:t>
+              <a:t>0.014</a:t>
             </a:r>
           </a:p>
         </p:txBody>
@@ -6443,7 +6557,7 @@
         </p:nvSpPr>
         <p:spPr>
           <a:xfrm>
-            <a:off x="4933800" y="2579171"/>
+            <a:off x="5021987" y="2532317"/>
             <a:ext cx="1191690" cy="369332"/>
           </a:xfrm>
           <a:prstGeom prst="rect">
@@ -6462,7 +6576,7 @@
                 <a:latin typeface="Arial" panose="020B0604020202020204" pitchFamily="34" charset="0"/>
                 <a:cs typeface="Arial" panose="020B0604020202020204" pitchFamily="34" charset="0"/>
               </a:rPr>
-              <a:t>0.05</a:t>
+              <a:t>0.051</a:t>
             </a:r>
           </a:p>
         </p:txBody>
@@ -6514,7 +6628,7 @@
                 <a:latin typeface="Arial" panose="020B0604020202020204" pitchFamily="34" charset="0"/>
                 <a:cs typeface="Arial" panose="020B0604020202020204" pitchFamily="34" charset="0"/>
               </a:rPr>
-              <a:t> = 0.13</a:t>
+              <a:t> = 0.14</a:t>
             </a:r>
           </a:p>
         </p:txBody>
@@ -6562,6 +6676,120 @@
                 <a:cs typeface="Arial" panose="020B0604020202020204" pitchFamily="34" charset="0"/>
               </a:rPr>
               <a:t>Δ Range area</a:t>
+            </a:r>
+          </a:p>
+        </p:txBody>
+      </p:sp>
+      <p:sp>
+        <p:nvSpPr>
+          <p:cNvPr id="18" name="TextBox 17">
+            <a:extLst>
+              <a:ext uri="{FF2B5EF4-FFF2-40B4-BE49-F238E27FC236}">
+                <a16:creationId xmlns:a16="http://schemas.microsoft.com/office/drawing/2014/main" id="{7A448C98-C00D-3945-8F42-44BDA3E9E311}"/>
+              </a:ext>
+            </a:extLst>
+          </p:cNvPr>
+          <p:cNvSpPr txBox="1"/>
+          <p:nvPr/>
+        </p:nvSpPr>
+        <p:spPr>
+          <a:xfrm>
+            <a:off x="5677191" y="3973685"/>
+            <a:ext cx="1191690" cy="369332"/>
+          </a:xfrm>
+          <a:prstGeom prst="rect">
+            <a:avLst/>
+          </a:prstGeom>
+          <a:noFill/>
+        </p:spPr>
+        <p:txBody>
+          <a:bodyPr wrap="square" rtlCol="0">
+            <a:spAutoFit/>
+          </a:bodyPr>
+          <a:lstStyle/>
+          <a:p>
+            <a:r>
+              <a:rPr lang="en-US" dirty="0">
+                <a:latin typeface="Arial" panose="020B0604020202020204" pitchFamily="34" charset="0"/>
+                <a:cs typeface="Arial" panose="020B0604020202020204" pitchFamily="34" charset="0"/>
+              </a:rPr>
+              <a:t>-0.006</a:t>
+            </a:r>
+          </a:p>
+        </p:txBody>
+      </p:sp>
+      <p:sp>
+        <p:nvSpPr>
+          <p:cNvPr id="19" name="TextBox 18">
+            <a:extLst>
+              <a:ext uri="{FF2B5EF4-FFF2-40B4-BE49-F238E27FC236}">
+                <a16:creationId xmlns:a16="http://schemas.microsoft.com/office/drawing/2014/main" id="{7437538F-20F8-1243-A954-D362466845B5}"/>
+              </a:ext>
+            </a:extLst>
+          </p:cNvPr>
+          <p:cNvSpPr txBox="1"/>
+          <p:nvPr/>
+        </p:nvSpPr>
+        <p:spPr>
+          <a:xfrm>
+            <a:off x="4956564" y="3260113"/>
+            <a:ext cx="1191690" cy="369332"/>
+          </a:xfrm>
+          <a:prstGeom prst="rect">
+            <a:avLst/>
+          </a:prstGeom>
+          <a:noFill/>
+        </p:spPr>
+        <p:txBody>
+          <a:bodyPr wrap="square" rtlCol="0">
+            <a:spAutoFit/>
+          </a:bodyPr>
+          <a:lstStyle/>
+          <a:p>
+            <a:r>
+              <a:rPr lang="en-US" dirty="0">
+                <a:latin typeface="Arial" panose="020B0604020202020204" pitchFamily="34" charset="0"/>
+                <a:cs typeface="Arial" panose="020B0604020202020204" pitchFamily="34" charset="0"/>
+              </a:rPr>
+              <a:t>-0.006</a:t>
+            </a:r>
+          </a:p>
+        </p:txBody>
+      </p:sp>
+      <p:sp>
+        <p:nvSpPr>
+          <p:cNvPr id="20" name="TextBox 19">
+            <a:extLst>
+              <a:ext uri="{FF2B5EF4-FFF2-40B4-BE49-F238E27FC236}">
+                <a16:creationId xmlns:a16="http://schemas.microsoft.com/office/drawing/2014/main" id="{29C52A15-D948-2E4D-A453-929ABD17C398}"/>
+              </a:ext>
+            </a:extLst>
+          </p:cNvPr>
+          <p:cNvSpPr txBox="1"/>
+          <p:nvPr/>
+        </p:nvSpPr>
+        <p:spPr>
+          <a:xfrm>
+            <a:off x="4195839" y="3769498"/>
+            <a:ext cx="1191690" cy="369332"/>
+          </a:xfrm>
+          <a:prstGeom prst="rect">
+            <a:avLst/>
+          </a:prstGeom>
+          <a:noFill/>
+        </p:spPr>
+        <p:txBody>
+          <a:bodyPr wrap="square" rtlCol="0">
+            <a:spAutoFit/>
+          </a:bodyPr>
+          <a:lstStyle/>
+          <a:p>
+            <a:r>
+              <a:rPr lang="en-US" dirty="0">
+                <a:latin typeface="Arial" panose="020B0604020202020204" pitchFamily="34" charset="0"/>
+                <a:cs typeface="Arial" panose="020B0604020202020204" pitchFamily="34" charset="0"/>
+              </a:rPr>
+              <a:t>-0.007</a:t>
             </a:r>
           </a:p>
         </p:txBody>
@@ -6666,8 +6894,8 @@
         </p:nvSpPr>
         <p:spPr>
           <a:xfrm>
-            <a:off x="4846120" y="945572"/>
-            <a:ext cx="4360225" cy="4099956"/>
+            <a:off x="4846120" y="1499570"/>
+            <a:ext cx="3539891" cy="3545958"/>
           </a:xfrm>
           <a:prstGeom prst="ellipse">
             <a:avLst/>
@@ -6778,7 +7006,7 @@
         </p:nvSpPr>
         <p:spPr>
           <a:xfrm>
-            <a:off x="6923314" y="2527958"/>
+            <a:off x="6204141" y="2386885"/>
             <a:ext cx="1840675" cy="369332"/>
           </a:xfrm>
           <a:prstGeom prst="rect">
@@ -6893,7 +7121,7 @@
         </p:nvSpPr>
         <p:spPr>
           <a:xfrm>
-            <a:off x="7375311" y="2859310"/>
+            <a:off x="6868881" y="2720527"/>
             <a:ext cx="1191690" cy="369332"/>
           </a:xfrm>
           <a:prstGeom prst="rect">
@@ -6912,7 +7140,7 @@
                 <a:latin typeface="Arial" panose="020B0604020202020204" pitchFamily="34" charset="0"/>
                 <a:cs typeface="Arial" panose="020B0604020202020204" pitchFamily="34" charset="0"/>
               </a:rPr>
-              <a:t>0.05</a:t>
+              <a:t>0.043</a:t>
             </a:r>
           </a:p>
         </p:txBody>
@@ -6950,7 +7178,7 @@
                 <a:latin typeface="Arial" panose="020B0604020202020204" pitchFamily="34" charset="0"/>
                 <a:cs typeface="Arial" panose="020B0604020202020204" pitchFamily="34" charset="0"/>
               </a:rPr>
-              <a:t>0.03</a:t>
+              <a:t>0.030</a:t>
             </a:r>
           </a:p>
         </p:txBody>
@@ -6988,7 +7216,7 @@
                 <a:latin typeface="Arial" panose="020B0604020202020204" pitchFamily="34" charset="0"/>
                 <a:cs typeface="Arial" panose="020B0604020202020204" pitchFamily="34" charset="0"/>
               </a:rPr>
-              <a:t>0.01</a:t>
+              <a:t>-0.0001</a:t>
             </a:r>
           </a:p>
         </p:txBody>
@@ -7106,7 +7334,7 @@
         </p:nvSpPr>
         <p:spPr>
           <a:xfrm>
-            <a:off x="5182990" y="3189863"/>
+            <a:off x="5012582" y="3201737"/>
             <a:ext cx="1191690" cy="369332"/>
           </a:xfrm>
           <a:prstGeom prst="rect">
@@ -7125,7 +7353,121 @@
                 <a:latin typeface="Arial" panose="020B0604020202020204" pitchFamily="34" charset="0"/>
                 <a:cs typeface="Arial" panose="020B0604020202020204" pitchFamily="34" charset="0"/>
               </a:rPr>
-              <a:t>0</a:t>
+              <a:t>0.003</a:t>
+            </a:r>
+          </a:p>
+        </p:txBody>
+      </p:sp>
+      <p:sp>
+        <p:nvSpPr>
+          <p:cNvPr id="19" name="TextBox 18">
+            <a:extLst>
+              <a:ext uri="{FF2B5EF4-FFF2-40B4-BE49-F238E27FC236}">
+                <a16:creationId xmlns:a16="http://schemas.microsoft.com/office/drawing/2014/main" id="{D45C2AEA-599D-514D-99FC-0EEAC9E6C3A6}"/>
+              </a:ext>
+            </a:extLst>
+          </p:cNvPr>
+          <p:cNvSpPr txBox="1"/>
+          <p:nvPr/>
+        </p:nvSpPr>
+        <p:spPr>
+          <a:xfrm>
+            <a:off x="5747111" y="3996999"/>
+            <a:ext cx="1191690" cy="369332"/>
+          </a:xfrm>
+          <a:prstGeom prst="rect">
+            <a:avLst/>
+          </a:prstGeom>
+          <a:noFill/>
+        </p:spPr>
+        <p:txBody>
+          <a:bodyPr wrap="square" rtlCol="0">
+            <a:spAutoFit/>
+          </a:bodyPr>
+          <a:lstStyle/>
+          <a:p>
+            <a:r>
+              <a:rPr lang="en-US" dirty="0">
+                <a:latin typeface="Arial" panose="020B0604020202020204" pitchFamily="34" charset="0"/>
+                <a:cs typeface="Arial" panose="020B0604020202020204" pitchFamily="34" charset="0"/>
+              </a:rPr>
+              <a:t>-0.004</a:t>
+            </a:r>
+          </a:p>
+        </p:txBody>
+      </p:sp>
+      <p:sp>
+        <p:nvSpPr>
+          <p:cNvPr id="20" name="TextBox 19">
+            <a:extLst>
+              <a:ext uri="{FF2B5EF4-FFF2-40B4-BE49-F238E27FC236}">
+                <a16:creationId xmlns:a16="http://schemas.microsoft.com/office/drawing/2014/main" id="{2EE6FE01-9CD9-5A4E-8A4C-38AC0ADDFC28}"/>
+              </a:ext>
+            </a:extLst>
+          </p:cNvPr>
+          <p:cNvSpPr txBox="1"/>
+          <p:nvPr/>
+        </p:nvSpPr>
+        <p:spPr>
+          <a:xfrm>
+            <a:off x="4142411" y="3777256"/>
+            <a:ext cx="1191690" cy="369332"/>
+          </a:xfrm>
+          <a:prstGeom prst="rect">
+            <a:avLst/>
+          </a:prstGeom>
+          <a:noFill/>
+        </p:spPr>
+        <p:txBody>
+          <a:bodyPr wrap="square" rtlCol="0">
+            <a:spAutoFit/>
+          </a:bodyPr>
+          <a:lstStyle/>
+          <a:p>
+            <a:r>
+              <a:rPr lang="en-US" dirty="0">
+                <a:latin typeface="Arial" panose="020B0604020202020204" pitchFamily="34" charset="0"/>
+                <a:cs typeface="Arial" panose="020B0604020202020204" pitchFamily="34" charset="0"/>
+              </a:rPr>
+              <a:t>-0.007</a:t>
+            </a:r>
+          </a:p>
+        </p:txBody>
+      </p:sp>
+      <p:sp>
+        <p:nvSpPr>
+          <p:cNvPr id="21" name="TextBox 20">
+            <a:extLst>
+              <a:ext uri="{FF2B5EF4-FFF2-40B4-BE49-F238E27FC236}">
+                <a16:creationId xmlns:a16="http://schemas.microsoft.com/office/drawing/2014/main" id="{5A2A41AC-37B8-3A43-9997-E6848A0D1F9B}"/>
+              </a:ext>
+            </a:extLst>
+          </p:cNvPr>
+          <p:cNvSpPr txBox="1"/>
+          <p:nvPr/>
+        </p:nvSpPr>
+        <p:spPr>
+          <a:xfrm>
+            <a:off x="4892435" y="2535861"/>
+            <a:ext cx="1191690" cy="369332"/>
+          </a:xfrm>
+          <a:prstGeom prst="rect">
+            <a:avLst/>
+          </a:prstGeom>
+          <a:noFill/>
+        </p:spPr>
+        <p:txBody>
+          <a:bodyPr wrap="square" rtlCol="0">
+            <a:spAutoFit/>
+          </a:bodyPr>
+          <a:lstStyle/>
+          <a:p>
+            <a:r>
+              <a:rPr lang="en-US" dirty="0">
+                <a:latin typeface="Arial" panose="020B0604020202020204" pitchFamily="34" charset="0"/>
+                <a:cs typeface="Arial" panose="020B0604020202020204" pitchFamily="34" charset="0"/>
+              </a:rPr>
+              <a:t>-0.007</a:t>
             </a:r>
           </a:p>
         </p:txBody>
@@ -7203,96 +7545,6 @@
           </a:fontRef>
         </p:style>
       </p:cxnSp>
-      <p:pic>
-        <p:nvPicPr>
-          <p:cNvPr id="4" name="Picture 3" descr="Diagram, venn diagram&#10;&#10;Description automatically generated">
-            <a:extLst>
-              <a:ext uri="{FF2B5EF4-FFF2-40B4-BE49-F238E27FC236}">
-                <a16:creationId xmlns:a16="http://schemas.microsoft.com/office/drawing/2014/main" id="{24938801-CD55-1D43-A9F2-45ABF628FF1B}"/>
-              </a:ext>
-            </a:extLst>
-          </p:cNvPr>
-          <p:cNvPicPr>
-            <a:picLocks noChangeAspect="1"/>
-          </p:cNvPicPr>
-          <p:nvPr/>
-        </p:nvPicPr>
-        <p:blipFill>
-          <a:blip r:embed="rId2"/>
-          <a:stretch>
-            <a:fillRect/>
-          </a:stretch>
-        </p:blipFill>
-        <p:spPr>
-          <a:xfrm>
-            <a:off x="3349371" y="3428592"/>
-            <a:ext cx="4274057" cy="3382012"/>
-          </a:xfrm>
-          <a:prstGeom prst="rect">
-            <a:avLst/>
-          </a:prstGeom>
-        </p:spPr>
-      </p:pic>
-      <p:pic>
-        <p:nvPicPr>
-          <p:cNvPr id="8" name="Picture 7" descr="Diagram, venn diagram&#10;&#10;Description automatically generated">
-            <a:extLst>
-              <a:ext uri="{FF2B5EF4-FFF2-40B4-BE49-F238E27FC236}">
-                <a16:creationId xmlns:a16="http://schemas.microsoft.com/office/drawing/2014/main" id="{5D9C5DD3-27C9-6643-827C-A522F6902B7E}"/>
-              </a:ext>
-            </a:extLst>
-          </p:cNvPr>
-          <p:cNvPicPr>
-            <a:picLocks noChangeAspect="1"/>
-          </p:cNvPicPr>
-          <p:nvPr/>
-        </p:nvPicPr>
-        <p:blipFill>
-          <a:blip r:embed="rId3"/>
-          <a:stretch>
-            <a:fillRect/>
-          </a:stretch>
-        </p:blipFill>
-        <p:spPr>
-          <a:xfrm>
-            <a:off x="1005905" y="59271"/>
-            <a:ext cx="4274062" cy="3382016"/>
-          </a:xfrm>
-          <a:prstGeom prst="rect">
-            <a:avLst/>
-          </a:prstGeom>
-        </p:spPr>
-      </p:pic>
-      <p:pic>
-        <p:nvPicPr>
-          <p:cNvPr id="11" name="Picture 10" descr="Diagram, venn diagram&#10;&#10;Description automatically generated">
-            <a:extLst>
-              <a:ext uri="{FF2B5EF4-FFF2-40B4-BE49-F238E27FC236}">
-                <a16:creationId xmlns:a16="http://schemas.microsoft.com/office/drawing/2014/main" id="{23E9CB6A-A98A-1746-9C25-949243428D32}"/>
-              </a:ext>
-            </a:extLst>
-          </p:cNvPr>
-          <p:cNvPicPr>
-            <a:picLocks noChangeAspect="1"/>
-          </p:cNvPicPr>
-          <p:nvPr/>
-        </p:nvPicPr>
-        <p:blipFill>
-          <a:blip r:embed="rId4"/>
-          <a:stretch>
-            <a:fillRect/>
-          </a:stretch>
-        </p:blipFill>
-        <p:spPr>
-          <a:xfrm>
-            <a:off x="5436854" y="59272"/>
-            <a:ext cx="4274059" cy="3382014"/>
-          </a:xfrm>
-          <a:prstGeom prst="rect">
-            <a:avLst/>
-          </a:prstGeom>
-        </p:spPr>
-      </p:pic>
       <p:cxnSp>
         <p:nvCxnSpPr>
           <p:cNvPr id="9" name="Straight Connector 8">
@@ -7336,6 +7588,96 @@
           </a:fontRef>
         </p:style>
       </p:cxnSp>
+      <p:pic>
+        <p:nvPicPr>
+          <p:cNvPr id="3" name="Picture 2" descr="Diagram, venn diagram&#10;&#10;Description automatically generated">
+            <a:extLst>
+              <a:ext uri="{FF2B5EF4-FFF2-40B4-BE49-F238E27FC236}">
+                <a16:creationId xmlns:a16="http://schemas.microsoft.com/office/drawing/2014/main" id="{1120F291-139B-7A49-90C0-F174CA4450F2}"/>
+              </a:ext>
+            </a:extLst>
+          </p:cNvPr>
+          <p:cNvPicPr>
+            <a:picLocks noChangeAspect="1"/>
+          </p:cNvPicPr>
+          <p:nvPr/>
+        </p:nvPicPr>
+        <p:blipFill>
+          <a:blip r:embed="rId2"/>
+          <a:stretch>
+            <a:fillRect/>
+          </a:stretch>
+        </p:blipFill>
+        <p:spPr>
+          <a:xfrm>
+            <a:off x="3391916" y="3437904"/>
+            <a:ext cx="3932988" cy="3274969"/>
+          </a:xfrm>
+          <a:prstGeom prst="rect">
+            <a:avLst/>
+          </a:prstGeom>
+        </p:spPr>
+      </p:pic>
+      <p:pic>
+        <p:nvPicPr>
+          <p:cNvPr id="6" name="Picture 5" descr="Diagram, venn diagram&#10;&#10;Description automatically generated">
+            <a:extLst>
+              <a:ext uri="{FF2B5EF4-FFF2-40B4-BE49-F238E27FC236}">
+                <a16:creationId xmlns:a16="http://schemas.microsoft.com/office/drawing/2014/main" id="{1B5B60BC-D898-4A47-B596-C2D4674E0169}"/>
+              </a:ext>
+            </a:extLst>
+          </p:cNvPr>
+          <p:cNvPicPr>
+            <a:picLocks noChangeAspect="1"/>
+          </p:cNvPicPr>
+          <p:nvPr/>
+        </p:nvPicPr>
+        <p:blipFill>
+          <a:blip r:embed="rId3"/>
+          <a:stretch>
+            <a:fillRect/>
+          </a:stretch>
+        </p:blipFill>
+        <p:spPr>
+          <a:xfrm>
+            <a:off x="5486400" y="145127"/>
+            <a:ext cx="3932989" cy="3274970"/>
+          </a:xfrm>
+          <a:prstGeom prst="rect">
+            <a:avLst/>
+          </a:prstGeom>
+        </p:spPr>
+      </p:pic>
+      <p:pic>
+        <p:nvPicPr>
+          <p:cNvPr id="10" name="Picture 9" descr="Diagram, venn diagram&#10;&#10;Description automatically generated">
+            <a:extLst>
+              <a:ext uri="{FF2B5EF4-FFF2-40B4-BE49-F238E27FC236}">
+                <a16:creationId xmlns:a16="http://schemas.microsoft.com/office/drawing/2014/main" id="{76796962-AFFC-3843-B71F-8707CB729E2D}"/>
+              </a:ext>
+            </a:extLst>
+          </p:cNvPr>
+          <p:cNvPicPr>
+            <a:picLocks noChangeAspect="1"/>
+          </p:cNvPicPr>
+          <p:nvPr/>
+        </p:nvPicPr>
+        <p:blipFill>
+          <a:blip r:embed="rId4"/>
+          <a:stretch>
+            <a:fillRect/>
+          </a:stretch>
+        </p:blipFill>
+        <p:spPr>
+          <a:xfrm>
+            <a:off x="1576689" y="145125"/>
+            <a:ext cx="3630453" cy="3274971"/>
+          </a:xfrm>
+          <a:prstGeom prst="rect">
+            <a:avLst/>
+          </a:prstGeom>
+        </p:spPr>
+      </p:pic>
     </p:spTree>
     <p:extLst>
       <p:ext uri="{BB962C8B-B14F-4D97-AF65-F5344CB8AC3E}">

</xml_diff>

<commit_message>
Results w/ fixed range area calculations
</commit_message>
<xml_diff>
--- a/figures/sem_venn_figures.pptx
+++ b/figures/sem_venn_figures.pptx
@@ -204,7 +204,7 @@
           <a:p>
             <a:fld id="{3361DBBF-9048-E34E-A120-F3301ADA26C3}" type="datetimeFigureOut">
               <a:rPr lang="en-US" smtClean="0"/>
-              <a:t>2/10/22</a:t>
+              <a:t>2/14/22</a:t>
             </a:fld>
             <a:endParaRPr lang="en-US"/>
           </a:p>
@@ -879,7 +879,7 @@
           <a:p>
             <a:fld id="{CD91ABF4-99EA-9A4C-8826-87C21CFC9DF7}" type="datetimeFigureOut">
               <a:rPr lang="en-US" smtClean="0"/>
-              <a:t>2/10/22</a:t>
+              <a:t>2/14/22</a:t>
             </a:fld>
             <a:endParaRPr lang="en-US" dirty="0"/>
           </a:p>
@@ -1077,7 +1077,7 @@
           <a:p>
             <a:fld id="{CD91ABF4-99EA-9A4C-8826-87C21CFC9DF7}" type="datetimeFigureOut">
               <a:rPr lang="en-US" smtClean="0"/>
-              <a:t>2/10/22</a:t>
+              <a:t>2/14/22</a:t>
             </a:fld>
             <a:endParaRPr lang="en-US" dirty="0"/>
           </a:p>
@@ -1285,7 +1285,7 @@
           <a:p>
             <a:fld id="{CD91ABF4-99EA-9A4C-8826-87C21CFC9DF7}" type="datetimeFigureOut">
               <a:rPr lang="en-US" smtClean="0"/>
-              <a:t>2/10/22</a:t>
+              <a:t>2/14/22</a:t>
             </a:fld>
             <a:endParaRPr lang="en-US" dirty="0"/>
           </a:p>
@@ -1483,7 +1483,7 @@
           <a:p>
             <a:fld id="{CD91ABF4-99EA-9A4C-8826-87C21CFC9DF7}" type="datetimeFigureOut">
               <a:rPr lang="en-US" smtClean="0"/>
-              <a:t>2/10/22</a:t>
+              <a:t>2/14/22</a:t>
             </a:fld>
             <a:endParaRPr lang="en-US" dirty="0"/>
           </a:p>
@@ -1758,7 +1758,7 @@
           <a:p>
             <a:fld id="{CD91ABF4-99EA-9A4C-8826-87C21CFC9DF7}" type="datetimeFigureOut">
               <a:rPr lang="en-US" smtClean="0"/>
-              <a:t>2/10/22</a:t>
+              <a:t>2/14/22</a:t>
             </a:fld>
             <a:endParaRPr lang="en-US" dirty="0"/>
           </a:p>
@@ -2023,7 +2023,7 @@
           <a:p>
             <a:fld id="{CD91ABF4-99EA-9A4C-8826-87C21CFC9DF7}" type="datetimeFigureOut">
               <a:rPr lang="en-US" smtClean="0"/>
-              <a:t>2/10/22</a:t>
+              <a:t>2/14/22</a:t>
             </a:fld>
             <a:endParaRPr lang="en-US" dirty="0"/>
           </a:p>
@@ -2435,7 +2435,7 @@
           <a:p>
             <a:fld id="{CD91ABF4-99EA-9A4C-8826-87C21CFC9DF7}" type="datetimeFigureOut">
               <a:rPr lang="en-US" smtClean="0"/>
-              <a:t>2/10/22</a:t>
+              <a:t>2/14/22</a:t>
             </a:fld>
             <a:endParaRPr lang="en-US" dirty="0"/>
           </a:p>
@@ -2576,7 +2576,7 @@
           <a:p>
             <a:fld id="{CD91ABF4-99EA-9A4C-8826-87C21CFC9DF7}" type="datetimeFigureOut">
               <a:rPr lang="en-US" smtClean="0"/>
-              <a:t>2/10/22</a:t>
+              <a:t>2/14/22</a:t>
             </a:fld>
             <a:endParaRPr lang="en-US" dirty="0"/>
           </a:p>
@@ -2689,7 +2689,7 @@
           <a:p>
             <a:fld id="{CD91ABF4-99EA-9A4C-8826-87C21CFC9DF7}" type="datetimeFigureOut">
               <a:rPr lang="en-US" smtClean="0"/>
-              <a:t>2/10/22</a:t>
+              <a:t>2/14/22</a:t>
             </a:fld>
             <a:endParaRPr lang="en-US" dirty="0"/>
           </a:p>
@@ -3000,7 +3000,7 @@
           <a:p>
             <a:fld id="{CD91ABF4-99EA-9A4C-8826-87C21CFC9DF7}" type="datetimeFigureOut">
               <a:rPr lang="en-US" smtClean="0"/>
-              <a:t>2/10/22</a:t>
+              <a:t>2/14/22</a:t>
             </a:fld>
             <a:endParaRPr lang="en-US" dirty="0"/>
           </a:p>
@@ -3288,7 +3288,7 @@
           <a:p>
             <a:fld id="{CD91ABF4-99EA-9A4C-8826-87C21CFC9DF7}" type="datetimeFigureOut">
               <a:rPr lang="en-US" smtClean="0"/>
-              <a:t>2/10/22</a:t>
+              <a:t>2/14/22</a:t>
             </a:fld>
             <a:endParaRPr lang="en-US" dirty="0"/>
           </a:p>
@@ -3529,7 +3529,7 @@
           <a:p>
             <a:fld id="{CD91ABF4-99EA-9A4C-8826-87C21CFC9DF7}" type="datetimeFigureOut">
               <a:rPr lang="en-US" smtClean="0"/>
-              <a:t>2/10/22</a:t>
+              <a:t>2/14/22</a:t>
             </a:fld>
             <a:endParaRPr lang="en-US" dirty="0"/>
           </a:p>
@@ -4813,7 +4813,7 @@
         </p:nvSpPr>
         <p:spPr>
           <a:xfrm>
-            <a:off x="6057241" y="2948820"/>
+            <a:off x="6070493" y="2948820"/>
             <a:ext cx="982109" cy="369332"/>
           </a:xfrm>
           <a:prstGeom prst="rect">
@@ -4837,7 +4837,7 @@
                 <a:latin typeface="Arial" panose="020B0604020202020204" pitchFamily="34" charset="0"/>
                 <a:cs typeface="Arial" panose="020B0604020202020204" pitchFamily="34" charset="0"/>
               </a:rPr>
-              <a:t>0.391**</a:t>
+              <a:t>0.477*</a:t>
             </a:r>
           </a:p>
         </p:txBody>
@@ -4880,7 +4880,7 @@
                 <a:latin typeface="Arial" panose="020B0604020202020204" pitchFamily="34" charset="0"/>
                 <a:cs typeface="Arial" panose="020B0604020202020204" pitchFamily="34" charset="0"/>
               </a:rPr>
-              <a:t>0.237***</a:t>
+              <a:t>0.247*</a:t>
             </a:r>
           </a:p>
         </p:txBody>
@@ -5041,7 +5041,7 @@
                 <a:latin typeface="Arial" panose="020B0604020202020204" pitchFamily="34" charset="0"/>
                 <a:cs typeface="Arial" panose="020B0604020202020204" pitchFamily="34" charset="0"/>
               </a:rPr>
-              <a:t>= 0.13</a:t>
+              <a:t>= 0.16</a:t>
             </a:r>
           </a:p>
         </p:txBody>
@@ -5148,7 +5148,7 @@
                 <a:latin typeface="Arial" panose="020B0604020202020204" pitchFamily="34" charset="0"/>
                 <a:cs typeface="Arial" panose="020B0604020202020204" pitchFamily="34" charset="0"/>
               </a:rPr>
-              <a:t>-0.161</a:t>
+              <a:t>-0.090</a:t>
             </a:r>
           </a:p>
         </p:txBody>
@@ -5340,7 +5340,7 @@
                 <a:latin typeface="Arial" panose="020B0604020202020204" pitchFamily="34" charset="0"/>
                 <a:cs typeface="Arial" panose="020B0604020202020204" pitchFamily="34" charset="0"/>
               </a:rPr>
-              <a:t>-0.646</a:t>
+              <a:t>-0.900</a:t>
             </a:r>
           </a:p>
         </p:txBody>
@@ -5388,7 +5388,7 @@
                 <a:latin typeface="Arial" panose="020B0604020202020204" pitchFamily="34" charset="0"/>
                 <a:cs typeface="Arial" panose="020B0604020202020204" pitchFamily="34" charset="0"/>
               </a:rPr>
-              <a:t>-0.039</a:t>
+              <a:t>-0.040</a:t>
             </a:r>
           </a:p>
         </p:txBody>
@@ -6319,7 +6319,7 @@
                 <a:latin typeface="Arial" panose="020B0604020202020204" pitchFamily="34" charset="0"/>
                 <a:cs typeface="Arial" panose="020B0604020202020204" pitchFamily="34" charset="0"/>
               </a:rPr>
-              <a:t>0.039**</a:t>
+              <a:t>0.040**</a:t>
             </a:r>
           </a:p>
         </p:txBody>
@@ -6362,7 +6362,7 @@
                 <a:latin typeface="Arial" panose="020B0604020202020204" pitchFamily="34" charset="0"/>
                 <a:cs typeface="Arial" panose="020B0604020202020204" pitchFamily="34" charset="0"/>
               </a:rPr>
-              <a:t>0.407**</a:t>
+              <a:t>0.489**</a:t>
             </a:r>
           </a:p>
         </p:txBody>
@@ -6405,7 +6405,7 @@
                 <a:latin typeface="Arial" panose="020B0604020202020204" pitchFamily="34" charset="0"/>
                 <a:cs typeface="Arial" panose="020B0604020202020204" pitchFamily="34" charset="0"/>
               </a:rPr>
-              <a:t>0.229**</a:t>
+              <a:t>0.209*</a:t>
             </a:r>
           </a:p>
         </p:txBody>
@@ -6566,7 +6566,7 @@
                 <a:latin typeface="Arial" panose="020B0604020202020204" pitchFamily="34" charset="0"/>
                 <a:cs typeface="Arial" panose="020B0604020202020204" pitchFamily="34" charset="0"/>
               </a:rPr>
-              <a:t>= 0.14</a:t>
+              <a:t>= 0.15</a:t>
             </a:r>
           </a:p>
         </p:txBody>
@@ -6673,7 +6673,7 @@
                 <a:latin typeface="Arial" panose="020B0604020202020204" pitchFamily="34" charset="0"/>
                 <a:cs typeface="Arial" panose="020B0604020202020204" pitchFamily="34" charset="0"/>
               </a:rPr>
-              <a:t>-0.133</a:t>
+              <a:t>-0.016</a:t>
             </a:r>
           </a:p>
         </p:txBody>
@@ -6769,7 +6769,7 @@
                 <a:latin typeface="Arial" panose="020B0604020202020204" pitchFamily="34" charset="0"/>
                 <a:cs typeface="Arial" panose="020B0604020202020204" pitchFamily="34" charset="0"/>
               </a:rPr>
-              <a:t>0.002</a:t>
+              <a:t>0.004</a:t>
             </a:r>
           </a:p>
         </p:txBody>
@@ -6865,7 +6865,7 @@
                 <a:latin typeface="Arial" panose="020B0604020202020204" pitchFamily="34" charset="0"/>
                 <a:cs typeface="Arial" panose="020B0604020202020204" pitchFamily="34" charset="0"/>
               </a:rPr>
-              <a:t>-0.779</a:t>
+              <a:t>-0.925</a:t>
             </a:r>
           </a:p>
         </p:txBody>
@@ -7930,7 +7930,7 @@
                 <a:latin typeface="Arial" panose="020B0604020202020204" pitchFamily="34" charset="0"/>
                 <a:cs typeface="Arial" panose="020B0604020202020204" pitchFamily="34" charset="0"/>
               </a:rPr>
-              <a:t>0.307*</a:t>
+              <a:t>0.339**</a:t>
             </a:r>
           </a:p>
         </p:txBody>
@@ -7973,7 +7973,7 @@
                 <a:latin typeface="Arial" panose="020B0604020202020204" pitchFamily="34" charset="0"/>
                 <a:cs typeface="Arial" panose="020B0604020202020204" pitchFamily="34" charset="0"/>
               </a:rPr>
-              <a:t>0.243***</a:t>
+              <a:t>0.248***</a:t>
             </a:r>
           </a:p>
         </p:txBody>
@@ -8134,7 +8134,7 @@
                 <a:latin typeface="Arial" panose="020B0604020202020204" pitchFamily="34" charset="0"/>
                 <a:cs typeface="Arial" panose="020B0604020202020204" pitchFamily="34" charset="0"/>
               </a:rPr>
-              <a:t>= 0.11</a:t>
+              <a:t>= 0.13</a:t>
             </a:r>
           </a:p>
         </p:txBody>
@@ -8241,7 +8241,7 @@
                 <a:latin typeface="Arial" panose="020B0604020202020204" pitchFamily="34" charset="0"/>
                 <a:cs typeface="Arial" panose="020B0604020202020204" pitchFamily="34" charset="0"/>
               </a:rPr>
-              <a:t>-0.034</a:t>
+              <a:t>-0.085</a:t>
             </a:r>
           </a:p>
         </p:txBody>
@@ -8433,7 +8433,7 @@
                 <a:latin typeface="Arial" panose="020B0604020202020204" pitchFamily="34" charset="0"/>
                 <a:cs typeface="Arial" panose="020B0604020202020204" pitchFamily="34" charset="0"/>
               </a:rPr>
-              <a:t>-1.03</a:t>
+              <a:t>-0.34</a:t>
             </a:r>
           </a:p>
         </p:txBody>
@@ -8924,7 +8924,7 @@
                 <a:latin typeface="Arial" panose="020B0604020202020204" pitchFamily="34" charset="0"/>
                 <a:cs typeface="Arial" panose="020B0604020202020204" pitchFamily="34" charset="0"/>
               </a:rPr>
-              <a:t>0.002</a:t>
+              <a:t>-0.010</a:t>
             </a:r>
           </a:p>
         </p:txBody>
@@ -8962,7 +8962,7 @@
                 <a:latin typeface="Arial" panose="020B0604020202020204" pitchFamily="34" charset="0"/>
                 <a:cs typeface="Arial" panose="020B0604020202020204" pitchFamily="34" charset="0"/>
               </a:rPr>
-              <a:t>0.009</a:t>
+              <a:t>0.010</a:t>
             </a:r>
           </a:p>
         </p:txBody>
@@ -9000,7 +9000,7 @@
                 <a:latin typeface="Arial" panose="020B0604020202020204" pitchFamily="34" charset="0"/>
                 <a:cs typeface="Arial" panose="020B0604020202020204" pitchFamily="34" charset="0"/>
               </a:rPr>
-              <a:t>0.001</a:t>
+              <a:t>-0.001</a:t>
             </a:r>
           </a:p>
         </p:txBody>
@@ -9137,7 +9137,7 @@
                 <a:latin typeface="Arial" panose="020B0604020202020204" pitchFamily="34" charset="0"/>
                 <a:cs typeface="Arial" panose="020B0604020202020204" pitchFamily="34" charset="0"/>
               </a:rPr>
-              <a:t>    0.001</a:t>
+              <a:t>    0.003</a:t>
             </a:r>
           </a:p>
         </p:txBody>
@@ -9175,7 +9175,7 @@
                 <a:latin typeface="Arial" panose="020B0604020202020204" pitchFamily="34" charset="0"/>
                 <a:cs typeface="Arial" panose="020B0604020202020204" pitchFamily="34" charset="0"/>
               </a:rPr>
-              <a:t>    -0.002</a:t>
+              <a:t>    -0.001</a:t>
             </a:r>
           </a:p>
         </p:txBody>
@@ -9213,7 +9213,7 @@
                 <a:latin typeface="Arial" panose="020B0604020202020204" pitchFamily="34" charset="0"/>
                 <a:cs typeface="Arial" panose="020B0604020202020204" pitchFamily="34" charset="0"/>
               </a:rPr>
-              <a:t>   -0.004</a:t>
+              <a:t>   -0.002</a:t>
             </a:r>
           </a:p>
         </p:txBody>
@@ -9251,7 +9251,7 @@
                 <a:latin typeface="Arial" panose="020B0604020202020204" pitchFamily="34" charset="0"/>
                 <a:cs typeface="Arial" panose="020B0604020202020204" pitchFamily="34" charset="0"/>
               </a:rPr>
-              <a:t>    -0.010</a:t>
+              <a:t>    -0.012</a:t>
             </a:r>
           </a:p>
         </p:txBody>
@@ -9603,7 +9603,7 @@
                 <a:latin typeface="Arial" panose="020B0604020202020204" pitchFamily="34" charset="0"/>
                 <a:cs typeface="Arial" panose="020B0604020202020204" pitchFamily="34" charset="0"/>
               </a:rPr>
-              <a:t>0.080</a:t>
+              <a:t>0.046</a:t>
             </a:r>
           </a:p>
         </p:txBody>
@@ -9641,7 +9641,7 @@
                 <a:latin typeface="Arial" panose="020B0604020202020204" pitchFamily="34" charset="0"/>
                 <a:cs typeface="Arial" panose="020B0604020202020204" pitchFamily="34" charset="0"/>
               </a:rPr>
-              <a:t>0.013</a:t>
+              <a:t>0.005</a:t>
             </a:r>
           </a:p>
         </p:txBody>
@@ -9679,7 +9679,7 @@
                 <a:latin typeface="Arial" panose="020B0604020202020204" pitchFamily="34" charset="0"/>
                 <a:cs typeface="Arial" panose="020B0604020202020204" pitchFamily="34" charset="0"/>
               </a:rPr>
-              <a:t>0.014</a:t>
+              <a:t>-0.002</a:t>
             </a:r>
           </a:p>
         </p:txBody>
@@ -9717,7 +9717,7 @@
                 <a:latin typeface="Arial" panose="020B0604020202020204" pitchFamily="34" charset="0"/>
                 <a:cs typeface="Arial" panose="020B0604020202020204" pitchFamily="34" charset="0"/>
               </a:rPr>
-              <a:t>0.051</a:t>
+              <a:t>0.026</a:t>
             </a:r>
           </a:p>
         </p:txBody>
@@ -9769,7 +9769,7 @@
                 <a:latin typeface="Arial" panose="020B0604020202020204" pitchFamily="34" charset="0"/>
                 <a:cs typeface="Arial" panose="020B0604020202020204" pitchFamily="34" charset="0"/>
               </a:rPr>
-              <a:t> = 0.14</a:t>
+              <a:t> = 0.10</a:t>
             </a:r>
           </a:p>
         </p:txBody>
@@ -9854,7 +9854,7 @@
                 <a:latin typeface="Arial" panose="020B0604020202020204" pitchFamily="34" charset="0"/>
                 <a:cs typeface="Arial" panose="020B0604020202020204" pitchFamily="34" charset="0"/>
               </a:rPr>
-              <a:t>-0.006</a:t>
+              <a:t>-0.008</a:t>
             </a:r>
           </a:p>
         </p:txBody>
@@ -9892,7 +9892,7 @@
                 <a:latin typeface="Arial" panose="020B0604020202020204" pitchFamily="34" charset="0"/>
                 <a:cs typeface="Arial" panose="020B0604020202020204" pitchFamily="34" charset="0"/>
               </a:rPr>
-              <a:t>-0.006</a:t>
+              <a:t>-0.001</a:t>
             </a:r>
           </a:p>
         </p:txBody>
@@ -9930,7 +9930,7 @@
                 <a:latin typeface="Arial" panose="020B0604020202020204" pitchFamily="34" charset="0"/>
                 <a:cs typeface="Arial" panose="020B0604020202020204" pitchFamily="34" charset="0"/>
               </a:rPr>
-              <a:t>-0.007</a:t>
+              <a:t>-0.002</a:t>
             </a:r>
           </a:p>
         </p:txBody>
@@ -10035,8 +10035,8 @@
         </p:nvSpPr>
         <p:spPr>
           <a:xfrm>
-            <a:off x="4820636" y="1691793"/>
-            <a:ext cx="3239935" cy="3237807"/>
+            <a:off x="4813888" y="1775688"/>
+            <a:ext cx="2825868" cy="2835859"/>
           </a:xfrm>
           <a:prstGeom prst="ellipse">
             <a:avLst/>
@@ -10282,7 +10282,7 @@
                 <a:latin typeface="Arial" panose="020B0604020202020204" pitchFamily="34" charset="0"/>
                 <a:cs typeface="Arial" panose="020B0604020202020204" pitchFamily="34" charset="0"/>
               </a:rPr>
-              <a:t>0.043</a:t>
+              <a:t>0.034</a:t>
             </a:r>
           </a:p>
         </p:txBody>
@@ -10320,7 +10320,7 @@
                 <a:latin typeface="Arial" panose="020B0604020202020204" pitchFamily="34" charset="0"/>
                 <a:cs typeface="Arial" panose="020B0604020202020204" pitchFamily="34" charset="0"/>
               </a:rPr>
-              <a:t>0.030</a:t>
+              <a:t>0.033</a:t>
             </a:r>
           </a:p>
         </p:txBody>
@@ -10358,7 +10358,7 @@
                 <a:latin typeface="Arial" panose="020B0604020202020204" pitchFamily="34" charset="0"/>
                 <a:cs typeface="Arial" panose="020B0604020202020204" pitchFamily="34" charset="0"/>
               </a:rPr>
-              <a:t>-0.0001</a:t>
+              <a:t>-0.011</a:t>
             </a:r>
           </a:p>
         </p:txBody>
@@ -10410,7 +10410,7 @@
                 <a:latin typeface="Arial" panose="020B0604020202020204" pitchFamily="34" charset="0"/>
                 <a:cs typeface="Arial" panose="020B0604020202020204" pitchFamily="34" charset="0"/>
               </a:rPr>
-              <a:t> = 0.06</a:t>
+              <a:t> = 0.09</a:t>
             </a:r>
           </a:p>
         </p:txBody>
@@ -10495,7 +10495,7 @@
                 <a:latin typeface="Arial" panose="020B0604020202020204" pitchFamily="34" charset="0"/>
                 <a:cs typeface="Arial" panose="020B0604020202020204" pitchFamily="34" charset="0"/>
               </a:rPr>
-              <a:t>0.003</a:t>
+              <a:t>0.001</a:t>
             </a:r>
           </a:p>
         </p:txBody>
@@ -10533,7 +10533,7 @@
                 <a:latin typeface="Arial" panose="020B0604020202020204" pitchFamily="34" charset="0"/>
                 <a:cs typeface="Arial" panose="020B0604020202020204" pitchFamily="34" charset="0"/>
               </a:rPr>
-              <a:t>-0.004</a:t>
+              <a:t>0.003</a:t>
             </a:r>
           </a:p>
         </p:txBody>
@@ -10571,7 +10571,7 @@
                 <a:latin typeface="Arial" panose="020B0604020202020204" pitchFamily="34" charset="0"/>
                 <a:cs typeface="Arial" panose="020B0604020202020204" pitchFamily="34" charset="0"/>
               </a:rPr>
-              <a:t>-0.007</a:t>
+              <a:t>0.004</a:t>
             </a:r>
           </a:p>
         </p:txBody>
@@ -10609,7 +10609,7 @@
                 <a:latin typeface="Arial" panose="020B0604020202020204" pitchFamily="34" charset="0"/>
                 <a:cs typeface="Arial" panose="020B0604020202020204" pitchFamily="34" charset="0"/>
               </a:rPr>
-              <a:t>-0.007</a:t>
+              <a:t>-0.006</a:t>
             </a:r>
           </a:p>
         </p:txBody>
@@ -10732,10 +10732,10 @@
       </p:cxnSp>
       <p:pic>
         <p:nvPicPr>
-          <p:cNvPr id="4" name="Picture 3" descr="Diagram, venn diagram&#10;&#10;Description automatically generated">
-            <a:extLst>
-              <a:ext uri="{FF2B5EF4-FFF2-40B4-BE49-F238E27FC236}">
-                <a16:creationId xmlns:a16="http://schemas.microsoft.com/office/drawing/2014/main" id="{E8A96F3E-3011-3D4D-8F5D-DA501A9A2E35}"/>
+          <p:cNvPr id="3" name="Picture 2" descr="Diagram, venn diagram&#10;&#10;Description automatically generated">
+            <a:extLst>
+              <a:ext uri="{FF2B5EF4-FFF2-40B4-BE49-F238E27FC236}">
+                <a16:creationId xmlns:a16="http://schemas.microsoft.com/office/drawing/2014/main" id="{686A2AE3-6E91-444B-87F0-BB6AE75C75BA}"/>
               </a:ext>
             </a:extLst>
           </p:cNvPr>
@@ -10752,8 +10752,8 @@
         </p:blipFill>
         <p:spPr>
           <a:xfrm>
-            <a:off x="5684937" y="305232"/>
-            <a:ext cx="3366147" cy="3032434"/>
+            <a:off x="1497946" y="0"/>
+            <a:ext cx="3860464" cy="3298942"/>
           </a:xfrm>
           <a:prstGeom prst="rect">
             <a:avLst/>
@@ -10762,10 +10762,10 @@
       </p:pic>
       <p:pic>
         <p:nvPicPr>
-          <p:cNvPr id="7" name="Picture 6" descr="Diagram, venn diagram&#10;&#10;Description automatically generated">
-            <a:extLst>
-              <a:ext uri="{FF2B5EF4-FFF2-40B4-BE49-F238E27FC236}">
-                <a16:creationId xmlns:a16="http://schemas.microsoft.com/office/drawing/2014/main" id="{5F115469-36B5-A747-B737-441CE7A7433D}"/>
+          <p:cNvPr id="6" name="Picture 5" descr="Diagram, venn diagram&#10;&#10;Description automatically generated">
+            <a:extLst>
+              <a:ext uri="{FF2B5EF4-FFF2-40B4-BE49-F238E27FC236}">
+                <a16:creationId xmlns:a16="http://schemas.microsoft.com/office/drawing/2014/main" id="{3FC4FCF2-7792-914B-AFE0-9C0126116CAA}"/>
               </a:ext>
             </a:extLst>
           </p:cNvPr>
@@ -10782,8 +10782,8 @@
         </p:blipFill>
         <p:spPr>
           <a:xfrm>
-            <a:off x="1459469" y="311160"/>
-            <a:ext cx="3384375" cy="3048855"/>
+            <a:off x="5486400" y="7"/>
+            <a:ext cx="3909383" cy="3340745"/>
           </a:xfrm>
           <a:prstGeom prst="rect">
             <a:avLst/>
@@ -10792,10 +10792,10 @@
       </p:pic>
       <p:pic>
         <p:nvPicPr>
-          <p:cNvPr id="11" name="Picture 10" descr="Diagram, venn diagram&#10;&#10;Description automatically generated">
-            <a:extLst>
-              <a:ext uri="{FF2B5EF4-FFF2-40B4-BE49-F238E27FC236}">
-                <a16:creationId xmlns:a16="http://schemas.microsoft.com/office/drawing/2014/main" id="{775775FB-2621-D247-A7F9-FD5B34E29904}"/>
+          <p:cNvPr id="14" name="Picture 13" descr="Diagram, venn diagram&#10;&#10;Description automatically generated">
+            <a:extLst>
+              <a:ext uri="{FF2B5EF4-FFF2-40B4-BE49-F238E27FC236}">
+                <a16:creationId xmlns:a16="http://schemas.microsoft.com/office/drawing/2014/main" id="{308E7928-6DCF-6C4B-BBA0-CC492670E22C}"/>
               </a:ext>
             </a:extLst>
           </p:cNvPr>
@@ -10812,8 +10812,8 @@
         </p:blipFill>
         <p:spPr>
           <a:xfrm>
-            <a:off x="3872853" y="3437904"/>
-            <a:ext cx="3269352" cy="2945236"/>
+            <a:off x="3428178" y="3437904"/>
+            <a:ext cx="3909370" cy="3340734"/>
           </a:xfrm>
           <a:prstGeom prst="rect">
             <a:avLst/>

</xml_diff>

<commit_message>
weight responses in SEM by confint
</commit_message>
<xml_diff>
--- a/figures/sem_venn_figures.pptx
+++ b/figures/sem_venn_figures.pptx
@@ -204,7 +204,7 @@
           <a:p>
             <a:fld id="{3361DBBF-9048-E34E-A120-F3301ADA26C3}" type="datetimeFigureOut">
               <a:rPr lang="en-US" smtClean="0"/>
-              <a:t>2/14/22</a:t>
+              <a:t>4/9/22</a:t>
             </a:fld>
             <a:endParaRPr lang="en-US"/>
           </a:p>
@@ -879,7 +879,7 @@
           <a:p>
             <a:fld id="{CD91ABF4-99EA-9A4C-8826-87C21CFC9DF7}" type="datetimeFigureOut">
               <a:rPr lang="en-US" smtClean="0"/>
-              <a:t>2/14/22</a:t>
+              <a:t>4/9/22</a:t>
             </a:fld>
             <a:endParaRPr lang="en-US" dirty="0"/>
           </a:p>
@@ -1077,7 +1077,7 @@
           <a:p>
             <a:fld id="{CD91ABF4-99EA-9A4C-8826-87C21CFC9DF7}" type="datetimeFigureOut">
               <a:rPr lang="en-US" smtClean="0"/>
-              <a:t>2/14/22</a:t>
+              <a:t>4/9/22</a:t>
             </a:fld>
             <a:endParaRPr lang="en-US" dirty="0"/>
           </a:p>
@@ -1285,7 +1285,7 @@
           <a:p>
             <a:fld id="{CD91ABF4-99EA-9A4C-8826-87C21CFC9DF7}" type="datetimeFigureOut">
               <a:rPr lang="en-US" smtClean="0"/>
-              <a:t>2/14/22</a:t>
+              <a:t>4/9/22</a:t>
             </a:fld>
             <a:endParaRPr lang="en-US" dirty="0"/>
           </a:p>
@@ -1483,7 +1483,7 @@
           <a:p>
             <a:fld id="{CD91ABF4-99EA-9A4C-8826-87C21CFC9DF7}" type="datetimeFigureOut">
               <a:rPr lang="en-US" smtClean="0"/>
-              <a:t>2/14/22</a:t>
+              <a:t>4/9/22</a:t>
             </a:fld>
             <a:endParaRPr lang="en-US" dirty="0"/>
           </a:p>
@@ -1758,7 +1758,7 @@
           <a:p>
             <a:fld id="{CD91ABF4-99EA-9A4C-8826-87C21CFC9DF7}" type="datetimeFigureOut">
               <a:rPr lang="en-US" smtClean="0"/>
-              <a:t>2/14/22</a:t>
+              <a:t>4/9/22</a:t>
             </a:fld>
             <a:endParaRPr lang="en-US" dirty="0"/>
           </a:p>
@@ -2023,7 +2023,7 @@
           <a:p>
             <a:fld id="{CD91ABF4-99EA-9A4C-8826-87C21CFC9DF7}" type="datetimeFigureOut">
               <a:rPr lang="en-US" smtClean="0"/>
-              <a:t>2/14/22</a:t>
+              <a:t>4/9/22</a:t>
             </a:fld>
             <a:endParaRPr lang="en-US" dirty="0"/>
           </a:p>
@@ -2435,7 +2435,7 @@
           <a:p>
             <a:fld id="{CD91ABF4-99EA-9A4C-8826-87C21CFC9DF7}" type="datetimeFigureOut">
               <a:rPr lang="en-US" smtClean="0"/>
-              <a:t>2/14/22</a:t>
+              <a:t>4/9/22</a:t>
             </a:fld>
             <a:endParaRPr lang="en-US" dirty="0"/>
           </a:p>
@@ -2576,7 +2576,7 @@
           <a:p>
             <a:fld id="{CD91ABF4-99EA-9A4C-8826-87C21CFC9DF7}" type="datetimeFigureOut">
               <a:rPr lang="en-US" smtClean="0"/>
-              <a:t>2/14/22</a:t>
+              <a:t>4/9/22</a:t>
             </a:fld>
             <a:endParaRPr lang="en-US" dirty="0"/>
           </a:p>
@@ -2689,7 +2689,7 @@
           <a:p>
             <a:fld id="{CD91ABF4-99EA-9A4C-8826-87C21CFC9DF7}" type="datetimeFigureOut">
               <a:rPr lang="en-US" smtClean="0"/>
-              <a:t>2/14/22</a:t>
+              <a:t>4/9/22</a:t>
             </a:fld>
             <a:endParaRPr lang="en-US" dirty="0"/>
           </a:p>
@@ -3000,7 +3000,7 @@
           <a:p>
             <a:fld id="{CD91ABF4-99EA-9A4C-8826-87C21CFC9DF7}" type="datetimeFigureOut">
               <a:rPr lang="en-US" smtClean="0"/>
-              <a:t>2/14/22</a:t>
+              <a:t>4/9/22</a:t>
             </a:fld>
             <a:endParaRPr lang="en-US" dirty="0"/>
           </a:p>
@@ -3288,7 +3288,7 @@
           <a:p>
             <a:fld id="{CD91ABF4-99EA-9A4C-8826-87C21CFC9DF7}" type="datetimeFigureOut">
               <a:rPr lang="en-US" smtClean="0"/>
-              <a:t>2/14/22</a:t>
+              <a:t>4/9/22</a:t>
             </a:fld>
             <a:endParaRPr lang="en-US" dirty="0"/>
           </a:p>
@@ -3529,7 +3529,7 @@
           <a:p>
             <a:fld id="{CD91ABF4-99EA-9A4C-8826-87C21CFC9DF7}" type="datetimeFigureOut">
               <a:rPr lang="en-US" smtClean="0"/>
-              <a:t>2/14/22</a:t>
+              <a:t>4/9/22</a:t>
             </a:fld>
             <a:endParaRPr lang="en-US" dirty="0"/>
           </a:p>
@@ -4258,11 +4258,13 @@
           <a:prstGeom prst="straightConnector1">
             <a:avLst/>
           </a:prstGeom>
-          <a:ln w="38100">
+          <a:ln w="28575">
             <a:solidFill>
-              <a:schemeClr val="tx1"/>
+              <a:schemeClr val="bg2">
+                <a:lumMod val="50000"/>
+              </a:schemeClr>
             </a:solidFill>
-            <a:prstDash val="solid"/>
+            <a:prstDash val="dash"/>
             <a:tailEnd type="triangle" w="lg" len="lg"/>
           </a:ln>
         </p:spPr>
@@ -4732,13 +4734,11 @@
               <a:gd name="adj1" fmla="val 6225000"/>
             </a:avLst>
           </a:prstGeom>
-          <a:ln w="28575">
+          <a:ln w="38100">
             <a:solidFill>
-              <a:schemeClr val="bg2">
-                <a:lumMod val="50000"/>
-              </a:schemeClr>
+              <a:schemeClr val="tx1"/>
             </a:solidFill>
-            <a:prstDash val="dash"/>
+            <a:prstDash val="solid"/>
             <a:headEnd w="lg" len="lg"/>
             <a:tailEnd type="triangle" w="lg" len="lg"/>
           </a:ln>
@@ -4772,7 +4772,7 @@
         </p:nvSpPr>
         <p:spPr>
           <a:xfrm>
-            <a:off x="1987018" y="3080146"/>
+            <a:off x="2167771" y="3093603"/>
             <a:ext cx="946560" cy="369332"/>
           </a:xfrm>
           <a:prstGeom prst="rect">
@@ -4791,10 +4791,15 @@
           <a:p>
             <a:r>
               <a:rPr lang="en-US" dirty="0">
-                <a:latin typeface="Arial" panose="020B0604020202020204" pitchFamily="34" charset="0"/>
-                <a:cs typeface="Arial" panose="020B0604020202020204" pitchFamily="34" charset="0"/>
-              </a:rPr>
-              <a:t>0.040**</a:t>
+                <a:solidFill>
+                  <a:schemeClr val="bg2">
+                    <a:lumMod val="50000"/>
+                  </a:schemeClr>
+                </a:solidFill>
+                <a:latin typeface="Arial" panose="020B0604020202020204" pitchFamily="34" charset="0"/>
+                <a:cs typeface="Arial" panose="020B0604020202020204" pitchFamily="34" charset="0"/>
+              </a:rPr>
+              <a:t>0.036</a:t>
             </a:r>
           </a:p>
         </p:txBody>
@@ -4837,7 +4842,7 @@
                 <a:latin typeface="Arial" panose="020B0604020202020204" pitchFamily="34" charset="0"/>
                 <a:cs typeface="Arial" panose="020B0604020202020204" pitchFamily="34" charset="0"/>
               </a:rPr>
-              <a:t>0.477*</a:t>
+              <a:t>0.370*</a:t>
             </a:r>
           </a:p>
         </p:txBody>
@@ -4880,7 +4885,7 @@
                 <a:latin typeface="Arial" panose="020B0604020202020204" pitchFamily="34" charset="0"/>
                 <a:cs typeface="Arial" panose="020B0604020202020204" pitchFamily="34" charset="0"/>
               </a:rPr>
-              <a:t>0.247*</a:t>
+              <a:t>0.396***</a:t>
             </a:r>
           </a:p>
         </p:txBody>
@@ -4923,7 +4928,7 @@
                 <a:latin typeface="Arial" panose="020B0604020202020204" pitchFamily="34" charset="0"/>
                 <a:cs typeface="Arial" panose="020B0604020202020204" pitchFamily="34" charset="0"/>
               </a:rPr>
-              <a:t>-2.279**</a:t>
+              <a:t>-3.66***</a:t>
             </a:r>
           </a:p>
         </p:txBody>
@@ -4982,7 +4987,7 @@
                 <a:latin typeface="Arial" panose="020B0604020202020204" pitchFamily="34" charset="0"/>
                 <a:cs typeface="Arial" panose="020B0604020202020204" pitchFamily="34" charset="0"/>
               </a:rPr>
-              <a:t>= 0.10</a:t>
+              <a:t>= 0.36</a:t>
             </a:r>
           </a:p>
         </p:txBody>
@@ -5041,7 +5046,7 @@
                 <a:latin typeface="Arial" panose="020B0604020202020204" pitchFamily="34" charset="0"/>
                 <a:cs typeface="Arial" panose="020B0604020202020204" pitchFamily="34" charset="0"/>
               </a:rPr>
-              <a:t>= 0.16</a:t>
+              <a:t>= 0.23</a:t>
             </a:r>
           </a:p>
         </p:txBody>
@@ -5100,7 +5105,7 @@
                 <a:latin typeface="Arial" panose="020B0604020202020204" pitchFamily="34" charset="0"/>
                 <a:cs typeface="Arial" panose="020B0604020202020204" pitchFamily="34" charset="0"/>
               </a:rPr>
-              <a:t>= 0.10</a:t>
+              <a:t>= 0.19</a:t>
             </a:r>
           </a:p>
         </p:txBody>
@@ -5148,7 +5153,7 @@
                 <a:latin typeface="Arial" panose="020B0604020202020204" pitchFamily="34" charset="0"/>
                 <a:cs typeface="Arial" panose="020B0604020202020204" pitchFamily="34" charset="0"/>
               </a:rPr>
-              <a:t>-0.090</a:t>
+              <a:t>0.149</a:t>
             </a:r>
           </a:p>
         </p:txBody>
@@ -5196,7 +5201,7 @@
                 <a:latin typeface="Arial" panose="020B0604020202020204" pitchFamily="34" charset="0"/>
                 <a:cs typeface="Arial" panose="020B0604020202020204" pitchFamily="34" charset="0"/>
               </a:rPr>
-              <a:t>0.486</a:t>
+              <a:t>0.470</a:t>
             </a:r>
           </a:p>
         </p:txBody>
@@ -5216,7 +5221,7 @@
         <p:spPr>
           <a:xfrm>
             <a:off x="5032538" y="3992468"/>
-            <a:ext cx="771792" cy="369332"/>
+            <a:ext cx="837112" cy="369332"/>
           </a:xfrm>
           <a:prstGeom prst="rect">
             <a:avLst/>
@@ -5244,7 +5249,7 @@
                 <a:latin typeface="Arial" panose="020B0604020202020204" pitchFamily="34" charset="0"/>
                 <a:cs typeface="Arial" panose="020B0604020202020204" pitchFamily="34" charset="0"/>
               </a:rPr>
-              <a:t>0.003</a:t>
+              <a:t>-0.014</a:t>
             </a:r>
           </a:p>
         </p:txBody>
@@ -5292,7 +5297,7 @@
                 <a:latin typeface="Arial" panose="020B0604020202020204" pitchFamily="34" charset="0"/>
                 <a:cs typeface="Arial" panose="020B0604020202020204" pitchFamily="34" charset="0"/>
               </a:rPr>
-              <a:t>0.067</a:t>
+              <a:t>0.041</a:t>
             </a:r>
           </a:p>
         </p:txBody>
@@ -5340,7 +5345,7 @@
                 <a:latin typeface="Arial" panose="020B0604020202020204" pitchFamily="34" charset="0"/>
                 <a:cs typeface="Arial" panose="020B0604020202020204" pitchFamily="34" charset="0"/>
               </a:rPr>
-              <a:t>-0.900</a:t>
+              <a:t>0.872</a:t>
             </a:r>
           </a:p>
         </p:txBody>
@@ -5388,7 +5393,7 @@
                 <a:latin typeface="Arial" panose="020B0604020202020204" pitchFamily="34" charset="0"/>
                 <a:cs typeface="Arial" panose="020B0604020202020204" pitchFamily="34" charset="0"/>
               </a:rPr>
-              <a:t>-0.040</a:t>
+              <a:t>0.098</a:t>
             </a:r>
           </a:p>
         </p:txBody>
@@ -5407,8 +5412,8 @@
         </p:nvSpPr>
         <p:spPr>
           <a:xfrm>
-            <a:off x="3544828" y="1189662"/>
-            <a:ext cx="770968" cy="369332"/>
+            <a:off x="3607812" y="958313"/>
+            <a:ext cx="1098850" cy="369332"/>
           </a:xfrm>
           <a:prstGeom prst="rect">
             <a:avLst/>
@@ -5428,15 +5433,10 @@
           <a:p>
             <a:r>
               <a:rPr lang="en-US" dirty="0">
-                <a:solidFill>
-                  <a:schemeClr val="bg2">
-                    <a:lumMod val="50000"/>
-                  </a:schemeClr>
-                </a:solidFill>
-                <a:latin typeface="Arial" panose="020B0604020202020204" pitchFamily="34" charset="0"/>
-                <a:cs typeface="Arial" panose="020B0604020202020204" pitchFamily="34" charset="0"/>
-              </a:rPr>
-              <a:t>0.008</a:t>
+                <a:latin typeface="Arial" panose="020B0604020202020204" pitchFamily="34" charset="0"/>
+                <a:cs typeface="Arial" panose="020B0604020202020204" pitchFamily="34" charset="0"/>
+              </a:rPr>
+              <a:t>0.037***</a:t>
             </a:r>
           </a:p>
         </p:txBody>
@@ -5783,11 +5783,13 @@
           <a:prstGeom prst="straightConnector1">
             <a:avLst/>
           </a:prstGeom>
-          <a:ln w="38100">
+          <a:ln w="28575">
             <a:solidFill>
-              <a:schemeClr val="tx1"/>
+              <a:schemeClr val="bg2">
+                <a:lumMod val="50000"/>
+              </a:schemeClr>
             </a:solidFill>
-            <a:prstDash val="solid"/>
+            <a:prstDash val="dash"/>
             <a:tailEnd type="triangle" w="lg" len="lg"/>
           </a:ln>
         </p:spPr>
@@ -5877,6 +5879,52 @@
           <a:prstGeom prst="straightConnector1">
             <a:avLst/>
           </a:prstGeom>
+          <a:ln w="38100">
+            <a:solidFill>
+              <a:schemeClr val="tx1"/>
+            </a:solidFill>
+            <a:prstDash val="solid"/>
+            <a:tailEnd type="triangle" w="lg" len="lg"/>
+          </a:ln>
+        </p:spPr>
+        <p:style>
+          <a:lnRef idx="1">
+            <a:schemeClr val="accent1"/>
+          </a:lnRef>
+          <a:fillRef idx="0">
+            <a:schemeClr val="accent1"/>
+          </a:fillRef>
+          <a:effectRef idx="0">
+            <a:schemeClr val="accent1"/>
+          </a:effectRef>
+          <a:fontRef idx="minor">
+            <a:schemeClr val="tx1"/>
+          </a:fontRef>
+        </p:style>
+      </p:cxnSp>
+      <p:cxnSp>
+        <p:nvCxnSpPr>
+          <p:cNvPr id="23" name="Straight Arrow Connector 22">
+            <a:extLst>
+              <a:ext uri="{FF2B5EF4-FFF2-40B4-BE49-F238E27FC236}">
+                <a16:creationId xmlns:a16="http://schemas.microsoft.com/office/drawing/2014/main" id="{B09799FA-F7A4-074D-97C1-C7E639CB1DC8}"/>
+              </a:ext>
+            </a:extLst>
+          </p:cNvPr>
+          <p:cNvCxnSpPr>
+            <a:cxnSpLocks/>
+            <a:stCxn id="4" idx="0"/>
+          </p:cNvCxnSpPr>
+          <p:nvPr/>
+        </p:nvCxnSpPr>
+        <p:spPr>
+          <a:xfrm flipV="1">
+            <a:off x="3018274" y="2313020"/>
+            <a:ext cx="2851376" cy="2343957"/>
+          </a:xfrm>
+          <a:prstGeom prst="straightConnector1">
+            <a:avLst/>
+          </a:prstGeom>
           <a:ln w="28575">
             <a:solidFill>
               <a:schemeClr val="bg2">
@@ -5904,23 +5952,69 @@
       </p:cxnSp>
       <p:cxnSp>
         <p:nvCxnSpPr>
-          <p:cNvPr id="23" name="Straight Arrow Connector 22">
-            <a:extLst>
-              <a:ext uri="{FF2B5EF4-FFF2-40B4-BE49-F238E27FC236}">
-                <a16:creationId xmlns:a16="http://schemas.microsoft.com/office/drawing/2014/main" id="{B09799FA-F7A4-074D-97C1-C7E639CB1DC8}"/>
+          <p:cNvPr id="24" name="Straight Arrow Connector 23">
+            <a:extLst>
+              <a:ext uri="{FF2B5EF4-FFF2-40B4-BE49-F238E27FC236}">
+                <a16:creationId xmlns:a16="http://schemas.microsoft.com/office/drawing/2014/main" id="{972A6FB1-BF8C-F441-94FF-7D009FE0A18E}"/>
               </a:ext>
             </a:extLst>
           </p:cNvPr>
           <p:cNvCxnSpPr>
             <a:cxnSpLocks/>
-            <a:stCxn id="4" idx="0"/>
           </p:cNvCxnSpPr>
           <p:nvPr/>
         </p:nvCxnSpPr>
         <p:spPr>
           <a:xfrm flipV="1">
-            <a:off x="3018274" y="2313020"/>
-            <a:ext cx="2851376" cy="2343957"/>
+            <a:off x="6027650" y="2285384"/>
+            <a:ext cx="14062" cy="2343580"/>
+          </a:xfrm>
+          <a:prstGeom prst="straightConnector1">
+            <a:avLst/>
+          </a:prstGeom>
+          <a:ln w="38100">
+            <a:solidFill>
+              <a:schemeClr val="tx1"/>
+            </a:solidFill>
+            <a:prstDash val="solid"/>
+            <a:headEnd w="lg" len="lg"/>
+            <a:tailEnd type="triangle" w="lg" len="lg"/>
+          </a:ln>
+        </p:spPr>
+        <p:style>
+          <a:lnRef idx="1">
+            <a:schemeClr val="accent1"/>
+          </a:lnRef>
+          <a:fillRef idx="0">
+            <a:schemeClr val="accent1"/>
+          </a:fillRef>
+          <a:effectRef idx="0">
+            <a:schemeClr val="accent1"/>
+          </a:effectRef>
+          <a:fontRef idx="minor">
+            <a:schemeClr val="tx1"/>
+          </a:fontRef>
+        </p:style>
+      </p:cxnSp>
+      <p:cxnSp>
+        <p:nvCxnSpPr>
+          <p:cNvPr id="25" name="Straight Arrow Connector 24">
+            <a:extLst>
+              <a:ext uri="{FF2B5EF4-FFF2-40B4-BE49-F238E27FC236}">
+                <a16:creationId xmlns:a16="http://schemas.microsoft.com/office/drawing/2014/main" id="{45A391B6-D398-C84A-A9F8-7C99294FDE76}"/>
+              </a:ext>
+            </a:extLst>
+          </p:cNvPr>
+          <p:cNvCxnSpPr>
+            <a:cxnSpLocks/>
+            <a:stCxn id="6" idx="0"/>
+          </p:cNvCxnSpPr>
+          <p:nvPr/>
+        </p:nvCxnSpPr>
+        <p:spPr>
+          <a:xfrm flipH="1" flipV="1">
+            <a:off x="6155641" y="2297469"/>
+            <a:ext cx="2783417" cy="2345783"/>
           </a:xfrm>
           <a:prstGeom prst="straightConnector1">
             <a:avLst/>
@@ -5952,69 +6046,23 @@
       </p:cxnSp>
       <p:cxnSp>
         <p:nvCxnSpPr>
-          <p:cNvPr id="24" name="Straight Arrow Connector 23">
-            <a:extLst>
-              <a:ext uri="{FF2B5EF4-FFF2-40B4-BE49-F238E27FC236}">
-                <a16:creationId xmlns:a16="http://schemas.microsoft.com/office/drawing/2014/main" id="{972A6FB1-BF8C-F441-94FF-7D009FE0A18E}"/>
+          <p:cNvPr id="33" name="Straight Arrow Connector 32">
+            <a:extLst>
+              <a:ext uri="{FF2B5EF4-FFF2-40B4-BE49-F238E27FC236}">
+                <a16:creationId xmlns:a16="http://schemas.microsoft.com/office/drawing/2014/main" id="{F3C7C845-1D72-394E-9DE1-542D0FCD9A35}"/>
               </a:ext>
             </a:extLst>
           </p:cNvPr>
           <p:cNvCxnSpPr>
             <a:cxnSpLocks/>
+            <a:endCxn id="9" idx="2"/>
           </p:cNvCxnSpPr>
           <p:nvPr/>
         </p:nvCxnSpPr>
         <p:spPr>
           <a:xfrm flipV="1">
-            <a:off x="6027650" y="2285384"/>
-            <a:ext cx="14062" cy="2343580"/>
-          </a:xfrm>
-          <a:prstGeom prst="straightConnector1">
-            <a:avLst/>
-          </a:prstGeom>
-          <a:ln w="38100">
-            <a:solidFill>
-              <a:schemeClr val="tx1"/>
-            </a:solidFill>
-            <a:prstDash val="solid"/>
-            <a:headEnd w="lg" len="lg"/>
-            <a:tailEnd type="triangle" w="lg" len="lg"/>
-          </a:ln>
-        </p:spPr>
-        <p:style>
-          <a:lnRef idx="1">
-            <a:schemeClr val="accent1"/>
-          </a:lnRef>
-          <a:fillRef idx="0">
-            <a:schemeClr val="accent1"/>
-          </a:fillRef>
-          <a:effectRef idx="0">
-            <a:schemeClr val="accent1"/>
-          </a:effectRef>
-          <a:fontRef idx="minor">
-            <a:schemeClr val="tx1"/>
-          </a:fontRef>
-        </p:style>
-      </p:cxnSp>
-      <p:cxnSp>
-        <p:nvCxnSpPr>
-          <p:cNvPr id="25" name="Straight Arrow Connector 24">
-            <a:extLst>
-              <a:ext uri="{FF2B5EF4-FFF2-40B4-BE49-F238E27FC236}">
-                <a16:creationId xmlns:a16="http://schemas.microsoft.com/office/drawing/2014/main" id="{45A391B6-D398-C84A-A9F8-7C99294FDE76}"/>
-              </a:ext>
-            </a:extLst>
-          </p:cNvPr>
-          <p:cNvCxnSpPr>
-            <a:cxnSpLocks/>
-            <a:stCxn id="6" idx="0"/>
-          </p:cNvCxnSpPr>
-          <p:nvPr/>
-        </p:nvCxnSpPr>
-        <p:spPr>
-          <a:xfrm flipH="1" flipV="1">
-            <a:off x="6155641" y="2297469"/>
-            <a:ext cx="2783417" cy="2345783"/>
+            <a:off x="6096000" y="2268893"/>
+            <a:ext cx="2868789" cy="2374362"/>
           </a:xfrm>
           <a:prstGeom prst="straightConnector1">
             <a:avLst/>
@@ -6046,23 +6094,68 @@
       </p:cxnSp>
       <p:cxnSp>
         <p:nvCxnSpPr>
-          <p:cNvPr id="33" name="Straight Arrow Connector 32">
-            <a:extLst>
-              <a:ext uri="{FF2B5EF4-FFF2-40B4-BE49-F238E27FC236}">
-                <a16:creationId xmlns:a16="http://schemas.microsoft.com/office/drawing/2014/main" id="{F3C7C845-1D72-394E-9DE1-542D0FCD9A35}"/>
+          <p:cNvPr id="34" name="Straight Arrow Connector 33">
+            <a:extLst>
+              <a:ext uri="{FF2B5EF4-FFF2-40B4-BE49-F238E27FC236}">
+                <a16:creationId xmlns:a16="http://schemas.microsoft.com/office/drawing/2014/main" id="{DF0A842C-1866-5841-80CD-7B279AE72F53}"/>
               </a:ext>
             </a:extLst>
           </p:cNvPr>
           <p:cNvCxnSpPr>
             <a:cxnSpLocks/>
-            <a:endCxn id="9" idx="2"/>
           </p:cNvCxnSpPr>
           <p:nvPr/>
         </p:nvCxnSpPr>
         <p:spPr>
           <a:xfrm flipV="1">
-            <a:off x="6096000" y="2268893"/>
-            <a:ext cx="2868789" cy="2374362"/>
+            <a:off x="9070921" y="2269993"/>
+            <a:ext cx="37408" cy="2358971"/>
+          </a:xfrm>
+          <a:prstGeom prst="straightConnector1">
+            <a:avLst/>
+          </a:prstGeom>
+          <a:ln w="38100">
+            <a:solidFill>
+              <a:schemeClr val="tx1"/>
+            </a:solidFill>
+            <a:prstDash val="solid"/>
+            <a:headEnd w="lg" len="lg"/>
+            <a:tailEnd type="triangle" w="lg" len="lg"/>
+          </a:ln>
+        </p:spPr>
+        <p:style>
+          <a:lnRef idx="1">
+            <a:schemeClr val="accent1"/>
+          </a:lnRef>
+          <a:fillRef idx="0">
+            <a:schemeClr val="accent1"/>
+          </a:fillRef>
+          <a:effectRef idx="0">
+            <a:schemeClr val="accent1"/>
+          </a:effectRef>
+          <a:fontRef idx="minor">
+            <a:schemeClr val="tx1"/>
+          </a:fontRef>
+        </p:style>
+      </p:cxnSp>
+      <p:cxnSp>
+        <p:nvCxnSpPr>
+          <p:cNvPr id="35" name="Straight Arrow Connector 34">
+            <a:extLst>
+              <a:ext uri="{FF2B5EF4-FFF2-40B4-BE49-F238E27FC236}">
+                <a16:creationId xmlns:a16="http://schemas.microsoft.com/office/drawing/2014/main" id="{C54E97C6-5A60-374B-80FC-3BE7443DC76F}"/>
+              </a:ext>
+            </a:extLst>
+          </p:cNvPr>
+          <p:cNvCxnSpPr>
+            <a:cxnSpLocks/>
+          </p:cNvCxnSpPr>
+          <p:nvPr/>
+        </p:nvCxnSpPr>
+        <p:spPr>
+          <a:xfrm flipV="1">
+            <a:off x="3012345" y="2299670"/>
+            <a:ext cx="5769952" cy="2343581"/>
           </a:xfrm>
           <a:prstGeom prst="straightConnector1">
             <a:avLst/>
@@ -6094,99 +6187,6 @@
       </p:cxnSp>
       <p:cxnSp>
         <p:nvCxnSpPr>
-          <p:cNvPr id="34" name="Straight Arrow Connector 33">
-            <a:extLst>
-              <a:ext uri="{FF2B5EF4-FFF2-40B4-BE49-F238E27FC236}">
-                <a16:creationId xmlns:a16="http://schemas.microsoft.com/office/drawing/2014/main" id="{DF0A842C-1866-5841-80CD-7B279AE72F53}"/>
-              </a:ext>
-            </a:extLst>
-          </p:cNvPr>
-          <p:cNvCxnSpPr>
-            <a:cxnSpLocks/>
-          </p:cNvCxnSpPr>
-          <p:nvPr/>
-        </p:nvCxnSpPr>
-        <p:spPr>
-          <a:xfrm flipV="1">
-            <a:off x="9070921" y="2269993"/>
-            <a:ext cx="37408" cy="2358971"/>
-          </a:xfrm>
-          <a:prstGeom prst="straightConnector1">
-            <a:avLst/>
-          </a:prstGeom>
-          <a:ln w="38100">
-            <a:solidFill>
-              <a:schemeClr val="tx1"/>
-            </a:solidFill>
-            <a:prstDash val="solid"/>
-            <a:headEnd w="lg" len="lg"/>
-            <a:tailEnd type="triangle" w="lg" len="lg"/>
-          </a:ln>
-        </p:spPr>
-        <p:style>
-          <a:lnRef idx="1">
-            <a:schemeClr val="accent1"/>
-          </a:lnRef>
-          <a:fillRef idx="0">
-            <a:schemeClr val="accent1"/>
-          </a:fillRef>
-          <a:effectRef idx="0">
-            <a:schemeClr val="accent1"/>
-          </a:effectRef>
-          <a:fontRef idx="minor">
-            <a:schemeClr val="tx1"/>
-          </a:fontRef>
-        </p:style>
-      </p:cxnSp>
-      <p:cxnSp>
-        <p:nvCxnSpPr>
-          <p:cNvPr id="35" name="Straight Arrow Connector 34">
-            <a:extLst>
-              <a:ext uri="{FF2B5EF4-FFF2-40B4-BE49-F238E27FC236}">
-                <a16:creationId xmlns:a16="http://schemas.microsoft.com/office/drawing/2014/main" id="{C54E97C6-5A60-374B-80FC-3BE7443DC76F}"/>
-              </a:ext>
-            </a:extLst>
-          </p:cNvPr>
-          <p:cNvCxnSpPr>
-            <a:cxnSpLocks/>
-          </p:cNvCxnSpPr>
-          <p:nvPr/>
-        </p:nvCxnSpPr>
-        <p:spPr>
-          <a:xfrm flipV="1">
-            <a:off x="3012345" y="2299670"/>
-            <a:ext cx="5769952" cy="2343581"/>
-          </a:xfrm>
-          <a:prstGeom prst="straightConnector1">
-            <a:avLst/>
-          </a:prstGeom>
-          <a:ln w="28575">
-            <a:solidFill>
-              <a:schemeClr val="bg2">
-                <a:lumMod val="50000"/>
-              </a:schemeClr>
-            </a:solidFill>
-            <a:prstDash val="dash"/>
-            <a:tailEnd type="triangle" w="lg" len="lg"/>
-          </a:ln>
-        </p:spPr>
-        <p:style>
-          <a:lnRef idx="1">
-            <a:schemeClr val="accent1"/>
-          </a:lnRef>
-          <a:fillRef idx="0">
-            <a:schemeClr val="accent1"/>
-          </a:fillRef>
-          <a:effectRef idx="0">
-            <a:schemeClr val="accent1"/>
-          </a:effectRef>
-          <a:fontRef idx="minor">
-            <a:schemeClr val="tx1"/>
-          </a:fontRef>
-        </p:style>
-      </p:cxnSp>
-      <p:cxnSp>
-        <p:nvCxnSpPr>
           <p:cNvPr id="53" name="Elbow Connector 52">
             <a:extLst>
               <a:ext uri="{FF2B5EF4-FFF2-40B4-BE49-F238E27FC236}">
@@ -6208,53 +6208,6 @@
           <a:prstGeom prst="bentConnector3">
             <a:avLst>
               <a:gd name="adj1" fmla="val 3375000"/>
-            </a:avLst>
-          </a:prstGeom>
-          <a:ln w="38100">
-            <a:solidFill>
-              <a:schemeClr val="tx1"/>
-            </a:solidFill>
-            <a:headEnd w="lg" len="lg"/>
-            <a:tailEnd type="triangle" w="lg" len="lg"/>
-          </a:ln>
-        </p:spPr>
-        <p:style>
-          <a:lnRef idx="1">
-            <a:schemeClr val="accent1"/>
-          </a:lnRef>
-          <a:fillRef idx="0">
-            <a:schemeClr val="accent1"/>
-          </a:fillRef>
-          <a:effectRef idx="0">
-            <a:schemeClr val="accent1"/>
-          </a:effectRef>
-          <a:fontRef idx="minor">
-            <a:schemeClr val="tx1"/>
-          </a:fontRef>
-        </p:style>
-      </p:cxnSp>
-      <p:cxnSp>
-        <p:nvCxnSpPr>
-          <p:cNvPr id="57" name="Elbow Connector 56">
-            <a:extLst>
-              <a:ext uri="{FF2B5EF4-FFF2-40B4-BE49-F238E27FC236}">
-                <a16:creationId xmlns:a16="http://schemas.microsoft.com/office/drawing/2014/main" id="{16E261F6-9F61-B444-B2A1-75894B79FF07}"/>
-              </a:ext>
-            </a:extLst>
-          </p:cNvPr>
-          <p:cNvCxnSpPr>
-            <a:cxnSpLocks/>
-          </p:cNvCxnSpPr>
-          <p:nvPr/>
-        </p:nvCxnSpPr>
-        <p:spPr>
-          <a:xfrm rot="16200000" flipV="1">
-            <a:off x="5892749" y="-813961"/>
-            <a:ext cx="9144" cy="5486400"/>
-          </a:xfrm>
-          <a:prstGeom prst="bentConnector3">
-            <a:avLst>
-              <a:gd name="adj1" fmla="val 6225000"/>
             </a:avLst>
           </a:prstGeom>
           <a:ln w="28575">
@@ -6283,6 +6236,54 @@
           </a:fontRef>
         </p:style>
       </p:cxnSp>
+      <p:cxnSp>
+        <p:nvCxnSpPr>
+          <p:cNvPr id="57" name="Elbow Connector 56">
+            <a:extLst>
+              <a:ext uri="{FF2B5EF4-FFF2-40B4-BE49-F238E27FC236}">
+                <a16:creationId xmlns:a16="http://schemas.microsoft.com/office/drawing/2014/main" id="{16E261F6-9F61-B444-B2A1-75894B79FF07}"/>
+              </a:ext>
+            </a:extLst>
+          </p:cNvPr>
+          <p:cNvCxnSpPr>
+            <a:cxnSpLocks/>
+          </p:cNvCxnSpPr>
+          <p:nvPr/>
+        </p:nvCxnSpPr>
+        <p:spPr>
+          <a:xfrm rot="16200000" flipV="1">
+            <a:off x="5892749" y="-813961"/>
+            <a:ext cx="9144" cy="5486400"/>
+          </a:xfrm>
+          <a:prstGeom prst="bentConnector3">
+            <a:avLst>
+              <a:gd name="adj1" fmla="val 6225000"/>
+            </a:avLst>
+          </a:prstGeom>
+          <a:ln w="38100">
+            <a:solidFill>
+              <a:schemeClr val="tx1"/>
+            </a:solidFill>
+            <a:prstDash val="solid"/>
+            <a:headEnd w="lg" len="lg"/>
+            <a:tailEnd type="triangle" w="lg" len="lg"/>
+          </a:ln>
+        </p:spPr>
+        <p:style>
+          <a:lnRef idx="1">
+            <a:schemeClr val="accent1"/>
+          </a:lnRef>
+          <a:fillRef idx="0">
+            <a:schemeClr val="accent1"/>
+          </a:fillRef>
+          <a:effectRef idx="0">
+            <a:schemeClr val="accent1"/>
+          </a:effectRef>
+          <a:fontRef idx="minor">
+            <a:schemeClr val="tx1"/>
+          </a:fontRef>
+        </p:style>
+      </p:cxnSp>
       <p:sp>
         <p:nvSpPr>
           <p:cNvPr id="61" name="TextBox 60">
@@ -6297,8 +6298,8 @@
         </p:nvSpPr>
         <p:spPr>
           <a:xfrm>
-            <a:off x="1987018" y="3080146"/>
-            <a:ext cx="946560" cy="369332"/>
+            <a:off x="2147438" y="3080146"/>
+            <a:ext cx="797242" cy="369332"/>
           </a:xfrm>
           <a:prstGeom prst="rect">
             <a:avLst/>
@@ -6316,10 +6317,15 @@
           <a:p>
             <a:r>
               <a:rPr lang="en-US" dirty="0">
-                <a:latin typeface="Arial" panose="020B0604020202020204" pitchFamily="34" charset="0"/>
-                <a:cs typeface="Arial" panose="020B0604020202020204" pitchFamily="34" charset="0"/>
-              </a:rPr>
-              <a:t>0.040**</a:t>
+                <a:solidFill>
+                  <a:schemeClr val="bg2">
+                    <a:lumMod val="50000"/>
+                  </a:schemeClr>
+                </a:solidFill>
+                <a:latin typeface="Arial" panose="020B0604020202020204" pitchFamily="34" charset="0"/>
+                <a:cs typeface="Arial" panose="020B0604020202020204" pitchFamily="34" charset="0"/>
+              </a:rPr>
+              <a:t>0.001</a:t>
             </a:r>
           </a:p>
         </p:txBody>
@@ -6338,8 +6344,8 @@
         </p:nvSpPr>
         <p:spPr>
           <a:xfrm>
-            <a:off x="6057241" y="2948820"/>
-            <a:ext cx="982109" cy="369332"/>
+            <a:off x="6102670" y="2776738"/>
+            <a:ext cx="1228621" cy="369332"/>
           </a:xfrm>
           <a:prstGeom prst="rect">
             <a:avLst/>
@@ -6362,7 +6368,7 @@
                 <a:latin typeface="Arial" panose="020B0604020202020204" pitchFamily="34" charset="0"/>
                 <a:cs typeface="Arial" panose="020B0604020202020204" pitchFamily="34" charset="0"/>
               </a:rPr>
-              <a:t>0.489**</a:t>
+              <a:t>1.126***</a:t>
             </a:r>
           </a:p>
         </p:txBody>
@@ -6402,10 +6408,15 @@
           <a:p>
             <a:r>
               <a:rPr lang="en-US" dirty="0">
-                <a:latin typeface="Arial" panose="020B0604020202020204" pitchFamily="34" charset="0"/>
-                <a:cs typeface="Arial" panose="020B0604020202020204" pitchFamily="34" charset="0"/>
-              </a:rPr>
-              <a:t>0.209*</a:t>
+                <a:solidFill>
+                  <a:schemeClr val="bg2">
+                    <a:lumMod val="50000"/>
+                  </a:schemeClr>
+                </a:solidFill>
+                <a:latin typeface="Arial" panose="020B0604020202020204" pitchFamily="34" charset="0"/>
+                <a:cs typeface="Arial" panose="020B0604020202020204" pitchFamily="34" charset="0"/>
+              </a:rPr>
+              <a:t>-0.031</a:t>
             </a:r>
           </a:p>
         </p:txBody>
@@ -6424,8 +6435,8 @@
         </p:nvSpPr>
         <p:spPr>
           <a:xfrm>
-            <a:off x="9147088" y="3080146"/>
-            <a:ext cx="1020486" cy="369332"/>
+            <a:off x="9147087" y="3080146"/>
+            <a:ext cx="1142999" cy="369332"/>
           </a:xfrm>
           <a:prstGeom prst="rect">
             <a:avLst/>
@@ -6448,7 +6459,7 @@
                 <a:latin typeface="Arial" panose="020B0604020202020204" pitchFamily="34" charset="0"/>
                 <a:cs typeface="Arial" panose="020B0604020202020204" pitchFamily="34" charset="0"/>
               </a:rPr>
-              <a:t>-2.279**</a:t>
+              <a:t>-4.268***</a:t>
             </a:r>
           </a:p>
         </p:txBody>
@@ -6507,7 +6518,7 @@
                 <a:latin typeface="Arial" panose="020B0604020202020204" pitchFamily="34" charset="0"/>
                 <a:cs typeface="Arial" panose="020B0604020202020204" pitchFamily="34" charset="0"/>
               </a:rPr>
-              <a:t>= 0.09</a:t>
+              <a:t>= 0.39</a:t>
             </a:r>
           </a:p>
         </p:txBody>
@@ -6566,7 +6577,7 @@
                 <a:latin typeface="Arial" panose="020B0604020202020204" pitchFamily="34" charset="0"/>
                 <a:cs typeface="Arial" panose="020B0604020202020204" pitchFamily="34" charset="0"/>
               </a:rPr>
-              <a:t>= 0.15</a:t>
+              <a:t>= 0.34</a:t>
             </a:r>
           </a:p>
         </p:txBody>
@@ -6625,7 +6636,7 @@
                 <a:latin typeface="Arial" panose="020B0604020202020204" pitchFamily="34" charset="0"/>
                 <a:cs typeface="Arial" panose="020B0604020202020204" pitchFamily="34" charset="0"/>
               </a:rPr>
-              <a:t>= 0.10</a:t>
+              <a:t>= 0.23</a:t>
             </a:r>
           </a:p>
         </p:txBody>
@@ -6673,7 +6684,7 @@
                 <a:latin typeface="Arial" panose="020B0604020202020204" pitchFamily="34" charset="0"/>
                 <a:cs typeface="Arial" panose="020B0604020202020204" pitchFamily="34" charset="0"/>
               </a:rPr>
-              <a:t>-0.016</a:t>
+              <a:t>-0.206</a:t>
             </a:r>
           </a:p>
         </p:txBody>
@@ -6721,7 +6732,7 @@
                 <a:latin typeface="Arial" panose="020B0604020202020204" pitchFamily="34" charset="0"/>
                 <a:cs typeface="Arial" panose="020B0604020202020204" pitchFamily="34" charset="0"/>
               </a:rPr>
-              <a:t>0.486</a:t>
+              <a:t>0.435</a:t>
             </a:r>
           </a:p>
         </p:txBody>
@@ -6740,8 +6751,8 @@
         </p:nvSpPr>
         <p:spPr>
           <a:xfrm>
-            <a:off x="5032538" y="3992468"/>
-            <a:ext cx="771792" cy="369332"/>
+            <a:off x="5032537" y="3992468"/>
+            <a:ext cx="842349" cy="369332"/>
           </a:xfrm>
           <a:prstGeom prst="rect">
             <a:avLst/>
@@ -6769,7 +6780,7 @@
                 <a:latin typeface="Arial" panose="020B0604020202020204" pitchFamily="34" charset="0"/>
                 <a:cs typeface="Arial" panose="020B0604020202020204" pitchFamily="34" charset="0"/>
               </a:rPr>
-              <a:t>0.004</a:t>
+              <a:t>-0.030</a:t>
             </a:r>
           </a:p>
         </p:txBody>
@@ -6817,7 +6828,7 @@
                 <a:latin typeface="Arial" panose="020B0604020202020204" pitchFamily="34" charset="0"/>
                 <a:cs typeface="Arial" panose="020B0604020202020204" pitchFamily="34" charset="0"/>
               </a:rPr>
-              <a:t>0.067</a:t>
+              <a:t>0.295</a:t>
             </a:r>
           </a:p>
         </p:txBody>
@@ -6865,7 +6876,7 @@
                 <a:latin typeface="Arial" panose="020B0604020202020204" pitchFamily="34" charset="0"/>
                 <a:cs typeface="Arial" panose="020B0604020202020204" pitchFamily="34" charset="0"/>
               </a:rPr>
-              <a:t>-0.925</a:t>
+              <a:t>2.047</a:t>
             </a:r>
           </a:p>
         </p:txBody>
@@ -6884,8 +6895,49 @@
         </p:nvSpPr>
         <p:spPr>
           <a:xfrm>
-            <a:off x="7385911" y="4060653"/>
-            <a:ext cx="835114" cy="369332"/>
+            <a:off x="4043548" y="2342304"/>
+            <a:ext cx="1012630" cy="369332"/>
+          </a:xfrm>
+          <a:prstGeom prst="rect">
+            <a:avLst/>
+          </a:prstGeom>
+          <a:noFill/>
+          <a:ln>
+            <a:noFill/>
+          </a:ln>
+        </p:spPr>
+        <p:txBody>
+          <a:bodyPr wrap="square" rtlCol="0">
+            <a:spAutoFit/>
+          </a:bodyPr>
+          <a:lstStyle/>
+          <a:p>
+            <a:r>
+              <a:rPr lang="en-US" dirty="0">
+                <a:latin typeface="Arial" panose="020B0604020202020204" pitchFamily="34" charset="0"/>
+                <a:cs typeface="Arial" panose="020B0604020202020204" pitchFamily="34" charset="0"/>
+              </a:rPr>
+              <a:t>0.142*</a:t>
+            </a:r>
+          </a:p>
+        </p:txBody>
+      </p:sp>
+      <p:sp>
+        <p:nvSpPr>
+          <p:cNvPr id="74" name="TextBox 73">
+            <a:extLst>
+              <a:ext uri="{FF2B5EF4-FFF2-40B4-BE49-F238E27FC236}">
+                <a16:creationId xmlns:a16="http://schemas.microsoft.com/office/drawing/2014/main" id="{75474E52-9598-164F-AE5B-29344C178A13}"/>
+              </a:ext>
+            </a:extLst>
+          </p:cNvPr>
+          <p:cNvSpPr txBox="1"/>
+          <p:nvPr/>
+        </p:nvSpPr>
+        <p:spPr>
+          <a:xfrm>
+            <a:off x="3990109" y="962175"/>
+            <a:ext cx="1042428" cy="369332"/>
           </a:xfrm>
           <a:prstGeom prst="rect">
             <a:avLst/>
@@ -6905,63 +6957,10 @@
           <a:p>
             <a:r>
               <a:rPr lang="en-US" dirty="0">
-                <a:solidFill>
-                  <a:schemeClr val="bg2">
-                    <a:lumMod val="50000"/>
-                  </a:schemeClr>
-                </a:solidFill>
-                <a:latin typeface="Arial" panose="020B0604020202020204" pitchFamily="34" charset="0"/>
-                <a:cs typeface="Arial" panose="020B0604020202020204" pitchFamily="34" charset="0"/>
-              </a:rPr>
-              <a:t>-0.040</a:t>
-            </a:r>
-          </a:p>
-        </p:txBody>
-      </p:sp>
-      <p:sp>
-        <p:nvSpPr>
-          <p:cNvPr id="74" name="TextBox 73">
-            <a:extLst>
-              <a:ext uri="{FF2B5EF4-FFF2-40B4-BE49-F238E27FC236}">
-                <a16:creationId xmlns:a16="http://schemas.microsoft.com/office/drawing/2014/main" id="{75474E52-9598-164F-AE5B-29344C178A13}"/>
-              </a:ext>
-            </a:extLst>
-          </p:cNvPr>
-          <p:cNvSpPr txBox="1"/>
-          <p:nvPr/>
-        </p:nvSpPr>
-        <p:spPr>
-          <a:xfrm>
-            <a:off x="3544828" y="1189662"/>
-            <a:ext cx="770968" cy="369332"/>
-          </a:xfrm>
-          <a:prstGeom prst="rect">
-            <a:avLst/>
-          </a:prstGeom>
-          <a:solidFill>
-            <a:schemeClr val="bg1"/>
-          </a:solidFill>
-          <a:ln>
-            <a:noFill/>
-          </a:ln>
-        </p:spPr>
-        <p:txBody>
-          <a:bodyPr wrap="square" rtlCol="0">
-            <a:spAutoFit/>
-          </a:bodyPr>
-          <a:lstStyle/>
-          <a:p>
-            <a:r>
-              <a:rPr lang="en-US" dirty="0">
-                <a:solidFill>
-                  <a:schemeClr val="bg2">
-                    <a:lumMod val="50000"/>
-                  </a:schemeClr>
-                </a:solidFill>
-                <a:latin typeface="Arial" panose="020B0604020202020204" pitchFamily="34" charset="0"/>
-                <a:cs typeface="Arial" panose="020B0604020202020204" pitchFamily="34" charset="0"/>
-              </a:rPr>
-              <a:t>0.008</a:t>
+                <a:latin typeface="Arial" panose="020B0604020202020204" pitchFamily="34" charset="0"/>
+                <a:cs typeface="Arial" panose="020B0604020202020204" pitchFamily="34" charset="0"/>
+              </a:rPr>
+              <a:t>0.042***</a:t>
             </a:r>
           </a:p>
         </p:txBody>
@@ -7351,11 +7350,13 @@
           <a:prstGeom prst="straightConnector1">
             <a:avLst/>
           </a:prstGeom>
-          <a:ln w="38100">
+          <a:ln w="28575">
             <a:solidFill>
-              <a:schemeClr val="tx1"/>
+              <a:schemeClr val="bg2">
+                <a:lumMod val="50000"/>
+              </a:schemeClr>
             </a:solidFill>
-            <a:prstDash val="solid"/>
+            <a:prstDash val="dash"/>
             <a:tailEnd type="triangle" w="lg" len="lg"/>
           </a:ln>
         </p:spPr>
@@ -7540,291 +7541,6 @@
           <a:prstGeom prst="straightConnector1">
             <a:avLst/>
           </a:prstGeom>
-          <a:ln w="38100">
-            <a:solidFill>
-              <a:schemeClr val="tx1"/>
-            </a:solidFill>
-            <a:prstDash val="solid"/>
-            <a:headEnd w="lg" len="lg"/>
-            <a:tailEnd type="triangle" w="lg" len="lg"/>
-          </a:ln>
-        </p:spPr>
-        <p:style>
-          <a:lnRef idx="1">
-            <a:schemeClr val="accent1"/>
-          </a:lnRef>
-          <a:fillRef idx="0">
-            <a:schemeClr val="accent1"/>
-          </a:fillRef>
-          <a:effectRef idx="0">
-            <a:schemeClr val="accent1"/>
-          </a:effectRef>
-          <a:fontRef idx="minor">
-            <a:schemeClr val="tx1"/>
-          </a:fontRef>
-        </p:style>
-      </p:cxnSp>
-      <p:cxnSp>
-        <p:nvCxnSpPr>
-          <p:cNvPr id="25" name="Straight Arrow Connector 24">
-            <a:extLst>
-              <a:ext uri="{FF2B5EF4-FFF2-40B4-BE49-F238E27FC236}">
-                <a16:creationId xmlns:a16="http://schemas.microsoft.com/office/drawing/2014/main" id="{45A391B6-D398-C84A-A9F8-7C99294FDE76}"/>
-              </a:ext>
-            </a:extLst>
-          </p:cNvPr>
-          <p:cNvCxnSpPr>
-            <a:cxnSpLocks/>
-            <a:stCxn id="6" idx="0"/>
-          </p:cNvCxnSpPr>
-          <p:nvPr/>
-        </p:nvCxnSpPr>
-        <p:spPr>
-          <a:xfrm flipH="1" flipV="1">
-            <a:off x="6155641" y="2297469"/>
-            <a:ext cx="2783417" cy="2345783"/>
-          </a:xfrm>
-          <a:prstGeom prst="straightConnector1">
-            <a:avLst/>
-          </a:prstGeom>
-          <a:ln w="28575">
-            <a:solidFill>
-              <a:schemeClr val="bg2">
-                <a:lumMod val="50000"/>
-              </a:schemeClr>
-            </a:solidFill>
-            <a:prstDash val="dash"/>
-            <a:tailEnd type="triangle" w="lg" len="lg"/>
-          </a:ln>
-        </p:spPr>
-        <p:style>
-          <a:lnRef idx="1">
-            <a:schemeClr val="accent1"/>
-          </a:lnRef>
-          <a:fillRef idx="0">
-            <a:schemeClr val="accent1"/>
-          </a:fillRef>
-          <a:effectRef idx="0">
-            <a:schemeClr val="accent1"/>
-          </a:effectRef>
-          <a:fontRef idx="minor">
-            <a:schemeClr val="tx1"/>
-          </a:fontRef>
-        </p:style>
-      </p:cxnSp>
-      <p:cxnSp>
-        <p:nvCxnSpPr>
-          <p:cNvPr id="33" name="Straight Arrow Connector 32">
-            <a:extLst>
-              <a:ext uri="{FF2B5EF4-FFF2-40B4-BE49-F238E27FC236}">
-                <a16:creationId xmlns:a16="http://schemas.microsoft.com/office/drawing/2014/main" id="{F3C7C845-1D72-394E-9DE1-542D0FCD9A35}"/>
-              </a:ext>
-            </a:extLst>
-          </p:cNvPr>
-          <p:cNvCxnSpPr>
-            <a:cxnSpLocks/>
-            <a:endCxn id="9" idx="2"/>
-          </p:cNvCxnSpPr>
-          <p:nvPr/>
-        </p:nvCxnSpPr>
-        <p:spPr>
-          <a:xfrm flipV="1">
-            <a:off x="6096000" y="2268893"/>
-            <a:ext cx="2868789" cy="2374362"/>
-          </a:xfrm>
-          <a:prstGeom prst="straightConnector1">
-            <a:avLst/>
-          </a:prstGeom>
-          <a:ln w="28575">
-            <a:solidFill>
-              <a:schemeClr val="bg2">
-                <a:lumMod val="50000"/>
-              </a:schemeClr>
-            </a:solidFill>
-            <a:prstDash val="dash"/>
-            <a:tailEnd type="triangle" w="lg" len="lg"/>
-          </a:ln>
-        </p:spPr>
-        <p:style>
-          <a:lnRef idx="1">
-            <a:schemeClr val="accent1"/>
-          </a:lnRef>
-          <a:fillRef idx="0">
-            <a:schemeClr val="accent1"/>
-          </a:fillRef>
-          <a:effectRef idx="0">
-            <a:schemeClr val="accent1"/>
-          </a:effectRef>
-          <a:fontRef idx="minor">
-            <a:schemeClr val="tx1"/>
-          </a:fontRef>
-        </p:style>
-      </p:cxnSp>
-      <p:cxnSp>
-        <p:nvCxnSpPr>
-          <p:cNvPr id="34" name="Straight Arrow Connector 33">
-            <a:extLst>
-              <a:ext uri="{FF2B5EF4-FFF2-40B4-BE49-F238E27FC236}">
-                <a16:creationId xmlns:a16="http://schemas.microsoft.com/office/drawing/2014/main" id="{DF0A842C-1866-5841-80CD-7B279AE72F53}"/>
-              </a:ext>
-            </a:extLst>
-          </p:cNvPr>
-          <p:cNvCxnSpPr>
-            <a:cxnSpLocks/>
-          </p:cNvCxnSpPr>
-          <p:nvPr/>
-        </p:nvCxnSpPr>
-        <p:spPr>
-          <a:xfrm flipV="1">
-            <a:off x="9070921" y="2269993"/>
-            <a:ext cx="37408" cy="2358971"/>
-          </a:xfrm>
-          <a:prstGeom prst="straightConnector1">
-            <a:avLst/>
-          </a:prstGeom>
-          <a:ln w="38100">
-            <a:solidFill>
-              <a:schemeClr val="tx1"/>
-            </a:solidFill>
-            <a:prstDash val="solid"/>
-            <a:headEnd w="lg" len="lg"/>
-            <a:tailEnd type="triangle" w="lg" len="lg"/>
-          </a:ln>
-        </p:spPr>
-        <p:style>
-          <a:lnRef idx="1">
-            <a:schemeClr val="accent1"/>
-          </a:lnRef>
-          <a:fillRef idx="0">
-            <a:schemeClr val="accent1"/>
-          </a:fillRef>
-          <a:effectRef idx="0">
-            <a:schemeClr val="accent1"/>
-          </a:effectRef>
-          <a:fontRef idx="minor">
-            <a:schemeClr val="tx1"/>
-          </a:fontRef>
-        </p:style>
-      </p:cxnSp>
-      <p:cxnSp>
-        <p:nvCxnSpPr>
-          <p:cNvPr id="35" name="Straight Arrow Connector 34">
-            <a:extLst>
-              <a:ext uri="{FF2B5EF4-FFF2-40B4-BE49-F238E27FC236}">
-                <a16:creationId xmlns:a16="http://schemas.microsoft.com/office/drawing/2014/main" id="{C54E97C6-5A60-374B-80FC-3BE7443DC76F}"/>
-              </a:ext>
-            </a:extLst>
-          </p:cNvPr>
-          <p:cNvCxnSpPr>
-            <a:cxnSpLocks/>
-          </p:cNvCxnSpPr>
-          <p:nvPr/>
-        </p:nvCxnSpPr>
-        <p:spPr>
-          <a:xfrm flipV="1">
-            <a:off x="3012345" y="2299670"/>
-            <a:ext cx="5769952" cy="2343581"/>
-          </a:xfrm>
-          <a:prstGeom prst="straightConnector1">
-            <a:avLst/>
-          </a:prstGeom>
-          <a:ln w="28575">
-            <a:solidFill>
-              <a:schemeClr val="bg2">
-                <a:lumMod val="50000"/>
-              </a:schemeClr>
-            </a:solidFill>
-            <a:prstDash val="dash"/>
-            <a:tailEnd type="triangle" w="lg" len="lg"/>
-          </a:ln>
-        </p:spPr>
-        <p:style>
-          <a:lnRef idx="1">
-            <a:schemeClr val="accent1"/>
-          </a:lnRef>
-          <a:fillRef idx="0">
-            <a:schemeClr val="accent1"/>
-          </a:fillRef>
-          <a:effectRef idx="0">
-            <a:schemeClr val="accent1"/>
-          </a:effectRef>
-          <a:fontRef idx="minor">
-            <a:schemeClr val="tx1"/>
-          </a:fontRef>
-        </p:style>
-      </p:cxnSp>
-      <p:cxnSp>
-        <p:nvCxnSpPr>
-          <p:cNvPr id="53" name="Elbow Connector 52">
-            <a:extLst>
-              <a:ext uri="{FF2B5EF4-FFF2-40B4-BE49-F238E27FC236}">
-                <a16:creationId xmlns:a16="http://schemas.microsoft.com/office/drawing/2014/main" id="{83342A54-600E-FF4A-BE6C-445538E8BA49}"/>
-              </a:ext>
-            </a:extLst>
-          </p:cNvPr>
-          <p:cNvCxnSpPr>
-            <a:stCxn id="9" idx="0"/>
-            <a:endCxn id="8" idx="0"/>
-          </p:cNvCxnSpPr>
-          <p:nvPr/>
-        </p:nvCxnSpPr>
-        <p:spPr>
-          <a:xfrm rot="16200000" flipV="1">
-            <a:off x="7482893" y="448443"/>
-            <a:ext cx="12700" cy="2963792"/>
-          </a:xfrm>
-          <a:prstGeom prst="bentConnector3">
-            <a:avLst>
-              <a:gd name="adj1" fmla="val 3375000"/>
-            </a:avLst>
-          </a:prstGeom>
-          <a:ln w="38100">
-            <a:solidFill>
-              <a:schemeClr val="tx1"/>
-            </a:solidFill>
-            <a:headEnd w="lg" len="lg"/>
-            <a:tailEnd type="triangle" w="lg" len="lg"/>
-          </a:ln>
-        </p:spPr>
-        <p:style>
-          <a:lnRef idx="1">
-            <a:schemeClr val="accent1"/>
-          </a:lnRef>
-          <a:fillRef idx="0">
-            <a:schemeClr val="accent1"/>
-          </a:fillRef>
-          <a:effectRef idx="0">
-            <a:schemeClr val="accent1"/>
-          </a:effectRef>
-          <a:fontRef idx="minor">
-            <a:schemeClr val="tx1"/>
-          </a:fontRef>
-        </p:style>
-      </p:cxnSp>
-      <p:cxnSp>
-        <p:nvCxnSpPr>
-          <p:cNvPr id="57" name="Elbow Connector 56">
-            <a:extLst>
-              <a:ext uri="{FF2B5EF4-FFF2-40B4-BE49-F238E27FC236}">
-                <a16:creationId xmlns:a16="http://schemas.microsoft.com/office/drawing/2014/main" id="{16E261F6-9F61-B444-B2A1-75894B79FF07}"/>
-              </a:ext>
-            </a:extLst>
-          </p:cNvPr>
-          <p:cNvCxnSpPr>
-            <a:cxnSpLocks/>
-          </p:cNvCxnSpPr>
-          <p:nvPr/>
-        </p:nvCxnSpPr>
-        <p:spPr>
-          <a:xfrm rot="16200000" flipV="1">
-            <a:off x="5892749" y="-813961"/>
-            <a:ext cx="9144" cy="5486400"/>
-          </a:xfrm>
-          <a:prstGeom prst="bentConnector3">
-            <a:avLst>
-              <a:gd name="adj1" fmla="val 6225000"/>
-            </a:avLst>
-          </a:prstGeom>
           <a:ln w="28575">
             <a:solidFill>
               <a:schemeClr val="bg2">
@@ -7851,6 +7567,291 @@
           </a:fontRef>
         </p:style>
       </p:cxnSp>
+      <p:cxnSp>
+        <p:nvCxnSpPr>
+          <p:cNvPr id="25" name="Straight Arrow Connector 24">
+            <a:extLst>
+              <a:ext uri="{FF2B5EF4-FFF2-40B4-BE49-F238E27FC236}">
+                <a16:creationId xmlns:a16="http://schemas.microsoft.com/office/drawing/2014/main" id="{45A391B6-D398-C84A-A9F8-7C99294FDE76}"/>
+              </a:ext>
+            </a:extLst>
+          </p:cNvPr>
+          <p:cNvCxnSpPr>
+            <a:cxnSpLocks/>
+            <a:stCxn id="6" idx="0"/>
+          </p:cNvCxnSpPr>
+          <p:nvPr/>
+        </p:nvCxnSpPr>
+        <p:spPr>
+          <a:xfrm flipH="1" flipV="1">
+            <a:off x="6155641" y="2297469"/>
+            <a:ext cx="2783417" cy="2345783"/>
+          </a:xfrm>
+          <a:prstGeom prst="straightConnector1">
+            <a:avLst/>
+          </a:prstGeom>
+          <a:ln w="28575">
+            <a:solidFill>
+              <a:schemeClr val="bg2">
+                <a:lumMod val="50000"/>
+              </a:schemeClr>
+            </a:solidFill>
+            <a:prstDash val="dash"/>
+            <a:tailEnd type="triangle" w="lg" len="lg"/>
+          </a:ln>
+        </p:spPr>
+        <p:style>
+          <a:lnRef idx="1">
+            <a:schemeClr val="accent1"/>
+          </a:lnRef>
+          <a:fillRef idx="0">
+            <a:schemeClr val="accent1"/>
+          </a:fillRef>
+          <a:effectRef idx="0">
+            <a:schemeClr val="accent1"/>
+          </a:effectRef>
+          <a:fontRef idx="minor">
+            <a:schemeClr val="tx1"/>
+          </a:fontRef>
+        </p:style>
+      </p:cxnSp>
+      <p:cxnSp>
+        <p:nvCxnSpPr>
+          <p:cNvPr id="33" name="Straight Arrow Connector 32">
+            <a:extLst>
+              <a:ext uri="{FF2B5EF4-FFF2-40B4-BE49-F238E27FC236}">
+                <a16:creationId xmlns:a16="http://schemas.microsoft.com/office/drawing/2014/main" id="{F3C7C845-1D72-394E-9DE1-542D0FCD9A35}"/>
+              </a:ext>
+            </a:extLst>
+          </p:cNvPr>
+          <p:cNvCxnSpPr>
+            <a:cxnSpLocks/>
+            <a:endCxn id="9" idx="2"/>
+          </p:cNvCxnSpPr>
+          <p:nvPr/>
+        </p:nvCxnSpPr>
+        <p:spPr>
+          <a:xfrm flipV="1">
+            <a:off x="6096000" y="2268893"/>
+            <a:ext cx="2868789" cy="2374362"/>
+          </a:xfrm>
+          <a:prstGeom prst="straightConnector1">
+            <a:avLst/>
+          </a:prstGeom>
+          <a:ln w="28575">
+            <a:solidFill>
+              <a:schemeClr val="bg2">
+                <a:lumMod val="50000"/>
+              </a:schemeClr>
+            </a:solidFill>
+            <a:prstDash val="dash"/>
+            <a:tailEnd type="triangle" w="lg" len="lg"/>
+          </a:ln>
+        </p:spPr>
+        <p:style>
+          <a:lnRef idx="1">
+            <a:schemeClr val="accent1"/>
+          </a:lnRef>
+          <a:fillRef idx="0">
+            <a:schemeClr val="accent1"/>
+          </a:fillRef>
+          <a:effectRef idx="0">
+            <a:schemeClr val="accent1"/>
+          </a:effectRef>
+          <a:fontRef idx="minor">
+            <a:schemeClr val="tx1"/>
+          </a:fontRef>
+        </p:style>
+      </p:cxnSp>
+      <p:cxnSp>
+        <p:nvCxnSpPr>
+          <p:cNvPr id="34" name="Straight Arrow Connector 33">
+            <a:extLst>
+              <a:ext uri="{FF2B5EF4-FFF2-40B4-BE49-F238E27FC236}">
+                <a16:creationId xmlns:a16="http://schemas.microsoft.com/office/drawing/2014/main" id="{DF0A842C-1866-5841-80CD-7B279AE72F53}"/>
+              </a:ext>
+            </a:extLst>
+          </p:cNvPr>
+          <p:cNvCxnSpPr>
+            <a:cxnSpLocks/>
+          </p:cNvCxnSpPr>
+          <p:nvPr/>
+        </p:nvCxnSpPr>
+        <p:spPr>
+          <a:xfrm flipV="1">
+            <a:off x="9070921" y="2269993"/>
+            <a:ext cx="37408" cy="2358971"/>
+          </a:xfrm>
+          <a:prstGeom prst="straightConnector1">
+            <a:avLst/>
+          </a:prstGeom>
+          <a:ln w="38100">
+            <a:solidFill>
+              <a:schemeClr val="tx1"/>
+            </a:solidFill>
+            <a:prstDash val="solid"/>
+            <a:headEnd w="lg" len="lg"/>
+            <a:tailEnd type="triangle" w="lg" len="lg"/>
+          </a:ln>
+        </p:spPr>
+        <p:style>
+          <a:lnRef idx="1">
+            <a:schemeClr val="accent1"/>
+          </a:lnRef>
+          <a:fillRef idx="0">
+            <a:schemeClr val="accent1"/>
+          </a:fillRef>
+          <a:effectRef idx="0">
+            <a:schemeClr val="accent1"/>
+          </a:effectRef>
+          <a:fontRef idx="minor">
+            <a:schemeClr val="tx1"/>
+          </a:fontRef>
+        </p:style>
+      </p:cxnSp>
+      <p:cxnSp>
+        <p:nvCxnSpPr>
+          <p:cNvPr id="35" name="Straight Arrow Connector 34">
+            <a:extLst>
+              <a:ext uri="{FF2B5EF4-FFF2-40B4-BE49-F238E27FC236}">
+                <a16:creationId xmlns:a16="http://schemas.microsoft.com/office/drawing/2014/main" id="{C54E97C6-5A60-374B-80FC-3BE7443DC76F}"/>
+              </a:ext>
+            </a:extLst>
+          </p:cNvPr>
+          <p:cNvCxnSpPr>
+            <a:cxnSpLocks/>
+          </p:cNvCxnSpPr>
+          <p:nvPr/>
+        </p:nvCxnSpPr>
+        <p:spPr>
+          <a:xfrm flipV="1">
+            <a:off x="3012345" y="2299670"/>
+            <a:ext cx="5769952" cy="2343581"/>
+          </a:xfrm>
+          <a:prstGeom prst="straightConnector1">
+            <a:avLst/>
+          </a:prstGeom>
+          <a:ln w="28575">
+            <a:solidFill>
+              <a:schemeClr val="bg2">
+                <a:lumMod val="50000"/>
+              </a:schemeClr>
+            </a:solidFill>
+            <a:prstDash val="dash"/>
+            <a:tailEnd type="triangle" w="lg" len="lg"/>
+          </a:ln>
+        </p:spPr>
+        <p:style>
+          <a:lnRef idx="1">
+            <a:schemeClr val="accent1"/>
+          </a:lnRef>
+          <a:fillRef idx="0">
+            <a:schemeClr val="accent1"/>
+          </a:fillRef>
+          <a:effectRef idx="0">
+            <a:schemeClr val="accent1"/>
+          </a:effectRef>
+          <a:fontRef idx="minor">
+            <a:schemeClr val="tx1"/>
+          </a:fontRef>
+        </p:style>
+      </p:cxnSp>
+      <p:cxnSp>
+        <p:nvCxnSpPr>
+          <p:cNvPr id="53" name="Elbow Connector 52">
+            <a:extLst>
+              <a:ext uri="{FF2B5EF4-FFF2-40B4-BE49-F238E27FC236}">
+                <a16:creationId xmlns:a16="http://schemas.microsoft.com/office/drawing/2014/main" id="{83342A54-600E-FF4A-BE6C-445538E8BA49}"/>
+              </a:ext>
+            </a:extLst>
+          </p:cNvPr>
+          <p:cNvCxnSpPr>
+            <a:stCxn id="9" idx="0"/>
+            <a:endCxn id="8" idx="0"/>
+          </p:cNvCxnSpPr>
+          <p:nvPr/>
+        </p:nvCxnSpPr>
+        <p:spPr>
+          <a:xfrm rot="16200000" flipV="1">
+            <a:off x="7482893" y="448443"/>
+            <a:ext cx="12700" cy="2963792"/>
+          </a:xfrm>
+          <a:prstGeom prst="bentConnector3">
+            <a:avLst>
+              <a:gd name="adj1" fmla="val 3375000"/>
+            </a:avLst>
+          </a:prstGeom>
+          <a:ln w="38100">
+            <a:solidFill>
+              <a:schemeClr val="tx1"/>
+            </a:solidFill>
+            <a:headEnd w="lg" len="lg"/>
+            <a:tailEnd type="triangle" w="lg" len="lg"/>
+          </a:ln>
+        </p:spPr>
+        <p:style>
+          <a:lnRef idx="1">
+            <a:schemeClr val="accent1"/>
+          </a:lnRef>
+          <a:fillRef idx="0">
+            <a:schemeClr val="accent1"/>
+          </a:fillRef>
+          <a:effectRef idx="0">
+            <a:schemeClr val="accent1"/>
+          </a:effectRef>
+          <a:fontRef idx="minor">
+            <a:schemeClr val="tx1"/>
+          </a:fontRef>
+        </p:style>
+      </p:cxnSp>
+      <p:cxnSp>
+        <p:nvCxnSpPr>
+          <p:cNvPr id="57" name="Elbow Connector 56">
+            <a:extLst>
+              <a:ext uri="{FF2B5EF4-FFF2-40B4-BE49-F238E27FC236}">
+                <a16:creationId xmlns:a16="http://schemas.microsoft.com/office/drawing/2014/main" id="{16E261F6-9F61-B444-B2A1-75894B79FF07}"/>
+              </a:ext>
+            </a:extLst>
+          </p:cNvPr>
+          <p:cNvCxnSpPr>
+            <a:cxnSpLocks/>
+          </p:cNvCxnSpPr>
+          <p:nvPr/>
+        </p:nvCxnSpPr>
+        <p:spPr>
+          <a:xfrm rot="16200000" flipV="1">
+            <a:off x="5892749" y="-813961"/>
+            <a:ext cx="9144" cy="5486400"/>
+          </a:xfrm>
+          <a:prstGeom prst="bentConnector3">
+            <a:avLst>
+              <a:gd name="adj1" fmla="val 6225000"/>
+            </a:avLst>
+          </a:prstGeom>
+          <a:ln w="38100">
+            <a:solidFill>
+              <a:schemeClr val="tx1"/>
+            </a:solidFill>
+            <a:prstDash val="solid"/>
+            <a:headEnd w="lg" len="lg"/>
+            <a:tailEnd type="triangle" w="lg" len="lg"/>
+          </a:ln>
+        </p:spPr>
+        <p:style>
+          <a:lnRef idx="1">
+            <a:schemeClr val="accent1"/>
+          </a:lnRef>
+          <a:fillRef idx="0">
+            <a:schemeClr val="accent1"/>
+          </a:fillRef>
+          <a:effectRef idx="0">
+            <a:schemeClr val="accent1"/>
+          </a:effectRef>
+          <a:fontRef idx="minor">
+            <a:schemeClr val="tx1"/>
+          </a:fontRef>
+        </p:style>
+      </p:cxnSp>
       <p:sp>
         <p:nvSpPr>
           <p:cNvPr id="61" name="TextBox 60">
@@ -7865,7 +7866,7 @@
         </p:nvSpPr>
         <p:spPr>
           <a:xfrm>
-            <a:off x="1987018" y="3080146"/>
+            <a:off x="2160773" y="3094944"/>
             <a:ext cx="946560" cy="369332"/>
           </a:xfrm>
           <a:prstGeom prst="rect">
@@ -7884,10 +7885,15 @@
           <a:p>
             <a:r>
               <a:rPr lang="en-US" dirty="0">
-                <a:latin typeface="Arial" panose="020B0604020202020204" pitchFamily="34" charset="0"/>
-                <a:cs typeface="Arial" panose="020B0604020202020204" pitchFamily="34" charset="0"/>
-              </a:rPr>
-              <a:t>0.040**</a:t>
+                <a:solidFill>
+                  <a:schemeClr val="bg2">
+                    <a:lumMod val="50000"/>
+                  </a:schemeClr>
+                </a:solidFill>
+                <a:latin typeface="Arial" panose="020B0604020202020204" pitchFamily="34" charset="0"/>
+                <a:cs typeface="Arial" panose="020B0604020202020204" pitchFamily="34" charset="0"/>
+              </a:rPr>
+              <a:t>0.037</a:t>
             </a:r>
           </a:p>
         </p:txBody>
@@ -7927,10 +7933,15 @@
           <a:p>
             <a:r>
               <a:rPr lang="en-US" dirty="0">
-                <a:latin typeface="Arial" panose="020B0604020202020204" pitchFamily="34" charset="0"/>
-                <a:cs typeface="Arial" panose="020B0604020202020204" pitchFamily="34" charset="0"/>
-              </a:rPr>
-              <a:t>0.339**</a:t>
+                <a:solidFill>
+                  <a:schemeClr val="bg2">
+                    <a:lumMod val="50000"/>
+                  </a:schemeClr>
+                </a:solidFill>
+                <a:latin typeface="Arial" panose="020B0604020202020204" pitchFamily="34" charset="0"/>
+                <a:cs typeface="Arial" panose="020B0604020202020204" pitchFamily="34" charset="0"/>
+              </a:rPr>
+              <a:t>0.268</a:t>
             </a:r>
           </a:p>
         </p:txBody>
@@ -7973,7 +7984,7 @@
                 <a:latin typeface="Arial" panose="020B0604020202020204" pitchFamily="34" charset="0"/>
                 <a:cs typeface="Arial" panose="020B0604020202020204" pitchFamily="34" charset="0"/>
               </a:rPr>
-              <a:t>0.248***</a:t>
+              <a:t>0.559***</a:t>
             </a:r>
           </a:p>
         </p:txBody>
@@ -7992,8 +8003,8 @@
         </p:nvSpPr>
         <p:spPr>
           <a:xfrm>
-            <a:off x="9147088" y="3080146"/>
-            <a:ext cx="1020486" cy="369332"/>
+            <a:off x="9147087" y="3080146"/>
+            <a:ext cx="1142999" cy="369332"/>
           </a:xfrm>
           <a:prstGeom prst="rect">
             <a:avLst/>
@@ -8016,7 +8027,7 @@
                 <a:latin typeface="Arial" panose="020B0604020202020204" pitchFamily="34" charset="0"/>
                 <a:cs typeface="Arial" panose="020B0604020202020204" pitchFamily="34" charset="0"/>
               </a:rPr>
-              <a:t>-2.279**</a:t>
+              <a:t>-3.657***</a:t>
             </a:r>
           </a:p>
         </p:txBody>
@@ -8075,7 +8086,7 @@
                 <a:latin typeface="Arial" panose="020B0604020202020204" pitchFamily="34" charset="0"/>
                 <a:cs typeface="Arial" panose="020B0604020202020204" pitchFamily="34" charset="0"/>
               </a:rPr>
-              <a:t>= 0.10</a:t>
+              <a:t>= 0.35</a:t>
             </a:r>
           </a:p>
         </p:txBody>
@@ -8134,7 +8145,7 @@
                 <a:latin typeface="Arial" panose="020B0604020202020204" pitchFamily="34" charset="0"/>
                 <a:cs typeface="Arial" panose="020B0604020202020204" pitchFamily="34" charset="0"/>
               </a:rPr>
-              <a:t>= 0.13</a:t>
+              <a:t>= 0.33</a:t>
             </a:r>
           </a:p>
         </p:txBody>
@@ -8193,7 +8204,7 @@
                 <a:latin typeface="Arial" panose="020B0604020202020204" pitchFamily="34" charset="0"/>
                 <a:cs typeface="Arial" panose="020B0604020202020204" pitchFamily="34" charset="0"/>
               </a:rPr>
-              <a:t>= 0.10</a:t>
+              <a:t>= 0.19</a:t>
             </a:r>
           </a:p>
         </p:txBody>
@@ -8241,7 +8252,7 @@
                 <a:latin typeface="Arial" panose="020B0604020202020204" pitchFamily="34" charset="0"/>
                 <a:cs typeface="Arial" panose="020B0604020202020204" pitchFamily="34" charset="0"/>
               </a:rPr>
-              <a:t>-0.085</a:t>
+              <a:t>0.420</a:t>
             </a:r>
           </a:p>
         </p:txBody>
@@ -8289,7 +8300,7 @@
                 <a:latin typeface="Arial" panose="020B0604020202020204" pitchFamily="34" charset="0"/>
                 <a:cs typeface="Arial" panose="020B0604020202020204" pitchFamily="34" charset="0"/>
               </a:rPr>
-              <a:t>0.486</a:t>
+              <a:t>0.469</a:t>
             </a:r>
           </a:p>
         </p:txBody>
@@ -8308,8 +8319,8 @@
         </p:nvSpPr>
         <p:spPr>
           <a:xfrm>
-            <a:off x="5032538" y="3992468"/>
-            <a:ext cx="771792" cy="369332"/>
+            <a:off x="5032537" y="3992468"/>
+            <a:ext cx="852789" cy="369332"/>
           </a:xfrm>
           <a:prstGeom prst="rect">
             <a:avLst/>
@@ -8337,7 +8348,7 @@
                 <a:latin typeface="Arial" panose="020B0604020202020204" pitchFamily="34" charset="0"/>
                 <a:cs typeface="Arial" panose="020B0604020202020204" pitchFamily="34" charset="0"/>
               </a:rPr>
-              <a:t>0.003</a:t>
+              <a:t>-0.013</a:t>
             </a:r>
           </a:p>
         </p:txBody>
@@ -8385,7 +8396,7 @@
                 <a:latin typeface="Arial" panose="020B0604020202020204" pitchFamily="34" charset="0"/>
                 <a:cs typeface="Arial" panose="020B0604020202020204" pitchFamily="34" charset="0"/>
               </a:rPr>
-              <a:t>0.067</a:t>
+              <a:t>0.041</a:t>
             </a:r>
           </a:p>
         </p:txBody>
@@ -8433,7 +8444,7 @@
                 <a:latin typeface="Arial" panose="020B0604020202020204" pitchFamily="34" charset="0"/>
                 <a:cs typeface="Arial" panose="020B0604020202020204" pitchFamily="34" charset="0"/>
               </a:rPr>
-              <a:t>-0.34</a:t>
+              <a:t>0.633</a:t>
             </a:r>
           </a:p>
         </p:txBody>
@@ -8481,7 +8492,7 @@
                 <a:latin typeface="Arial" panose="020B0604020202020204" pitchFamily="34" charset="0"/>
                 <a:cs typeface="Arial" panose="020B0604020202020204" pitchFamily="34" charset="0"/>
               </a:rPr>
-              <a:t>-0.040</a:t>
+              <a:t>0.094</a:t>
             </a:r>
           </a:p>
         </p:txBody>
@@ -8500,8 +8511,8 @@
         </p:nvSpPr>
         <p:spPr>
           <a:xfrm>
-            <a:off x="3544828" y="1189662"/>
-            <a:ext cx="770968" cy="369332"/>
+            <a:off x="3785457" y="949032"/>
+            <a:ext cx="1098851" cy="369332"/>
           </a:xfrm>
           <a:prstGeom prst="rect">
             <a:avLst/>
@@ -8521,15 +8532,10 @@
           <a:p>
             <a:r>
               <a:rPr lang="en-US" dirty="0">
-                <a:solidFill>
-                  <a:schemeClr val="bg2">
-                    <a:lumMod val="50000"/>
-                  </a:schemeClr>
-                </a:solidFill>
-                <a:latin typeface="Arial" panose="020B0604020202020204" pitchFamily="34" charset="0"/>
-                <a:cs typeface="Arial" panose="020B0604020202020204" pitchFamily="34" charset="0"/>
-              </a:rPr>
-              <a:t>0.008</a:t>
+                <a:latin typeface="Arial" panose="020B0604020202020204" pitchFamily="34" charset="0"/>
+                <a:cs typeface="Arial" panose="020B0604020202020204" pitchFamily="34" charset="0"/>
+              </a:rPr>
+              <a:t>0.036**</a:t>
             </a:r>
           </a:p>
         </p:txBody>

</xml_diff>